<commit_message>
added procedure images and analysis. Added script for my section (introduction)
</commit_message>
<xml_diff>
--- a/PowerpointSlides/The Flexible Job Shop Scheduling Algorithm.pptx
+++ b/PowerpointSlides/The Flexible Job Shop Scheduling Algorithm.pptx
@@ -5,25 +5,30 @@
     <p:sldMasterId id="2147483648" r:id="rId1"/>
   </p:sldMasterIdLst>
   <p:notesMasterIdLst>
-    <p:notesMasterId r:id="rId18"/>
+    <p:notesMasterId r:id="rId23"/>
   </p:notesMasterIdLst>
   <p:sldIdLst>
     <p:sldId id="256" r:id="rId2"/>
     <p:sldId id="257" r:id="rId3"/>
     <p:sldId id="258" r:id="rId4"/>
     <p:sldId id="259" r:id="rId5"/>
-    <p:sldId id="260" r:id="rId6"/>
-    <p:sldId id="261" r:id="rId7"/>
-    <p:sldId id="262" r:id="rId8"/>
-    <p:sldId id="263" r:id="rId9"/>
-    <p:sldId id="264" r:id="rId10"/>
-    <p:sldId id="265" r:id="rId11"/>
-    <p:sldId id="266" r:id="rId12"/>
-    <p:sldId id="267" r:id="rId13"/>
-    <p:sldId id="268" r:id="rId14"/>
-    <p:sldId id="269" r:id="rId15"/>
-    <p:sldId id="270" r:id="rId16"/>
-    <p:sldId id="271" r:id="rId17"/>
+    <p:sldId id="276" r:id="rId6"/>
+    <p:sldId id="260" r:id="rId7"/>
+    <p:sldId id="261" r:id="rId8"/>
+    <p:sldId id="262" r:id="rId9"/>
+    <p:sldId id="263" r:id="rId10"/>
+    <p:sldId id="264" r:id="rId11"/>
+    <p:sldId id="265" r:id="rId12"/>
+    <p:sldId id="266" r:id="rId13"/>
+    <p:sldId id="267" r:id="rId14"/>
+    <p:sldId id="268" r:id="rId15"/>
+    <p:sldId id="269" r:id="rId16"/>
+    <p:sldId id="270" r:id="rId17"/>
+    <p:sldId id="271" r:id="rId18"/>
+    <p:sldId id="272" r:id="rId19"/>
+    <p:sldId id="273" r:id="rId20"/>
+    <p:sldId id="274" r:id="rId21"/>
+    <p:sldId id="275" r:id="rId22"/>
   </p:sldIdLst>
   <p:sldSz cx="12192000" cy="6858000"/>
   <p:notesSz cx="6858000" cy="9144000"/>
@@ -131,6 +136,7 @@
             <p14:sldId id="257"/>
             <p14:sldId id="258"/>
             <p14:sldId id="259"/>
+            <p14:sldId id="276"/>
             <p14:sldId id="260"/>
             <p14:sldId id="261"/>
             <p14:sldId id="262"/>
@@ -143,6 +149,10 @@
             <p14:sldId id="269"/>
             <p14:sldId id="270"/>
             <p14:sldId id="271"/>
+            <p14:sldId id="272"/>
+            <p14:sldId id="273"/>
+            <p14:sldId id="274"/>
+            <p14:sldId id="275"/>
           </p14:sldIdLst>
         </p14:section>
       </p14:sectionLst>
@@ -5543,6 +5553,13 @@
         </dgm:presLayoutVars>
       </dgm:prSet>
       <dgm:spPr/>
+      <dgm:t>
+        <a:bodyPr/>
+        <a:lstStyle/>
+        <a:p>
+          <a:endParaRPr lang="en-US"/>
+        </a:p>
+      </dgm:t>
     </dgm:pt>
   </dgm:ptLst>
   <dgm:cxnLst>
@@ -5951,6 +5968,13 @@
         </dgm:presLayoutVars>
       </dgm:prSet>
       <dgm:spPr/>
+      <dgm:t>
+        <a:bodyPr/>
+        <a:lstStyle/>
+        <a:p>
+          <a:endParaRPr lang="en-US"/>
+        </a:p>
+      </dgm:t>
     </dgm:pt>
     <dgm:pt modelId="{B39294D4-FB1A-43E5-94EF-F4B307A8BFA6}" type="pres">
       <dgm:prSet presAssocID="{793B8403-C520-42DF-92D8-4983CB60A66E}" presName="linNode" presStyleCnt="0"/>
@@ -5964,6 +5988,13 @@
         </dgm:presLayoutVars>
       </dgm:prSet>
       <dgm:spPr/>
+      <dgm:t>
+        <a:bodyPr/>
+        <a:lstStyle/>
+        <a:p>
+          <a:endParaRPr lang="en-US"/>
+        </a:p>
+      </dgm:t>
     </dgm:pt>
     <dgm:pt modelId="{1F081EDC-561C-4939-9AAE-B5658EDF3295}" type="pres">
       <dgm:prSet presAssocID="{793B8403-C520-42DF-92D8-4983CB60A66E}" presName="descendantText" presStyleLbl="alignAccFollowNode1" presStyleIdx="0" presStyleCnt="3">
@@ -5996,6 +6027,13 @@
         </dgm:presLayoutVars>
       </dgm:prSet>
       <dgm:spPr/>
+      <dgm:t>
+        <a:bodyPr/>
+        <a:lstStyle/>
+        <a:p>
+          <a:endParaRPr lang="en-US"/>
+        </a:p>
+      </dgm:t>
     </dgm:pt>
     <dgm:pt modelId="{A33C5EBD-7AE5-441F-B876-58FC95DC293A}" type="pres">
       <dgm:prSet presAssocID="{F8D430A9-9D4B-4237-B376-3AC88A217C17}" presName="descendantText" presStyleLbl="alignAccFollowNode1" presStyleIdx="1" presStyleCnt="3">
@@ -6004,6 +6042,13 @@
         </dgm:presLayoutVars>
       </dgm:prSet>
       <dgm:spPr/>
+      <dgm:t>
+        <a:bodyPr/>
+        <a:lstStyle/>
+        <a:p>
+          <a:endParaRPr lang="en-US"/>
+        </a:p>
+      </dgm:t>
     </dgm:pt>
     <dgm:pt modelId="{D66CA15E-B681-4C15-BD59-165E72D6BAA0}" type="pres">
       <dgm:prSet presAssocID="{602D8F26-E76E-4065-B867-75C0D48688A0}" presName="sp" presStyleCnt="0"/>
@@ -6046,27 +6091,27 @@
     </dgm:pt>
   </dgm:ptLst>
   <dgm:cxnLst>
+    <dgm:cxn modelId="{3F5C4484-5176-44CD-BF9F-B7483A83AE5A}" type="presOf" srcId="{6535251D-CE69-486C-AA49-296365C61330}" destId="{3C44D76E-9FB3-49E4-A2C5-45A50C3747E3}" srcOrd="0" destOrd="1" presId="urn:microsoft.com/office/officeart/2005/8/layout/vList5"/>
     <dgm:cxn modelId="{7FE8304E-2C64-4273-ABD8-432666742D76}" srcId="{F8D430A9-9D4B-4237-B376-3AC88A217C17}" destId="{3A519B6F-579E-402E-92C0-35C02DFE4531}" srcOrd="0" destOrd="0" parTransId="{B469A8B0-8BFA-4790-807C-BECB3D88F4EE}" sibTransId="{D5AB5024-C817-4104-B2A4-32A87750A027}"/>
+    <dgm:cxn modelId="{FCEEFDB7-1954-44ED-AAB5-0102629CFBEA}" srcId="{DB494FB3-4C83-425E-B57D-DE4B419A94CA}" destId="{6535251D-CE69-486C-AA49-296365C61330}" srcOrd="1" destOrd="0" parTransId="{6CBE97C1-E9DB-4026-899A-F176780697ED}" sibTransId="{64FC8F17-8DC0-449B-B17B-7599789AD2EA}"/>
+    <dgm:cxn modelId="{38E86039-8411-4DB4-A2B9-E651DED0B3EF}" srcId="{793B8403-C520-42DF-92D8-4983CB60A66E}" destId="{8AF7819C-4751-45AC-8B2F-BFD5091F36A0}" srcOrd="2" destOrd="0" parTransId="{D0D1C28F-2615-421F-8952-BAE7D52961D5}" sibTransId="{A1F6137A-A425-4A11-9BB5-143E598D9FEA}"/>
+    <dgm:cxn modelId="{B0182764-C40C-47CF-8079-A12DAECD4BC0}" type="presOf" srcId="{793B8403-C520-42DF-92D8-4983CB60A66E}" destId="{2B5A0373-7151-498E-8BC9-31CB89C69073}" srcOrd="0" destOrd="0" presId="urn:microsoft.com/office/officeart/2005/8/layout/vList5"/>
     <dgm:cxn modelId="{59EC4863-1E9D-433C-84B3-5638A95543F2}" type="presOf" srcId="{15FA0D52-ED90-408B-9458-3EE3CF5F5D04}" destId="{1F21F52F-D26F-479D-8E0A-24493E9863BD}" srcOrd="0" destOrd="0" presId="urn:microsoft.com/office/officeart/2005/8/layout/vList5"/>
+    <dgm:cxn modelId="{2996A214-41A3-466C-A958-AB188432A503}" type="presOf" srcId="{AC236F7B-EA4B-4CDD-AD05-9FD10214A9B4}" destId="{3C44D76E-9FB3-49E4-A2C5-45A50C3747E3}" srcOrd="0" destOrd="0" presId="urn:microsoft.com/office/officeart/2005/8/layout/vList5"/>
+    <dgm:cxn modelId="{50935B81-EFE0-47A1-A692-2E6BCBE6715E}" type="presOf" srcId="{A80A2701-359C-427B-A85D-7BFE0AF524E7}" destId="{1F081EDC-561C-4939-9AAE-B5658EDF3295}" srcOrd="0" destOrd="0" presId="urn:microsoft.com/office/officeart/2005/8/layout/vList5"/>
+    <dgm:cxn modelId="{12EEFF1B-25C1-4C83-8FA3-2AE57F7CB064}" srcId="{15FA0D52-ED90-408B-9458-3EE3CF5F5D04}" destId="{DB494FB3-4C83-425E-B57D-DE4B419A94CA}" srcOrd="2" destOrd="0" parTransId="{227E49AB-F962-4CBC-A85C-F0E66BEF0C20}" sibTransId="{71B0F14E-9D4F-4539-8722-E593D246DC07}"/>
+    <dgm:cxn modelId="{B2478C36-A74D-4E5B-A187-647CB14A24EF}" srcId="{793B8403-C520-42DF-92D8-4983CB60A66E}" destId="{A80A2701-359C-427B-A85D-7BFE0AF524E7}" srcOrd="0" destOrd="0" parTransId="{0D4FAFDE-141C-4A39-A945-262BF07D6F63}" sibTransId="{0D5018A7-2513-4992-996B-38A07240F8DB}"/>
+    <dgm:cxn modelId="{71399A94-E652-4387-95BD-055655FFA0F7}" type="presOf" srcId="{0C750A3F-B89B-4693-9219-2CBAF65FEC35}" destId="{A33C5EBD-7AE5-441F-B876-58FC95DC293A}" srcOrd="0" destOrd="1" presId="urn:microsoft.com/office/officeart/2005/8/layout/vList5"/>
+    <dgm:cxn modelId="{AADA8FCF-ADAF-4B36-846E-CD14DFFA3847}" type="presOf" srcId="{F8D430A9-9D4B-4237-B376-3AC88A217C17}" destId="{3EAB476F-2628-442F-ADE4-56775120E15D}" srcOrd="0" destOrd="0" presId="urn:microsoft.com/office/officeart/2005/8/layout/vList5"/>
+    <dgm:cxn modelId="{BC67575D-B0F2-42CD-ACF9-EF59B437CF04}" srcId="{DB494FB3-4C83-425E-B57D-DE4B419A94CA}" destId="{AC236F7B-EA4B-4CDD-AD05-9FD10214A9B4}" srcOrd="0" destOrd="0" parTransId="{CC6FF8C3-1BAA-4894-8E53-F11AC09478F0}" sibTransId="{09099576-170A-4CFA-88C1-3DC3EA34DA83}"/>
+    <dgm:cxn modelId="{379523B0-6AFA-4929-A008-C65C2A66070B}" srcId="{15FA0D52-ED90-408B-9458-3EE3CF5F5D04}" destId="{F8D430A9-9D4B-4237-B376-3AC88A217C17}" srcOrd="1" destOrd="0" parTransId="{DE114CBD-D50D-4AEF-B6D7-2E8175168BF6}" sibTransId="{602D8F26-E76E-4065-B867-75C0D48688A0}"/>
+    <dgm:cxn modelId="{4FD106CC-BDC4-4640-8DD7-6027E1C20CB0}" type="presOf" srcId="{FAC6CBB4-F142-4F67-A29E-53EFE3FDB916}" destId="{1F081EDC-561C-4939-9AAE-B5658EDF3295}" srcOrd="0" destOrd="1" presId="urn:microsoft.com/office/officeart/2005/8/layout/vList5"/>
+    <dgm:cxn modelId="{C4BC9101-0CC5-4662-A1E1-A2F8F93C4507}" type="presOf" srcId="{DB494FB3-4C83-425E-B57D-DE4B419A94CA}" destId="{4CA2034B-48AA-4090-BDED-8C4EF49A0B4A}" srcOrd="0" destOrd="0" presId="urn:microsoft.com/office/officeart/2005/8/layout/vList5"/>
+    <dgm:cxn modelId="{8369A3D2-9E6D-464A-BDB3-122336DB0474}" srcId="{F8D430A9-9D4B-4237-B376-3AC88A217C17}" destId="{0C750A3F-B89B-4693-9219-2CBAF65FEC35}" srcOrd="1" destOrd="0" parTransId="{C2874EAF-C2C5-4C61-8FF3-6403B790AF5D}" sibTransId="{7DF2B160-7E77-4ABF-9421-1C46F59A83B8}"/>
+    <dgm:cxn modelId="{EBCAAAEB-FB21-4982-AB01-448315A26A30}" srcId="{15FA0D52-ED90-408B-9458-3EE3CF5F5D04}" destId="{793B8403-C520-42DF-92D8-4983CB60A66E}" srcOrd="0" destOrd="0" parTransId="{780C187E-4ABA-4FDD-8B7C-BBA064945456}" sibTransId="{A1BC0807-C9C0-4E49-91A6-F7B59302B132}"/>
+    <dgm:cxn modelId="{E13BEFDC-CDD8-4878-947F-121D6F1EF694}" type="presOf" srcId="{8AF7819C-4751-45AC-8B2F-BFD5091F36A0}" destId="{1F081EDC-561C-4939-9AAE-B5658EDF3295}" srcOrd="0" destOrd="2" presId="urn:microsoft.com/office/officeart/2005/8/layout/vList5"/>
+    <dgm:cxn modelId="{6EB58818-6112-4805-86F7-60495D3ECB12}" srcId="{793B8403-C520-42DF-92D8-4983CB60A66E}" destId="{FAC6CBB4-F142-4F67-A29E-53EFE3FDB916}" srcOrd="1" destOrd="0" parTransId="{84C2E18F-B36C-46AE-AC84-CAACD58ED400}" sibTransId="{6F0E4CDB-096A-414C-891C-9A851E6D3347}"/>
     <dgm:cxn modelId="{ECAB00FB-CB5C-4934-B547-4503C8745308}" type="presOf" srcId="{3A519B6F-579E-402E-92C0-35C02DFE4531}" destId="{A33C5EBD-7AE5-441F-B876-58FC95DC293A}" srcOrd="0" destOrd="0" presId="urn:microsoft.com/office/officeart/2005/8/layout/vList5"/>
-    <dgm:cxn modelId="{EBCAAAEB-FB21-4982-AB01-448315A26A30}" srcId="{15FA0D52-ED90-408B-9458-3EE3CF5F5D04}" destId="{793B8403-C520-42DF-92D8-4983CB60A66E}" srcOrd="0" destOrd="0" parTransId="{780C187E-4ABA-4FDD-8B7C-BBA064945456}" sibTransId="{A1BC0807-C9C0-4E49-91A6-F7B59302B132}"/>
-    <dgm:cxn modelId="{FCEEFDB7-1954-44ED-AAB5-0102629CFBEA}" srcId="{DB494FB3-4C83-425E-B57D-DE4B419A94CA}" destId="{6535251D-CE69-486C-AA49-296365C61330}" srcOrd="1" destOrd="0" parTransId="{6CBE97C1-E9DB-4026-899A-F176780697ED}" sibTransId="{64FC8F17-8DC0-449B-B17B-7599789AD2EA}"/>
-    <dgm:cxn modelId="{50935B81-EFE0-47A1-A692-2E6BCBE6715E}" type="presOf" srcId="{A80A2701-359C-427B-A85D-7BFE0AF524E7}" destId="{1F081EDC-561C-4939-9AAE-B5658EDF3295}" srcOrd="0" destOrd="0" presId="urn:microsoft.com/office/officeart/2005/8/layout/vList5"/>
-    <dgm:cxn modelId="{8369A3D2-9E6D-464A-BDB3-122336DB0474}" srcId="{F8D430A9-9D4B-4237-B376-3AC88A217C17}" destId="{0C750A3F-B89B-4693-9219-2CBAF65FEC35}" srcOrd="1" destOrd="0" parTransId="{C2874EAF-C2C5-4C61-8FF3-6403B790AF5D}" sibTransId="{7DF2B160-7E77-4ABF-9421-1C46F59A83B8}"/>
-    <dgm:cxn modelId="{71399A94-E652-4387-95BD-055655FFA0F7}" type="presOf" srcId="{0C750A3F-B89B-4693-9219-2CBAF65FEC35}" destId="{A33C5EBD-7AE5-441F-B876-58FC95DC293A}" srcOrd="0" destOrd="1" presId="urn:microsoft.com/office/officeart/2005/8/layout/vList5"/>
-    <dgm:cxn modelId="{12EEFF1B-25C1-4C83-8FA3-2AE57F7CB064}" srcId="{15FA0D52-ED90-408B-9458-3EE3CF5F5D04}" destId="{DB494FB3-4C83-425E-B57D-DE4B419A94CA}" srcOrd="2" destOrd="0" parTransId="{227E49AB-F962-4CBC-A85C-F0E66BEF0C20}" sibTransId="{71B0F14E-9D4F-4539-8722-E593D246DC07}"/>
-    <dgm:cxn modelId="{3F5C4484-5176-44CD-BF9F-B7483A83AE5A}" type="presOf" srcId="{6535251D-CE69-486C-AA49-296365C61330}" destId="{3C44D76E-9FB3-49E4-A2C5-45A50C3747E3}" srcOrd="0" destOrd="1" presId="urn:microsoft.com/office/officeart/2005/8/layout/vList5"/>
-    <dgm:cxn modelId="{B2478C36-A74D-4E5B-A187-647CB14A24EF}" srcId="{793B8403-C520-42DF-92D8-4983CB60A66E}" destId="{A80A2701-359C-427B-A85D-7BFE0AF524E7}" srcOrd="0" destOrd="0" parTransId="{0D4FAFDE-141C-4A39-A945-262BF07D6F63}" sibTransId="{0D5018A7-2513-4992-996B-38A07240F8DB}"/>
-    <dgm:cxn modelId="{BC67575D-B0F2-42CD-ACF9-EF59B437CF04}" srcId="{DB494FB3-4C83-425E-B57D-DE4B419A94CA}" destId="{AC236F7B-EA4B-4CDD-AD05-9FD10214A9B4}" srcOrd="0" destOrd="0" parTransId="{CC6FF8C3-1BAA-4894-8E53-F11AC09478F0}" sibTransId="{09099576-170A-4CFA-88C1-3DC3EA34DA83}"/>
-    <dgm:cxn modelId="{6EB58818-6112-4805-86F7-60495D3ECB12}" srcId="{793B8403-C520-42DF-92D8-4983CB60A66E}" destId="{FAC6CBB4-F142-4F67-A29E-53EFE3FDB916}" srcOrd="1" destOrd="0" parTransId="{84C2E18F-B36C-46AE-AC84-CAACD58ED400}" sibTransId="{6F0E4CDB-096A-414C-891C-9A851E6D3347}"/>
-    <dgm:cxn modelId="{379523B0-6AFA-4929-A008-C65C2A66070B}" srcId="{15FA0D52-ED90-408B-9458-3EE3CF5F5D04}" destId="{F8D430A9-9D4B-4237-B376-3AC88A217C17}" srcOrd="1" destOrd="0" parTransId="{DE114CBD-D50D-4AEF-B6D7-2E8175168BF6}" sibTransId="{602D8F26-E76E-4065-B867-75C0D48688A0}"/>
-    <dgm:cxn modelId="{C4BC9101-0CC5-4662-A1E1-A2F8F93C4507}" type="presOf" srcId="{DB494FB3-4C83-425E-B57D-DE4B419A94CA}" destId="{4CA2034B-48AA-4090-BDED-8C4EF49A0B4A}" srcOrd="0" destOrd="0" presId="urn:microsoft.com/office/officeart/2005/8/layout/vList5"/>
-    <dgm:cxn modelId="{B0182764-C40C-47CF-8079-A12DAECD4BC0}" type="presOf" srcId="{793B8403-C520-42DF-92D8-4983CB60A66E}" destId="{2B5A0373-7151-498E-8BC9-31CB89C69073}" srcOrd="0" destOrd="0" presId="urn:microsoft.com/office/officeart/2005/8/layout/vList5"/>
-    <dgm:cxn modelId="{E13BEFDC-CDD8-4878-947F-121D6F1EF694}" type="presOf" srcId="{8AF7819C-4751-45AC-8B2F-BFD5091F36A0}" destId="{1F081EDC-561C-4939-9AAE-B5658EDF3295}" srcOrd="0" destOrd="2" presId="urn:microsoft.com/office/officeart/2005/8/layout/vList5"/>
-    <dgm:cxn modelId="{2996A214-41A3-466C-A958-AB188432A503}" type="presOf" srcId="{AC236F7B-EA4B-4CDD-AD05-9FD10214A9B4}" destId="{3C44D76E-9FB3-49E4-A2C5-45A50C3747E3}" srcOrd="0" destOrd="0" presId="urn:microsoft.com/office/officeart/2005/8/layout/vList5"/>
-    <dgm:cxn modelId="{4FD106CC-BDC4-4640-8DD7-6027E1C20CB0}" type="presOf" srcId="{FAC6CBB4-F142-4F67-A29E-53EFE3FDB916}" destId="{1F081EDC-561C-4939-9AAE-B5658EDF3295}" srcOrd="0" destOrd="1" presId="urn:microsoft.com/office/officeart/2005/8/layout/vList5"/>
-    <dgm:cxn modelId="{38E86039-8411-4DB4-A2B9-E651DED0B3EF}" srcId="{793B8403-C520-42DF-92D8-4983CB60A66E}" destId="{8AF7819C-4751-45AC-8B2F-BFD5091F36A0}" srcOrd="2" destOrd="0" parTransId="{D0D1C28F-2615-421F-8952-BAE7D52961D5}" sibTransId="{A1F6137A-A425-4A11-9BB5-143E598D9FEA}"/>
-    <dgm:cxn modelId="{AADA8FCF-ADAF-4B36-846E-CD14DFFA3847}" type="presOf" srcId="{F8D430A9-9D4B-4237-B376-3AC88A217C17}" destId="{3EAB476F-2628-442F-ADE4-56775120E15D}" srcOrd="0" destOrd="0" presId="urn:microsoft.com/office/officeart/2005/8/layout/vList5"/>
     <dgm:cxn modelId="{E2D35577-455D-4652-90C4-E3ED247F077C}" type="presParOf" srcId="{1F21F52F-D26F-479D-8E0A-24493E9863BD}" destId="{B39294D4-FB1A-43E5-94EF-F4B307A8BFA6}" srcOrd="0" destOrd="0" presId="urn:microsoft.com/office/officeart/2005/8/layout/vList5"/>
     <dgm:cxn modelId="{DAB4EB05-508B-43A2-87AF-B1E4E9828429}" type="presParOf" srcId="{B39294D4-FB1A-43E5-94EF-F4B307A8BFA6}" destId="{2B5A0373-7151-498E-8BC9-31CB89C69073}" srcOrd="0" destOrd="0" presId="urn:microsoft.com/office/officeart/2005/8/layout/vList5"/>
     <dgm:cxn modelId="{5E2CCA40-269C-41C8-BC96-38B47BE5583B}" type="presParOf" srcId="{B39294D4-FB1A-43E5-94EF-F4B307A8BFA6}" destId="{1F081EDC-561C-4939-9AAE-B5658EDF3295}" srcOrd="1" destOrd="0" presId="urn:microsoft.com/office/officeart/2005/8/layout/vList5"/>
@@ -6493,6 +6538,13 @@
         </dgm:presLayoutVars>
       </dgm:prSet>
       <dgm:spPr/>
+      <dgm:t>
+        <a:bodyPr/>
+        <a:lstStyle/>
+        <a:p>
+          <a:endParaRPr lang="en-US"/>
+        </a:p>
+      </dgm:t>
     </dgm:pt>
     <dgm:pt modelId="{CA7B934C-A28C-45FC-AD42-D16B70DBB5C7}" type="pres">
       <dgm:prSet presAssocID="{CA88AF1F-D44B-43A6-9D0E-9F2DAC3D479C}" presName="linNode" presStyleCnt="0"/>
@@ -6584,6 +6636,13 @@
         </dgm:presLayoutVars>
       </dgm:prSet>
       <dgm:spPr/>
+      <dgm:t>
+        <a:bodyPr/>
+        <a:lstStyle/>
+        <a:p>
+          <a:endParaRPr lang="en-US"/>
+        </a:p>
+      </dgm:t>
     </dgm:pt>
     <dgm:pt modelId="{96C8FA0B-09C6-4C76-A592-A5A8F2561065}" type="pres">
       <dgm:prSet presAssocID="{8DC45F1A-D3EC-4787-8461-3E73221EEE9B}" presName="descendantText" presStyleLbl="alignAccFollowNode1" presStyleIdx="2" presStyleCnt="3">
@@ -6602,29 +6661,29 @@
     </dgm:pt>
   </dgm:ptLst>
   <dgm:cxnLst>
+    <dgm:cxn modelId="{E11AB3EE-1FBC-4B6A-AA85-528A315CAB47}" type="presOf" srcId="{0F7703A0-938E-4B15-BE59-FA4D3BCED3D7}" destId="{4399EE33-CB59-4911-AC06-7258C2CCC351}" srcOrd="0" destOrd="1" presId="urn:microsoft.com/office/officeart/2005/8/layout/vList5"/>
     <dgm:cxn modelId="{C6D4BF35-D28C-41BE-95D9-9827F4D23553}" srcId="{CA88AF1F-D44B-43A6-9D0E-9F2DAC3D479C}" destId="{B64A954A-3703-4130-BD2D-E0299E861BFC}" srcOrd="4" destOrd="0" parTransId="{BCC1EBA0-33A2-4F76-80FA-A9505448F763}" sibTransId="{D7748A71-D200-4153-96EA-872896D7B889}"/>
-    <dgm:cxn modelId="{E11AB3EE-1FBC-4B6A-AA85-528A315CAB47}" type="presOf" srcId="{0F7703A0-938E-4B15-BE59-FA4D3BCED3D7}" destId="{4399EE33-CB59-4911-AC06-7258C2CCC351}" srcOrd="0" destOrd="1" presId="urn:microsoft.com/office/officeart/2005/8/layout/vList5"/>
+    <dgm:cxn modelId="{21DBDC25-4ADC-4740-8080-7DB8019B9CE0}" type="presOf" srcId="{CA88AF1F-D44B-43A6-9D0E-9F2DAC3D479C}" destId="{9CA6DF01-11F9-4FB6-82E9-825482192B70}" srcOrd="0" destOrd="0" presId="urn:microsoft.com/office/officeart/2005/8/layout/vList5"/>
+    <dgm:cxn modelId="{C936BBD9-5166-48DC-A06D-2D22000EA857}" srcId="{CA88AF1F-D44B-43A6-9D0E-9F2DAC3D479C}" destId="{B4A615BE-4291-4E27-942D-C99FA2624EBB}" srcOrd="2" destOrd="0" parTransId="{96FC842A-CB16-44DC-831A-0696215B3E56}" sibTransId="{07B209FB-372C-45C9-A44B-D830BD4C24D4}"/>
+    <dgm:cxn modelId="{9EA79449-A7E1-4B87-935D-DAD05359937B}" type="presOf" srcId="{B0651378-C321-4BED-A9B3-F80A1A7C3FAF}" destId="{8DEA74A7-EEE3-4623-AC07-C69BA1EFB93D}" srcOrd="0" destOrd="0" presId="urn:microsoft.com/office/officeart/2005/8/layout/vList5"/>
+    <dgm:cxn modelId="{573605E0-A0D3-4C10-A87D-45DA8FE4BFC5}" type="presOf" srcId="{00BEEE2B-9188-4BBD-B41E-4C0BE9D196D5}" destId="{4399EE33-CB59-4911-AC06-7258C2CCC351}" srcOrd="0" destOrd="3" presId="urn:microsoft.com/office/officeart/2005/8/layout/vList5"/>
+    <dgm:cxn modelId="{1BD81892-2AD0-41B9-85B2-4EF3E8B8CAA8}" type="presOf" srcId="{D884D66A-5046-4FF5-A980-4ABA609B96B5}" destId="{BD06A867-3F9F-4F96-988E-3ACB3CA44C50}" srcOrd="0" destOrd="0" presId="urn:microsoft.com/office/officeart/2005/8/layout/vList5"/>
+    <dgm:cxn modelId="{69D6185A-0329-45C3-BA25-2BC30656FC0E}" type="presOf" srcId="{B4A615BE-4291-4E27-942D-C99FA2624EBB}" destId="{4399EE33-CB59-4911-AC06-7258C2CCC351}" srcOrd="0" destOrd="2" presId="urn:microsoft.com/office/officeart/2005/8/layout/vList5"/>
+    <dgm:cxn modelId="{2483D029-5557-40FC-A267-4B7CBB477CAA}" type="presOf" srcId="{8DC45F1A-D3EC-4787-8461-3E73221EEE9B}" destId="{CF3068D9-B251-4FB2-9155-B454742E7EBB}" srcOrd="0" destOrd="0" presId="urn:microsoft.com/office/officeart/2005/8/layout/vList5"/>
+    <dgm:cxn modelId="{82D6793B-344B-4084-8E09-6946B30CD438}" type="presOf" srcId="{CD831326-1C94-49A5-AF8D-8977DF4499E0}" destId="{4399EE33-CB59-4911-AC06-7258C2CCC351}" srcOrd="0" destOrd="0" presId="urn:microsoft.com/office/officeart/2005/8/layout/vList5"/>
+    <dgm:cxn modelId="{303AC733-571A-4F28-896B-5146BD26BCE2}" type="presOf" srcId="{E4A6FAB2-0A7C-4CD2-84DC-5C92694450B0}" destId="{96C8FA0B-09C6-4C76-A592-A5A8F2561065}" srcOrd="0" destOrd="0" presId="urn:microsoft.com/office/officeart/2005/8/layout/vList5"/>
+    <dgm:cxn modelId="{E1C1B6EA-0D2D-4ADF-ACCE-D629FC7E6089}" srcId="{8DC45F1A-D3EC-4787-8461-3E73221EEE9B}" destId="{E4A6FAB2-0A7C-4CD2-84DC-5C92694450B0}" srcOrd="0" destOrd="0" parTransId="{84498810-D0BB-4101-927D-0728A50FBD43}" sibTransId="{1DE25870-0F06-4B99-8E13-8D408EFD1C71}"/>
+    <dgm:cxn modelId="{98669106-527A-4E00-AEBB-206B7FB47EBB}" srcId="{8DC45F1A-D3EC-4787-8461-3E73221EEE9B}" destId="{B17FB486-CE82-4552-81EA-79090C2DDCA9}" srcOrd="1" destOrd="0" parTransId="{2211D010-55A7-430D-BC21-5E4031B0F322}" sibTransId="{D24BE7E4-B540-4685-8F89-2BC32517280B}"/>
     <dgm:cxn modelId="{7FF942A8-530A-40FE-A038-54692DA05340}" srcId="{CA88AF1F-D44B-43A6-9D0E-9F2DAC3D479C}" destId="{CD831326-1C94-49A5-AF8D-8977DF4499E0}" srcOrd="0" destOrd="0" parTransId="{007648C3-ADDF-472C-BFF7-AC53A12E27CB}" sibTransId="{50282B96-9D7B-4B49-8EDB-893395E0F7DB}"/>
+    <dgm:cxn modelId="{19BACF80-7FCD-4B1F-8FC0-FF22901CF3C2}" srcId="{CA88AF1F-D44B-43A6-9D0E-9F2DAC3D479C}" destId="{0F7703A0-938E-4B15-BE59-FA4D3BCED3D7}" srcOrd="1" destOrd="0" parTransId="{F05885A8-1C60-4060-9A3F-D74F480C808B}" sibTransId="{ACEBB940-80D5-4E76-B41D-408C3261F78A}"/>
+    <dgm:cxn modelId="{9307C01D-85A7-4139-9FCC-28EB8A6A5F0F}" type="presOf" srcId="{B64A954A-3703-4130-BD2D-E0299E861BFC}" destId="{4399EE33-CB59-4911-AC06-7258C2CCC351}" srcOrd="0" destOrd="4" presId="urn:microsoft.com/office/officeart/2005/8/layout/vList5"/>
+    <dgm:cxn modelId="{B6D181C4-CF7D-4389-A70B-3D517000AD78}" srcId="{B0651378-C321-4BED-A9B3-F80A1A7C3FAF}" destId="{CA88AF1F-D44B-43A6-9D0E-9F2DAC3D479C}" srcOrd="0" destOrd="0" parTransId="{018130A9-7F13-4FC6-94AC-14859C8F0B6D}" sibTransId="{4881C6E1-C30D-4D44-BDDC-17F8AC30D1A1}"/>
+    <dgm:cxn modelId="{B2A130E6-F4C4-4A26-AC00-FC9FEBBF2BAE}" type="presOf" srcId="{B8A8AFA4-F355-4ED4-AACB-2D56902CA35F}" destId="{734A2389-DD6B-48D3-A49E-657F05DDA171}" srcOrd="0" destOrd="0" presId="urn:microsoft.com/office/officeart/2005/8/layout/vList5"/>
+    <dgm:cxn modelId="{3CF96DA9-AEEC-4ED7-BE2A-F9D333401FEE}" srcId="{D884D66A-5046-4FF5-A980-4ABA609B96B5}" destId="{B8A8AFA4-F355-4ED4-AACB-2D56902CA35F}" srcOrd="0" destOrd="0" parTransId="{1177CB18-1AE4-4D3D-AB04-2A68B34E88D6}" sibTransId="{7F83C134-2E1F-43EA-8E7A-259D9C3CDB3A}"/>
+    <dgm:cxn modelId="{064DC789-1A19-44DE-BA06-EF89AD315869}" type="presOf" srcId="{B17FB486-CE82-4552-81EA-79090C2DDCA9}" destId="{96C8FA0B-09C6-4C76-A592-A5A8F2561065}" srcOrd="0" destOrd="1" presId="urn:microsoft.com/office/officeart/2005/8/layout/vList5"/>
+    <dgm:cxn modelId="{FA12BEE8-090C-4DC5-B855-CAB553461350}" srcId="{B0651378-C321-4BED-A9B3-F80A1A7C3FAF}" destId="{8DC45F1A-D3EC-4787-8461-3E73221EEE9B}" srcOrd="2" destOrd="0" parTransId="{77E505DD-8562-4FB4-AE84-6D847E9DC2E6}" sibTransId="{3BBF6D67-355E-4779-9330-C191853F185D}"/>
     <dgm:cxn modelId="{B9F85461-83A6-45F6-9B85-01B896ABB2E1}" srcId="{CA88AF1F-D44B-43A6-9D0E-9F2DAC3D479C}" destId="{00BEEE2B-9188-4BBD-B41E-4C0BE9D196D5}" srcOrd="3" destOrd="0" parTransId="{77F7F25D-99F9-4D66-92A4-32F5DCDF3D08}" sibTransId="{6EF02CD7-8038-419F-93D7-C384C2B4BCD6}"/>
-    <dgm:cxn modelId="{C936BBD9-5166-48DC-A06D-2D22000EA857}" srcId="{CA88AF1F-D44B-43A6-9D0E-9F2DAC3D479C}" destId="{B4A615BE-4291-4E27-942D-C99FA2624EBB}" srcOrd="2" destOrd="0" parTransId="{96FC842A-CB16-44DC-831A-0696215B3E56}" sibTransId="{07B209FB-372C-45C9-A44B-D830BD4C24D4}"/>
-    <dgm:cxn modelId="{573605E0-A0D3-4C10-A87D-45DA8FE4BFC5}" type="presOf" srcId="{00BEEE2B-9188-4BBD-B41E-4C0BE9D196D5}" destId="{4399EE33-CB59-4911-AC06-7258C2CCC351}" srcOrd="0" destOrd="3" presId="urn:microsoft.com/office/officeart/2005/8/layout/vList5"/>
-    <dgm:cxn modelId="{98669106-527A-4E00-AEBB-206B7FB47EBB}" srcId="{8DC45F1A-D3EC-4787-8461-3E73221EEE9B}" destId="{B17FB486-CE82-4552-81EA-79090C2DDCA9}" srcOrd="1" destOrd="0" parTransId="{2211D010-55A7-430D-BC21-5E4031B0F322}" sibTransId="{D24BE7E4-B540-4685-8F89-2BC32517280B}"/>
-    <dgm:cxn modelId="{9EA79449-A7E1-4B87-935D-DAD05359937B}" type="presOf" srcId="{B0651378-C321-4BED-A9B3-F80A1A7C3FAF}" destId="{8DEA74A7-EEE3-4623-AC07-C69BA1EFB93D}" srcOrd="0" destOrd="0" presId="urn:microsoft.com/office/officeart/2005/8/layout/vList5"/>
-    <dgm:cxn modelId="{E1C1B6EA-0D2D-4ADF-ACCE-D629FC7E6089}" srcId="{8DC45F1A-D3EC-4787-8461-3E73221EEE9B}" destId="{E4A6FAB2-0A7C-4CD2-84DC-5C92694450B0}" srcOrd="0" destOrd="0" parTransId="{84498810-D0BB-4101-927D-0728A50FBD43}" sibTransId="{1DE25870-0F06-4B99-8E13-8D408EFD1C71}"/>
-    <dgm:cxn modelId="{303AC733-571A-4F28-896B-5146BD26BCE2}" type="presOf" srcId="{E4A6FAB2-0A7C-4CD2-84DC-5C92694450B0}" destId="{96C8FA0B-09C6-4C76-A592-A5A8F2561065}" srcOrd="0" destOrd="0" presId="urn:microsoft.com/office/officeart/2005/8/layout/vList5"/>
-    <dgm:cxn modelId="{21DBDC25-4ADC-4740-8080-7DB8019B9CE0}" type="presOf" srcId="{CA88AF1F-D44B-43A6-9D0E-9F2DAC3D479C}" destId="{9CA6DF01-11F9-4FB6-82E9-825482192B70}" srcOrd="0" destOrd="0" presId="urn:microsoft.com/office/officeart/2005/8/layout/vList5"/>
-    <dgm:cxn modelId="{3CF96DA9-AEEC-4ED7-BE2A-F9D333401FEE}" srcId="{D884D66A-5046-4FF5-A980-4ABA609B96B5}" destId="{B8A8AFA4-F355-4ED4-AACB-2D56902CA35F}" srcOrd="0" destOrd="0" parTransId="{1177CB18-1AE4-4D3D-AB04-2A68B34E88D6}" sibTransId="{7F83C134-2E1F-43EA-8E7A-259D9C3CDB3A}"/>
-    <dgm:cxn modelId="{B2A130E6-F4C4-4A26-AC00-FC9FEBBF2BAE}" type="presOf" srcId="{B8A8AFA4-F355-4ED4-AACB-2D56902CA35F}" destId="{734A2389-DD6B-48D3-A49E-657F05DDA171}" srcOrd="0" destOrd="0" presId="urn:microsoft.com/office/officeart/2005/8/layout/vList5"/>
-    <dgm:cxn modelId="{9307C01D-85A7-4139-9FCC-28EB8A6A5F0F}" type="presOf" srcId="{B64A954A-3703-4130-BD2D-E0299E861BFC}" destId="{4399EE33-CB59-4911-AC06-7258C2CCC351}" srcOrd="0" destOrd="4" presId="urn:microsoft.com/office/officeart/2005/8/layout/vList5"/>
-    <dgm:cxn modelId="{19BACF80-7FCD-4B1F-8FC0-FF22901CF3C2}" srcId="{CA88AF1F-D44B-43A6-9D0E-9F2DAC3D479C}" destId="{0F7703A0-938E-4B15-BE59-FA4D3BCED3D7}" srcOrd="1" destOrd="0" parTransId="{F05885A8-1C60-4060-9A3F-D74F480C808B}" sibTransId="{ACEBB940-80D5-4E76-B41D-408C3261F78A}"/>
     <dgm:cxn modelId="{51FE5B13-0BF9-485C-939F-603948A80473}" srcId="{B0651378-C321-4BED-A9B3-F80A1A7C3FAF}" destId="{D884D66A-5046-4FF5-A980-4ABA609B96B5}" srcOrd="1" destOrd="0" parTransId="{B6714319-5BCD-4B97-820D-F2078AFD35A9}" sibTransId="{CBD13EA9-C3E2-43F1-ADC6-40DB633E2A2D}"/>
-    <dgm:cxn modelId="{FA12BEE8-090C-4DC5-B855-CAB553461350}" srcId="{B0651378-C321-4BED-A9B3-F80A1A7C3FAF}" destId="{8DC45F1A-D3EC-4787-8461-3E73221EEE9B}" srcOrd="2" destOrd="0" parTransId="{77E505DD-8562-4FB4-AE84-6D847E9DC2E6}" sibTransId="{3BBF6D67-355E-4779-9330-C191853F185D}"/>
-    <dgm:cxn modelId="{1BD81892-2AD0-41B9-85B2-4EF3E8B8CAA8}" type="presOf" srcId="{D884D66A-5046-4FF5-A980-4ABA609B96B5}" destId="{BD06A867-3F9F-4F96-988E-3ACB3CA44C50}" srcOrd="0" destOrd="0" presId="urn:microsoft.com/office/officeart/2005/8/layout/vList5"/>
-    <dgm:cxn modelId="{2483D029-5557-40FC-A267-4B7CBB477CAA}" type="presOf" srcId="{8DC45F1A-D3EC-4787-8461-3E73221EEE9B}" destId="{CF3068D9-B251-4FB2-9155-B454742E7EBB}" srcOrd="0" destOrd="0" presId="urn:microsoft.com/office/officeart/2005/8/layout/vList5"/>
-    <dgm:cxn modelId="{B6D181C4-CF7D-4389-A70B-3D517000AD78}" srcId="{B0651378-C321-4BED-A9B3-F80A1A7C3FAF}" destId="{CA88AF1F-D44B-43A6-9D0E-9F2DAC3D479C}" srcOrd="0" destOrd="0" parTransId="{018130A9-7F13-4FC6-94AC-14859C8F0B6D}" sibTransId="{4881C6E1-C30D-4D44-BDDC-17F8AC30D1A1}"/>
-    <dgm:cxn modelId="{69D6185A-0329-45C3-BA25-2BC30656FC0E}" type="presOf" srcId="{B4A615BE-4291-4E27-942D-C99FA2624EBB}" destId="{4399EE33-CB59-4911-AC06-7258C2CCC351}" srcOrd="0" destOrd="2" presId="urn:microsoft.com/office/officeart/2005/8/layout/vList5"/>
-    <dgm:cxn modelId="{064DC789-1A19-44DE-BA06-EF89AD315869}" type="presOf" srcId="{B17FB486-CE82-4552-81EA-79090C2DDCA9}" destId="{96C8FA0B-09C6-4C76-A592-A5A8F2561065}" srcOrd="0" destOrd="1" presId="urn:microsoft.com/office/officeart/2005/8/layout/vList5"/>
-    <dgm:cxn modelId="{82D6793B-344B-4084-8E09-6946B30CD438}" type="presOf" srcId="{CD831326-1C94-49A5-AF8D-8977DF4499E0}" destId="{4399EE33-CB59-4911-AC06-7258C2CCC351}" srcOrd="0" destOrd="0" presId="urn:microsoft.com/office/officeart/2005/8/layout/vList5"/>
     <dgm:cxn modelId="{3E47839D-77B9-4EF1-A081-7BFCEE7E5E86}" type="presParOf" srcId="{8DEA74A7-EEE3-4623-AC07-C69BA1EFB93D}" destId="{CA7B934C-A28C-45FC-AD42-D16B70DBB5C7}" srcOrd="0" destOrd="0" presId="urn:microsoft.com/office/officeart/2005/8/layout/vList5"/>
     <dgm:cxn modelId="{934D4564-D041-48C9-AFBF-8DFDE5397665}" type="presParOf" srcId="{CA7B934C-A28C-45FC-AD42-D16B70DBB5C7}" destId="{9CA6DF01-11F9-4FB6-82E9-825482192B70}" srcOrd="0" destOrd="0" presId="urn:microsoft.com/office/officeart/2005/8/layout/vList5"/>
     <dgm:cxn modelId="{653BA3AF-3979-4455-9B7A-6B21F45DF4CF}" type="presParOf" srcId="{CA7B934C-A28C-45FC-AD42-D16B70DBB5C7}" destId="{4399EE33-CB59-4911-AC06-7258C2CCC351}" srcOrd="1" destOrd="0" presId="urn:microsoft.com/office/officeart/2005/8/layout/vList5"/>
@@ -14860,7 +14919,7 @@
           <a:p>
             <a:fld id="{A291F42C-F59D-4174-BD22-041D45073DE2}" type="datetimeFigureOut">
               <a:rPr lang="en-US" smtClean="0"/>
-              <a:t>11/29/2015</a:t>
+              <a:t>12/2/2015</a:t>
             </a:fld>
             <a:endParaRPr lang="en-US"/>
           </a:p>
@@ -15548,6 +15607,22 @@
           <a:bodyPr/>
           <a:lstStyle/>
           <a:p>
+            <a:r>
+              <a:rPr lang="en-US" dirty="0" smtClean="0"/>
+              <a:t>We go into two extensions relevant to the algorithm.</a:t>
+            </a:r>
+            <a:r>
+              <a:rPr lang="en-US" baseline="0" dirty="0" smtClean="0"/>
+              <a:t>  First, this algorithm uses evolutionary approximation methods to approximate the answer.  Rather than explain how Bayesian and Evolutionary optimization works, there will be a very fast and condensed example of how the algorithm would run the task of optimizing making a </a:t>
+            </a:r>
+            <a:r>
+              <a:rPr lang="en-US" baseline="0" dirty="0" err="1" smtClean="0"/>
+              <a:t>Thanksigivng</a:t>
+            </a:r>
+            <a:r>
+              <a:rPr lang="en-US" baseline="0" dirty="0" smtClean="0"/>
+              <a:t> meal.  Secondly, a critical flaw was found in the published paper about the flexible job shop scheduling algorithm.  We will show that the goal of optimization through approximation was not achieved.</a:t>
+            </a:r>
             <a:endParaRPr lang="en-US" dirty="0"/>
           </a:p>
         </p:txBody>
@@ -15569,7 +15644,91 @@
           <a:p>
             <a:fld id="{602530D3-6148-4146-9286-D1F8EFC3221F}" type="slidenum">
               <a:rPr lang="en-US" smtClean="0"/>
-              <a:t>9</a:t>
+              <a:t>5</a:t>
+            </a:fld>
+            <a:endParaRPr lang="en-US"/>
+          </a:p>
+        </p:txBody>
+      </p:sp>
+    </p:spTree>
+    <p:extLst>
+      <p:ext uri="{BB962C8B-B14F-4D97-AF65-F5344CB8AC3E}">
+        <p14:creationId xmlns:p14="http://schemas.microsoft.com/office/powerpoint/2010/main" val="1001371012"/>
+      </p:ext>
+    </p:extLst>
+  </p:cSld>
+  <p:clrMapOvr>
+    <a:masterClrMapping/>
+  </p:clrMapOvr>
+</p:notes>
+</file>
+
+<file path=ppt/notesSlides/notesSlide6.xml><?xml version="1.0" encoding="utf-8"?>
+<p:notes xmlns:a="http://schemas.openxmlformats.org/drawingml/2006/main" xmlns:r="http://schemas.openxmlformats.org/officeDocument/2006/relationships" xmlns:p="http://schemas.openxmlformats.org/presentationml/2006/main">
+  <p:cSld>
+    <p:spTree>
+      <p:nvGrpSpPr>
+        <p:cNvPr id="1" name=""/>
+        <p:cNvGrpSpPr/>
+        <p:nvPr/>
+      </p:nvGrpSpPr>
+      <p:grpSpPr>
+        <a:xfrm>
+          <a:off x="0" y="0"/>
+          <a:ext cx="0" cy="0"/>
+          <a:chOff x="0" y="0"/>
+          <a:chExt cx="0" cy="0"/>
+        </a:xfrm>
+      </p:grpSpPr>
+      <p:sp>
+        <p:nvSpPr>
+          <p:cNvPr id="2" name="Slide Image Placeholder 1"/>
+          <p:cNvSpPr>
+            <a:spLocks noGrp="1" noRot="1" noChangeAspect="1"/>
+          </p:cNvSpPr>
+          <p:nvPr>
+            <p:ph type="sldImg"/>
+          </p:nvPr>
+        </p:nvSpPr>
+        <p:spPr/>
+      </p:sp>
+      <p:sp>
+        <p:nvSpPr>
+          <p:cNvPr id="3" name="Notes Placeholder 2"/>
+          <p:cNvSpPr>
+            <a:spLocks noGrp="1"/>
+          </p:cNvSpPr>
+          <p:nvPr>
+            <p:ph type="body" idx="1"/>
+          </p:nvPr>
+        </p:nvSpPr>
+        <p:spPr/>
+        <p:txBody>
+          <a:bodyPr/>
+          <a:lstStyle/>
+          <a:p>
+            <a:endParaRPr lang="en-US" dirty="0"/>
+          </a:p>
+        </p:txBody>
+      </p:sp>
+      <p:sp>
+        <p:nvSpPr>
+          <p:cNvPr id="4" name="Slide Number Placeholder 3"/>
+          <p:cNvSpPr>
+            <a:spLocks noGrp="1"/>
+          </p:cNvSpPr>
+          <p:nvPr>
+            <p:ph type="sldNum" sz="quarter" idx="10"/>
+          </p:nvPr>
+        </p:nvSpPr>
+        <p:spPr/>
+        <p:txBody>
+          <a:bodyPr/>
+          <a:lstStyle/>
+          <a:p>
+            <a:fld id="{602530D3-6148-4146-9286-D1F8EFC3221F}" type="slidenum">
+              <a:rPr lang="en-US" smtClean="0"/>
+              <a:t>10</a:t>
             </a:fld>
             <a:endParaRPr lang="en-US"/>
           </a:p>
@@ -15579,6 +15738,174 @@
     <p:extLst>
       <p:ext uri="{BB962C8B-B14F-4D97-AF65-F5344CB8AC3E}">
         <p14:creationId xmlns:p14="http://schemas.microsoft.com/office/powerpoint/2010/main" val="2434672408"/>
+      </p:ext>
+    </p:extLst>
+  </p:cSld>
+  <p:clrMapOvr>
+    <a:masterClrMapping/>
+  </p:clrMapOvr>
+</p:notes>
+</file>
+
+<file path=ppt/notesSlides/notesSlide7.xml><?xml version="1.0" encoding="utf-8"?>
+<p:notes xmlns:a="http://schemas.openxmlformats.org/drawingml/2006/main" xmlns:r="http://schemas.openxmlformats.org/officeDocument/2006/relationships" xmlns:p="http://schemas.openxmlformats.org/presentationml/2006/main">
+  <p:cSld>
+    <p:spTree>
+      <p:nvGrpSpPr>
+        <p:cNvPr id="1" name=""/>
+        <p:cNvGrpSpPr/>
+        <p:nvPr/>
+      </p:nvGrpSpPr>
+      <p:grpSpPr>
+        <a:xfrm>
+          <a:off x="0" y="0"/>
+          <a:ext cx="0" cy="0"/>
+          <a:chOff x="0" y="0"/>
+          <a:chExt cx="0" cy="0"/>
+        </a:xfrm>
+      </p:grpSpPr>
+      <p:sp>
+        <p:nvSpPr>
+          <p:cNvPr id="2" name="Slide Image Placeholder 1"/>
+          <p:cNvSpPr>
+            <a:spLocks noGrp="1" noRot="1" noChangeAspect="1"/>
+          </p:cNvSpPr>
+          <p:nvPr>
+            <p:ph type="sldImg"/>
+          </p:nvPr>
+        </p:nvSpPr>
+        <p:spPr/>
+      </p:sp>
+      <p:sp>
+        <p:nvSpPr>
+          <p:cNvPr id="3" name="Notes Placeholder 2"/>
+          <p:cNvSpPr>
+            <a:spLocks noGrp="1"/>
+          </p:cNvSpPr>
+          <p:nvPr>
+            <p:ph type="body" idx="1"/>
+          </p:nvPr>
+        </p:nvSpPr>
+        <p:spPr/>
+        <p:txBody>
+          <a:bodyPr/>
+          <a:lstStyle/>
+          <a:p>
+            <a:endParaRPr lang="en-US" dirty="0"/>
+          </a:p>
+        </p:txBody>
+      </p:sp>
+      <p:sp>
+        <p:nvSpPr>
+          <p:cNvPr id="4" name="Slide Number Placeholder 3"/>
+          <p:cNvSpPr>
+            <a:spLocks noGrp="1"/>
+          </p:cNvSpPr>
+          <p:nvPr>
+            <p:ph type="sldNum" sz="quarter" idx="10"/>
+          </p:nvPr>
+        </p:nvSpPr>
+        <p:spPr/>
+        <p:txBody>
+          <a:bodyPr/>
+          <a:lstStyle/>
+          <a:p>
+            <a:fld id="{602530D3-6148-4146-9286-D1F8EFC3221F}" type="slidenum">
+              <a:rPr lang="en-US" smtClean="0"/>
+              <a:t>18</a:t>
+            </a:fld>
+            <a:endParaRPr lang="en-US"/>
+          </a:p>
+        </p:txBody>
+      </p:sp>
+    </p:spTree>
+    <p:extLst>
+      <p:ext uri="{BB962C8B-B14F-4D97-AF65-F5344CB8AC3E}">
+        <p14:creationId xmlns:p14="http://schemas.microsoft.com/office/powerpoint/2010/main" val="751415645"/>
+      </p:ext>
+    </p:extLst>
+  </p:cSld>
+  <p:clrMapOvr>
+    <a:masterClrMapping/>
+  </p:clrMapOvr>
+</p:notes>
+</file>
+
+<file path=ppt/notesSlides/notesSlide8.xml><?xml version="1.0" encoding="utf-8"?>
+<p:notes xmlns:a="http://schemas.openxmlformats.org/drawingml/2006/main" xmlns:r="http://schemas.openxmlformats.org/officeDocument/2006/relationships" xmlns:p="http://schemas.openxmlformats.org/presentationml/2006/main">
+  <p:cSld>
+    <p:spTree>
+      <p:nvGrpSpPr>
+        <p:cNvPr id="1" name=""/>
+        <p:cNvGrpSpPr/>
+        <p:nvPr/>
+      </p:nvGrpSpPr>
+      <p:grpSpPr>
+        <a:xfrm>
+          <a:off x="0" y="0"/>
+          <a:ext cx="0" cy="0"/>
+          <a:chOff x="0" y="0"/>
+          <a:chExt cx="0" cy="0"/>
+        </a:xfrm>
+      </p:grpSpPr>
+      <p:sp>
+        <p:nvSpPr>
+          <p:cNvPr id="2" name="Slide Image Placeholder 1"/>
+          <p:cNvSpPr>
+            <a:spLocks noGrp="1" noRot="1" noChangeAspect="1"/>
+          </p:cNvSpPr>
+          <p:nvPr>
+            <p:ph type="sldImg"/>
+          </p:nvPr>
+        </p:nvSpPr>
+        <p:spPr/>
+      </p:sp>
+      <p:sp>
+        <p:nvSpPr>
+          <p:cNvPr id="3" name="Notes Placeholder 2"/>
+          <p:cNvSpPr>
+            <a:spLocks noGrp="1"/>
+          </p:cNvSpPr>
+          <p:nvPr>
+            <p:ph type="body" idx="1"/>
+          </p:nvPr>
+        </p:nvSpPr>
+        <p:spPr/>
+        <p:txBody>
+          <a:bodyPr/>
+          <a:lstStyle/>
+          <a:p>
+            <a:endParaRPr lang="en-US" dirty="0"/>
+          </a:p>
+        </p:txBody>
+      </p:sp>
+      <p:sp>
+        <p:nvSpPr>
+          <p:cNvPr id="4" name="Slide Number Placeholder 3"/>
+          <p:cNvSpPr>
+            <a:spLocks noGrp="1"/>
+          </p:cNvSpPr>
+          <p:nvPr>
+            <p:ph type="sldNum" sz="quarter" idx="10"/>
+          </p:nvPr>
+        </p:nvSpPr>
+        <p:spPr/>
+        <p:txBody>
+          <a:bodyPr/>
+          <a:lstStyle/>
+          <a:p>
+            <a:fld id="{602530D3-6148-4146-9286-D1F8EFC3221F}" type="slidenum">
+              <a:rPr lang="en-US" smtClean="0"/>
+              <a:t>19</a:t>
+            </a:fld>
+            <a:endParaRPr lang="en-US"/>
+          </a:p>
+        </p:txBody>
+      </p:sp>
+    </p:spTree>
+    <p:extLst>
+      <p:ext uri="{BB962C8B-B14F-4D97-AF65-F5344CB8AC3E}">
+        <p14:creationId xmlns:p14="http://schemas.microsoft.com/office/powerpoint/2010/main" val="4054385580"/>
       </p:ext>
     </p:extLst>
   </p:cSld>
@@ -15920,7 +16247,7 @@
             <a:fld id="{B61BEF0D-F0BB-DE4B-95CE-6DB70DBA9567}" type="datetimeFigureOut">
               <a:rPr lang="en-US" dirty="0"/>
               <a:pPr/>
-              <a:t>11/29/2015</a:t>
+              <a:t>12/2/2015</a:t>
             </a:fld>
             <a:endParaRPr lang="en-US" dirty="0"/>
           </a:p>
@@ -16241,7 +16568,7 @@
             <a:fld id="{B61BEF0D-F0BB-DE4B-95CE-6DB70DBA9567}" type="datetimeFigureOut">
               <a:rPr lang="en-US" dirty="0"/>
               <a:pPr/>
-              <a:t>11/29/2015</a:t>
+              <a:t>12/2/2015</a:t>
             </a:fld>
             <a:endParaRPr lang="en-US" dirty="0"/>
           </a:p>
@@ -16486,7 +16813,7 @@
             <a:fld id="{B61BEF0D-F0BB-DE4B-95CE-6DB70DBA9567}" type="datetimeFigureOut">
               <a:rPr lang="en-US" dirty="0"/>
               <a:pPr/>
-              <a:t>11/29/2015</a:t>
+              <a:t>12/2/2015</a:t>
             </a:fld>
             <a:endParaRPr lang="en-US" dirty="0"/>
           </a:p>
@@ -16822,7 +17149,7 @@
             <a:fld id="{B61BEF0D-F0BB-DE4B-95CE-6DB70DBA9567}" type="datetimeFigureOut">
               <a:rPr lang="en-US" dirty="0"/>
               <a:pPr/>
-              <a:t>11/29/2015</a:t>
+              <a:t>12/2/2015</a:t>
             </a:fld>
             <a:endParaRPr lang="en-US" dirty="0"/>
           </a:p>
@@ -17166,7 +17493,7 @@
             <a:fld id="{B61BEF0D-F0BB-DE4B-95CE-6DB70DBA9567}" type="datetimeFigureOut">
               <a:rPr lang="en-US" dirty="0"/>
               <a:pPr/>
-              <a:t>11/29/2015</a:t>
+              <a:t>12/2/2015</a:t>
             </a:fld>
             <a:endParaRPr lang="en-US" dirty="0"/>
           </a:p>
@@ -17537,7 +17864,7 @@
             <a:fld id="{B61BEF0D-F0BB-DE4B-95CE-6DB70DBA9567}" type="datetimeFigureOut">
               <a:rPr lang="en-US" dirty="0"/>
               <a:pPr/>
-              <a:t>11/29/2015</a:t>
+              <a:t>12/2/2015</a:t>
             </a:fld>
             <a:endParaRPr lang="en-US" dirty="0"/>
           </a:p>
@@ -18004,7 +18331,7 @@
             <a:fld id="{B61BEF0D-F0BB-DE4B-95CE-6DB70DBA9567}" type="datetimeFigureOut">
               <a:rPr lang="en-US" dirty="0"/>
               <a:pPr/>
-              <a:t>11/29/2015</a:t>
+              <a:t>12/2/2015</a:t>
             </a:fld>
             <a:endParaRPr lang="en-US" dirty="0"/>
           </a:p>
@@ -18206,7 +18533,7 @@
             <a:fld id="{B61BEF0D-F0BB-DE4B-95CE-6DB70DBA9567}" type="datetimeFigureOut">
               <a:rPr lang="en-US" dirty="0"/>
               <a:pPr/>
-              <a:t>11/29/2015</a:t>
+              <a:t>12/2/2015</a:t>
             </a:fld>
             <a:endParaRPr lang="en-US" dirty="0"/>
           </a:p>
@@ -18414,7 +18741,7 @@
             <a:fld id="{B61BEF0D-F0BB-DE4B-95CE-6DB70DBA9567}" type="datetimeFigureOut">
               <a:rPr lang="en-US" dirty="0"/>
               <a:pPr/>
-              <a:t>11/29/2015</a:t>
+              <a:t>12/2/2015</a:t>
             </a:fld>
             <a:endParaRPr lang="en-US" dirty="0"/>
           </a:p>
@@ -18642,7 +18969,7 @@
           <a:p>
             <a:fld id="{05BFA754-D5C3-4E66-96A6-867B257F58DC}" type="datetimeFigureOut">
               <a:rPr lang="en-US" dirty="0"/>
-              <a:t>11/29/2015</a:t>
+              <a:t>12/2/2015</a:t>
             </a:fld>
             <a:endParaRPr lang="en-US" dirty="0"/>
           </a:p>
@@ -18886,7 +19213,7 @@
             <a:fld id="{B61BEF0D-F0BB-DE4B-95CE-6DB70DBA9567}" type="datetimeFigureOut">
               <a:rPr lang="en-US" dirty="0"/>
               <a:pPr/>
-              <a:t>11/29/2015</a:t>
+              <a:t>12/2/2015</a:t>
             </a:fld>
             <a:endParaRPr lang="en-US" dirty="0"/>
           </a:p>
@@ -19149,7 +19476,7 @@
           <a:p>
             <a:fld id="{05BFA754-D5C3-4E66-96A6-867B257F58DC}" type="datetimeFigureOut">
               <a:rPr lang="en-US" dirty="0"/>
-              <a:t>11/29/2015</a:t>
+              <a:t>12/2/2015</a:t>
             </a:fld>
             <a:endParaRPr lang="en-US" dirty="0"/>
           </a:p>
@@ -19558,7 +19885,7 @@
             <a:fld id="{B61BEF0D-F0BB-DE4B-95CE-6DB70DBA9567}" type="datetimeFigureOut">
               <a:rPr lang="en-US" dirty="0"/>
               <a:pPr/>
-              <a:t>11/29/2015</a:t>
+              <a:t>12/2/2015</a:t>
             </a:fld>
             <a:endParaRPr lang="en-US" dirty="0"/>
           </a:p>
@@ -19704,7 +20031,7 @@
             <a:fld id="{B61BEF0D-F0BB-DE4B-95CE-6DB70DBA9567}" type="datetimeFigureOut">
               <a:rPr lang="en-US" dirty="0"/>
               <a:pPr/>
-              <a:t>11/29/2015</a:t>
+              <a:t>12/2/2015</a:t>
             </a:fld>
             <a:endParaRPr lang="en-US" dirty="0"/>
           </a:p>
@@ -19827,7 +20154,7 @@
             <a:fld id="{B61BEF0D-F0BB-DE4B-95CE-6DB70DBA9567}" type="datetimeFigureOut">
               <a:rPr lang="en-US" dirty="0"/>
               <a:pPr/>
-              <a:t>11/29/2015</a:t>
+              <a:t>12/2/2015</a:t>
             </a:fld>
             <a:endParaRPr lang="en-US" dirty="0"/>
           </a:p>
@@ -20079,7 +20406,7 @@
             <a:fld id="{B61BEF0D-F0BB-DE4B-95CE-6DB70DBA9567}" type="datetimeFigureOut">
               <a:rPr lang="en-US" dirty="0"/>
               <a:pPr/>
-              <a:t>11/29/2015</a:t>
+              <a:t>12/2/2015</a:t>
             </a:fld>
             <a:endParaRPr lang="en-US" dirty="0"/>
           </a:p>
@@ -20391,7 +20718,7 @@
             <a:fld id="{B61BEF0D-F0BB-DE4B-95CE-6DB70DBA9567}" type="datetimeFigureOut">
               <a:rPr lang="en-US" dirty="0"/>
               <a:pPr/>
-              <a:t>11/29/2015</a:t>
+              <a:t>12/2/2015</a:t>
             </a:fld>
             <a:endParaRPr lang="en-US" dirty="0"/>
           </a:p>
@@ -20739,7 +21066,7 @@
             <a:fld id="{B61BEF0D-F0BB-DE4B-95CE-6DB70DBA9567}" type="datetimeFigureOut">
               <a:rPr lang="en-US" dirty="0"/>
               <a:pPr/>
-              <a:t>11/29/2015</a:t>
+              <a:t>12/2/2015</a:t>
             </a:fld>
             <a:endParaRPr lang="en-US" dirty="0"/>
           </a:p>
@@ -21350,6 +21677,133 @@
         </p:nvSpPr>
         <p:spPr/>
         <p:txBody>
+          <a:bodyPr/>
+          <a:lstStyle/>
+          <a:p>
+            <a:r>
+              <a:rPr lang="en-US" dirty="0" smtClean="0"/>
+              <a:t>The Algorithm: Step 0</a:t>
+            </a:r>
+            <a:endParaRPr lang="en-US" dirty="0"/>
+          </a:p>
+        </p:txBody>
+      </p:sp>
+      <p:graphicFrame>
+        <p:nvGraphicFramePr>
+          <p:cNvPr id="4" name="Content Placeholder 3"/>
+          <p:cNvGraphicFramePr>
+            <a:graphicFrameLocks noGrp="1"/>
+          </p:cNvGraphicFramePr>
+          <p:nvPr>
+            <p:ph idx="1"/>
+            <p:extLst>
+              <p:ext uri="{D42A27DB-BD31-4B8C-83A1-F6EECF244321}">
+                <p14:modId xmlns:p14="http://schemas.microsoft.com/office/powerpoint/2010/main" val="2794503589"/>
+              </p:ext>
+            </p:extLst>
+          </p:nvPr>
+        </p:nvGraphicFramePr>
+        <p:xfrm>
+          <a:off x="1295400" y="2557463"/>
+          <a:ext cx="4787348" cy="3317875"/>
+        </p:xfrm>
+        <a:graphic>
+          <a:graphicData uri="http://schemas.openxmlformats.org/drawingml/2006/diagram">
+            <dgm:relIds xmlns:dgm="http://schemas.openxmlformats.org/drawingml/2006/diagram" xmlns:r="http://schemas.openxmlformats.org/officeDocument/2006/relationships" r:dm="rId3" r:lo="rId4" r:qs="rId5" r:cs="rId6"/>
+          </a:graphicData>
+        </a:graphic>
+      </p:graphicFrame>
+      <p:graphicFrame>
+        <p:nvGraphicFramePr>
+          <p:cNvPr id="8" name="Diagram 7"/>
+          <p:cNvGraphicFramePr/>
+          <p:nvPr>
+            <p:extLst>
+              <p:ext uri="{D42A27DB-BD31-4B8C-83A1-F6EECF244321}">
+                <p14:modId xmlns:p14="http://schemas.microsoft.com/office/powerpoint/2010/main" val="1267885093"/>
+              </p:ext>
+            </p:extLst>
+          </p:nvPr>
+        </p:nvGraphicFramePr>
+        <p:xfrm>
+          <a:off x="1295402" y="2514600"/>
+          <a:ext cx="4787346" cy="3667539"/>
+        </p:xfrm>
+        <a:graphic>
+          <a:graphicData uri="http://schemas.openxmlformats.org/drawingml/2006/diagram">
+            <dgm:relIds xmlns:dgm="http://schemas.openxmlformats.org/drawingml/2006/diagram" xmlns:r="http://schemas.openxmlformats.org/officeDocument/2006/relationships" r:dm="rId8" r:lo="rId9" r:qs="rId10" r:cs="rId11"/>
+          </a:graphicData>
+        </a:graphic>
+      </p:graphicFrame>
+      <p:graphicFrame>
+        <p:nvGraphicFramePr>
+          <p:cNvPr id="9" name="Diagram 8"/>
+          <p:cNvGraphicFramePr/>
+          <p:nvPr>
+            <p:extLst>
+              <p:ext uri="{D42A27DB-BD31-4B8C-83A1-F6EECF244321}">
+                <p14:modId xmlns:p14="http://schemas.microsoft.com/office/powerpoint/2010/main" val="701157009"/>
+              </p:ext>
+            </p:extLst>
+          </p:nvPr>
+        </p:nvGraphicFramePr>
+        <p:xfrm>
+          <a:off x="6348894" y="2484783"/>
+          <a:ext cx="4547704" cy="3633672"/>
+        </p:xfrm>
+        <a:graphic>
+          <a:graphicData uri="http://schemas.openxmlformats.org/drawingml/2006/diagram">
+            <dgm:relIds xmlns:dgm="http://schemas.openxmlformats.org/drawingml/2006/diagram" xmlns:r="http://schemas.openxmlformats.org/officeDocument/2006/relationships" r:dm="rId13" r:lo="rId14" r:qs="rId15" r:cs="rId16"/>
+          </a:graphicData>
+        </a:graphic>
+      </p:graphicFrame>
+    </p:spTree>
+    <p:extLst>
+      <p:ext uri="{BB962C8B-B14F-4D97-AF65-F5344CB8AC3E}">
+        <p14:creationId xmlns:p14="http://schemas.microsoft.com/office/powerpoint/2010/main" val="2522614037"/>
+      </p:ext>
+    </p:extLst>
+  </p:cSld>
+  <p:clrMapOvr>
+    <a:masterClrMapping/>
+  </p:clrMapOvr>
+</p:sld>
+</file>
+
+<file path=ppt/slides/slide11.xml><?xml version="1.0" encoding="utf-8"?>
+<p:sld xmlns:a="http://schemas.openxmlformats.org/drawingml/2006/main" xmlns:r="http://schemas.openxmlformats.org/officeDocument/2006/relationships" xmlns:p="http://schemas.openxmlformats.org/presentationml/2006/main">
+  <p:cSld>
+    <p:spTree>
+      <p:nvGrpSpPr>
+        <p:cNvPr id="1" name=""/>
+        <p:cNvGrpSpPr/>
+        <p:nvPr/>
+      </p:nvGrpSpPr>
+      <p:grpSpPr>
+        <a:xfrm>
+          <a:off x="0" y="0"/>
+          <a:ext cx="0" cy="0"/>
+          <a:chOff x="0" y="0"/>
+          <a:chExt cx="0" cy="0"/>
+        </a:xfrm>
+      </p:grpSpPr>
+      <p:sp>
+        <p:nvSpPr>
+          <p:cNvPr id="2" name="Title 1"/>
+          <p:cNvSpPr>
+            <a:spLocks noGrp="1"/>
+          </p:cNvSpPr>
+          <p:nvPr>
+            <p:ph type="title"/>
+          </p:nvPr>
+        </p:nvSpPr>
+        <p:spPr>
+          <a:xfrm>
+            <a:off x="1295401" y="611429"/>
+            <a:ext cx="9601196" cy="1303867"/>
+          </a:xfrm>
+        </p:spPr>
+        <p:txBody>
           <a:bodyPr>
             <a:normAutofit fontScale="90000"/>
           </a:bodyPr>
@@ -21393,6 +21847,36 @@
           </a:p>
         </p:txBody>
       </p:sp>
+      <p:pic>
+        <p:nvPicPr>
+          <p:cNvPr id="4" name="Picture 3"/>
+          <p:cNvPicPr>
+            <a:picLocks noChangeAspect="1"/>
+          </p:cNvPicPr>
+          <p:nvPr/>
+        </p:nvPicPr>
+        <p:blipFill>
+          <a:blip r:embed="rId2">
+            <a:extLst>
+              <a:ext uri="{28A0092B-C50C-407E-A947-70E740481C1C}">
+                <a14:useLocalDpi xmlns:a14="http://schemas.microsoft.com/office/drawing/2010/main" val="0"/>
+              </a:ext>
+            </a:extLst>
+          </a:blip>
+          <a:stretch>
+            <a:fillRect/>
+          </a:stretch>
+        </p:blipFill>
+        <p:spPr>
+          <a:xfrm>
+            <a:off x="0" y="0"/>
+            <a:ext cx="12202233" cy="6858000"/>
+          </a:xfrm>
+          <a:prstGeom prst="rect">
+            <a:avLst/>
+          </a:prstGeom>
+        </p:spPr>
+      </p:pic>
     </p:spTree>
     <p:extLst>
       <p:ext uri="{BB962C8B-B14F-4D97-AF65-F5344CB8AC3E}">
@@ -21406,7 +21890,7 @@
 </p:sld>
 </file>
 
-<file path=ppt/slides/slide11.xml><?xml version="1.0" encoding="utf-8"?>
+<file path=ppt/slides/slide12.xml><?xml version="1.0" encoding="utf-8"?>
 <p:sld xmlns:a="http://schemas.openxmlformats.org/drawingml/2006/main" xmlns:r="http://schemas.openxmlformats.org/officeDocument/2006/relationships" xmlns:p="http://schemas.openxmlformats.org/presentationml/2006/main">
   <p:cSld>
     <p:spTree>
@@ -21478,6 +21962,36 @@
           </a:p>
         </p:txBody>
       </p:sp>
+      <p:pic>
+        <p:nvPicPr>
+          <p:cNvPr id="4" name="Picture 3"/>
+          <p:cNvPicPr>
+            <a:picLocks noChangeAspect="1"/>
+          </p:cNvPicPr>
+          <p:nvPr/>
+        </p:nvPicPr>
+        <p:blipFill>
+          <a:blip r:embed="rId2">
+            <a:extLst>
+              <a:ext uri="{28A0092B-C50C-407E-A947-70E740481C1C}">
+                <a14:useLocalDpi xmlns:a14="http://schemas.microsoft.com/office/drawing/2010/main" val="0"/>
+              </a:ext>
+            </a:extLst>
+          </a:blip>
+          <a:stretch>
+            <a:fillRect/>
+          </a:stretch>
+        </p:blipFill>
+        <p:spPr>
+          <a:xfrm>
+            <a:off x="0" y="0"/>
+            <a:ext cx="12192000" cy="6858000"/>
+          </a:xfrm>
+          <a:prstGeom prst="rect">
+            <a:avLst/>
+          </a:prstGeom>
+        </p:spPr>
+      </p:pic>
     </p:spTree>
     <p:extLst>
       <p:ext uri="{BB962C8B-B14F-4D97-AF65-F5344CB8AC3E}">
@@ -21491,7 +22005,7 @@
 </p:sld>
 </file>
 
-<file path=ppt/slides/slide12.xml><?xml version="1.0" encoding="utf-8"?>
+<file path=ppt/slides/slide13.xml><?xml version="1.0" encoding="utf-8"?>
 <p:sld xmlns:a="http://schemas.openxmlformats.org/drawingml/2006/main" xmlns:r="http://schemas.openxmlformats.org/officeDocument/2006/relationships" xmlns:p="http://schemas.openxmlformats.org/presentationml/2006/main">
   <p:cSld>
     <p:spTree>
@@ -21563,6 +22077,36 @@
           </a:p>
         </p:txBody>
       </p:sp>
+      <p:pic>
+        <p:nvPicPr>
+          <p:cNvPr id="4" name="Picture 3"/>
+          <p:cNvPicPr>
+            <a:picLocks noChangeAspect="1"/>
+          </p:cNvPicPr>
+          <p:nvPr/>
+        </p:nvPicPr>
+        <p:blipFill>
+          <a:blip r:embed="rId2">
+            <a:extLst>
+              <a:ext uri="{28A0092B-C50C-407E-A947-70E740481C1C}">
+                <a14:useLocalDpi xmlns:a14="http://schemas.microsoft.com/office/drawing/2010/main" val="0"/>
+              </a:ext>
+            </a:extLst>
+          </a:blip>
+          <a:stretch>
+            <a:fillRect/>
+          </a:stretch>
+        </p:blipFill>
+        <p:spPr>
+          <a:xfrm>
+            <a:off x="0" y="0"/>
+            <a:ext cx="12192000" cy="6858000"/>
+          </a:xfrm>
+          <a:prstGeom prst="rect">
+            <a:avLst/>
+          </a:prstGeom>
+        </p:spPr>
+      </p:pic>
     </p:spTree>
     <p:extLst>
       <p:ext uri="{BB962C8B-B14F-4D97-AF65-F5344CB8AC3E}">
@@ -21576,7 +22120,7 @@
 </p:sld>
 </file>
 
-<file path=ppt/slides/slide13.xml><?xml version="1.0" encoding="utf-8"?>
+<file path=ppt/slides/slide14.xml><?xml version="1.0" encoding="utf-8"?>
 <p:sld xmlns:a="http://schemas.openxmlformats.org/drawingml/2006/main" xmlns:r="http://schemas.openxmlformats.org/officeDocument/2006/relationships" xmlns:p="http://schemas.openxmlformats.org/presentationml/2006/main">
   <p:cSld>
     <p:spTree>
@@ -21648,6 +22192,36 @@
           </a:p>
         </p:txBody>
       </p:sp>
+      <p:pic>
+        <p:nvPicPr>
+          <p:cNvPr id="4" name="Picture 3"/>
+          <p:cNvPicPr>
+            <a:picLocks noChangeAspect="1"/>
+          </p:cNvPicPr>
+          <p:nvPr/>
+        </p:nvPicPr>
+        <p:blipFill>
+          <a:blip r:embed="rId2">
+            <a:extLst>
+              <a:ext uri="{28A0092B-C50C-407E-A947-70E740481C1C}">
+                <a14:useLocalDpi xmlns:a14="http://schemas.microsoft.com/office/drawing/2010/main" val="0"/>
+              </a:ext>
+            </a:extLst>
+          </a:blip>
+          <a:stretch>
+            <a:fillRect/>
+          </a:stretch>
+        </p:blipFill>
+        <p:spPr>
+          <a:xfrm>
+            <a:off x="0" y="-1"/>
+            <a:ext cx="12192000" cy="6858001"/>
+          </a:xfrm>
+          <a:prstGeom prst="rect">
+            <a:avLst/>
+          </a:prstGeom>
+        </p:spPr>
+      </p:pic>
     </p:spTree>
     <p:extLst>
       <p:ext uri="{BB962C8B-B14F-4D97-AF65-F5344CB8AC3E}">
@@ -21661,7 +22235,7 @@
 </p:sld>
 </file>
 
-<file path=ppt/slides/slide14.xml><?xml version="1.0" encoding="utf-8"?>
+<file path=ppt/slides/slide15.xml><?xml version="1.0" encoding="utf-8"?>
 <p:sld xmlns:a="http://schemas.openxmlformats.org/drawingml/2006/main" xmlns:r="http://schemas.openxmlformats.org/officeDocument/2006/relationships" xmlns:p="http://schemas.openxmlformats.org/presentationml/2006/main">
   <p:cSld>
     <p:spTree>
@@ -21733,6 +22307,36 @@
           </a:p>
         </p:txBody>
       </p:sp>
+      <p:pic>
+        <p:nvPicPr>
+          <p:cNvPr id="4" name="Picture 3"/>
+          <p:cNvPicPr>
+            <a:picLocks noChangeAspect="1"/>
+          </p:cNvPicPr>
+          <p:nvPr/>
+        </p:nvPicPr>
+        <p:blipFill>
+          <a:blip r:embed="rId2">
+            <a:extLst>
+              <a:ext uri="{28A0092B-C50C-407E-A947-70E740481C1C}">
+                <a14:useLocalDpi xmlns:a14="http://schemas.microsoft.com/office/drawing/2010/main" val="0"/>
+              </a:ext>
+            </a:extLst>
+          </a:blip>
+          <a:stretch>
+            <a:fillRect/>
+          </a:stretch>
+        </p:blipFill>
+        <p:spPr>
+          <a:xfrm>
+            <a:off x="0" y="0"/>
+            <a:ext cx="12192000" cy="6859666"/>
+          </a:xfrm>
+          <a:prstGeom prst="rect">
+            <a:avLst/>
+          </a:prstGeom>
+        </p:spPr>
+      </p:pic>
     </p:spTree>
     <p:extLst>
       <p:ext uri="{BB962C8B-B14F-4D97-AF65-F5344CB8AC3E}">
@@ -21746,7 +22350,7 @@
 </p:sld>
 </file>
 
-<file path=ppt/slides/slide15.xml><?xml version="1.0" encoding="utf-8"?>
+<file path=ppt/slides/slide16.xml><?xml version="1.0" encoding="utf-8"?>
 <p:sld xmlns:a="http://schemas.openxmlformats.org/drawingml/2006/main" xmlns:r="http://schemas.openxmlformats.org/officeDocument/2006/relationships" xmlns:p="http://schemas.openxmlformats.org/presentationml/2006/main">
   <p:cSld>
     <p:spTree>
@@ -21818,6 +22422,36 @@
           </a:p>
         </p:txBody>
       </p:sp>
+      <p:pic>
+        <p:nvPicPr>
+          <p:cNvPr id="4" name="Picture 3"/>
+          <p:cNvPicPr>
+            <a:picLocks noChangeAspect="1"/>
+          </p:cNvPicPr>
+          <p:nvPr/>
+        </p:nvPicPr>
+        <p:blipFill>
+          <a:blip r:embed="rId2">
+            <a:extLst>
+              <a:ext uri="{28A0092B-C50C-407E-A947-70E740481C1C}">
+                <a14:useLocalDpi xmlns:a14="http://schemas.microsoft.com/office/drawing/2010/main" val="0"/>
+              </a:ext>
+            </a:extLst>
+          </a:blip>
+          <a:stretch>
+            <a:fillRect/>
+          </a:stretch>
+        </p:blipFill>
+        <p:spPr>
+          <a:xfrm>
+            <a:off x="0" y="0"/>
+            <a:ext cx="12192000" cy="6844997"/>
+          </a:xfrm>
+          <a:prstGeom prst="rect">
+            <a:avLst/>
+          </a:prstGeom>
+        </p:spPr>
+      </p:pic>
     </p:spTree>
     <p:extLst>
       <p:ext uri="{BB962C8B-B14F-4D97-AF65-F5344CB8AC3E}">
@@ -21831,7 +22465,7 @@
 </p:sld>
 </file>
 
-<file path=ppt/slides/slide16.xml><?xml version="1.0" encoding="utf-8"?>
+<file path=ppt/slides/slide17.xml><?xml version="1.0" encoding="utf-8"?>
 <p:sld xmlns:a="http://schemas.openxmlformats.org/drawingml/2006/main" xmlns:r="http://schemas.openxmlformats.org/officeDocument/2006/relationships" xmlns:p="http://schemas.openxmlformats.org/presentationml/2006/main">
   <p:cSld>
     <p:spTree>
@@ -21861,52 +22495,2419 @@
         <p:spPr/>
         <p:txBody>
           <a:bodyPr>
-            <a:normAutofit fontScale="90000"/>
+            <a:normAutofit/>
           </a:bodyPr>
           <a:lstStyle/>
           <a:p>
             <a:r>
               <a:rPr lang="en-US" dirty="0" smtClean="0"/>
-              <a:t>The Algorithm: Loop</a:t>
+              <a:t>Loop until </a:t>
             </a:r>
-            <a:br>
-              <a:rPr lang="en-US" dirty="0" smtClean="0"/>
-            </a:br>
             <a:r>
               <a:rPr lang="en-US" dirty="0" smtClean="0"/>
-              <a:t>Repeat steps 3-6 until a good solution is reached</a:t>
+              <a:t>a good solution is reached</a:t>
             </a:r>
             <a:endParaRPr lang="en-US" dirty="0"/>
           </a:p>
         </p:txBody>
       </p:sp>
+      <p:pic>
+        <p:nvPicPr>
+          <p:cNvPr id="4" name="Picture 3"/>
+          <p:cNvPicPr>
+            <a:picLocks noChangeAspect="1"/>
+          </p:cNvPicPr>
+          <p:nvPr/>
+        </p:nvPicPr>
+        <p:blipFill>
+          <a:blip r:embed="rId2">
+            <a:extLst>
+              <a:ext uri="{28A0092B-C50C-407E-A947-70E740481C1C}">
+                <a14:useLocalDpi xmlns:a14="http://schemas.microsoft.com/office/drawing/2010/main" val="0"/>
+              </a:ext>
+            </a:extLst>
+          </a:blip>
+          <a:stretch>
+            <a:fillRect/>
+          </a:stretch>
+        </p:blipFill>
+        <p:spPr>
+          <a:xfrm>
+            <a:off x="717990" y="3335408"/>
+            <a:ext cx="10756017" cy="1236592"/>
+          </a:xfrm>
+          <a:prstGeom prst="rect">
+            <a:avLst/>
+          </a:prstGeom>
+        </p:spPr>
+      </p:pic>
+    </p:spTree>
+    <p:extLst>
+      <p:ext uri="{BB962C8B-B14F-4D97-AF65-F5344CB8AC3E}">
+        <p14:creationId xmlns:p14="http://schemas.microsoft.com/office/powerpoint/2010/main" val="209684599"/>
+      </p:ext>
+    </p:extLst>
+  </p:cSld>
+  <p:clrMapOvr>
+    <a:masterClrMapping/>
+  </p:clrMapOvr>
+</p:sld>
+</file>
+
+<file path=ppt/slides/slide18.xml><?xml version="1.0" encoding="utf-8"?>
+<p:sld xmlns:a="http://schemas.openxmlformats.org/drawingml/2006/main" xmlns:r="http://schemas.openxmlformats.org/officeDocument/2006/relationships" xmlns:p="http://schemas.openxmlformats.org/presentationml/2006/main">
+  <p:cSld>
+    <p:spTree>
+      <p:nvGrpSpPr>
+        <p:cNvPr id="1" name=""/>
+        <p:cNvGrpSpPr/>
+        <p:nvPr/>
+      </p:nvGrpSpPr>
+      <p:grpSpPr>
+        <a:xfrm>
+          <a:off x="0" y="0"/>
+          <a:ext cx="0" cy="0"/>
+          <a:chOff x="0" y="0"/>
+          <a:chExt cx="0" cy="0"/>
+        </a:xfrm>
+      </p:grpSpPr>
       <p:sp>
         <p:nvSpPr>
-          <p:cNvPr id="3" name="Content Placeholder 2"/>
+          <p:cNvPr id="2" name="Title 1"/>
           <p:cNvSpPr>
             <a:spLocks noGrp="1"/>
           </p:cNvSpPr>
           <p:nvPr>
-            <p:ph idx="1"/>
+            <p:ph type="title"/>
           </p:nvPr>
         </p:nvSpPr>
-        <p:spPr/>
+        <p:spPr>
+          <a:xfrm>
+            <a:off x="1303638" y="450792"/>
+            <a:ext cx="9601196" cy="1303867"/>
+          </a:xfrm>
+        </p:spPr>
         <p:txBody>
-          <a:bodyPr/>
+          <a:bodyPr>
+            <a:normAutofit/>
+          </a:bodyPr>
           <a:lstStyle/>
           <a:p>
             <a:r>
               <a:rPr lang="en-US" dirty="0" smtClean="0"/>
-              <a:t>Add in tables</a:t>
+              <a:t>Algorithm Analysis and Critique</a:t>
             </a:r>
             <a:endParaRPr lang="en-US" dirty="0"/>
           </a:p>
         </p:txBody>
       </p:sp>
+      <p:pic>
+        <p:nvPicPr>
+          <p:cNvPr id="1026" name="Picture 2" descr="gensvstime.png"/>
+          <p:cNvPicPr>
+            <a:picLocks noChangeAspect="1" noChangeArrowheads="1"/>
+          </p:cNvPicPr>
+          <p:nvPr/>
+        </p:nvPicPr>
+        <p:blipFill>
+          <a:blip r:embed="rId3">
+            <a:extLst>
+              <a:ext uri="{28A0092B-C50C-407E-A947-70E740481C1C}">
+                <a14:useLocalDpi xmlns:a14="http://schemas.microsoft.com/office/drawing/2010/main" val="0"/>
+              </a:ext>
+            </a:extLst>
+          </a:blip>
+          <a:srcRect/>
+          <a:stretch>
+            <a:fillRect/>
+          </a:stretch>
+        </p:blipFill>
+        <p:spPr bwMode="auto">
+          <a:xfrm>
+            <a:off x="630193" y="1496406"/>
+            <a:ext cx="10948087" cy="4728267"/>
+          </a:xfrm>
+          <a:prstGeom prst="rect">
+            <a:avLst/>
+          </a:prstGeom>
+          <a:noFill/>
+          <a:extLst>
+            <a:ext uri="{909E8E84-426E-40DD-AFC4-6F175D3DCCD1}">
+              <a14:hiddenFill xmlns:a14="http://schemas.microsoft.com/office/drawing/2010/main">
+                <a:solidFill>
+                  <a:srgbClr val="FFFFFF"/>
+                </a:solidFill>
+              </a14:hiddenFill>
+            </a:ext>
+          </a:extLst>
+        </p:spPr>
+      </p:pic>
     </p:spTree>
     <p:extLst>
       <p:ext uri="{BB962C8B-B14F-4D97-AF65-F5344CB8AC3E}">
-        <p14:creationId xmlns:p14="http://schemas.microsoft.com/office/powerpoint/2010/main" val="209684599"/>
+        <p14:creationId xmlns:p14="http://schemas.microsoft.com/office/powerpoint/2010/main" val="2685435018"/>
+      </p:ext>
+    </p:extLst>
+  </p:cSld>
+  <p:clrMapOvr>
+    <a:masterClrMapping/>
+  </p:clrMapOvr>
+</p:sld>
+</file>
+
+<file path=ppt/slides/slide19.xml><?xml version="1.0" encoding="utf-8"?>
+<p:sld xmlns:a="http://schemas.openxmlformats.org/drawingml/2006/main" xmlns:r="http://schemas.openxmlformats.org/officeDocument/2006/relationships" xmlns:p="http://schemas.openxmlformats.org/presentationml/2006/main">
+  <p:cSld>
+    <p:spTree>
+      <p:nvGrpSpPr>
+        <p:cNvPr id="1" name=""/>
+        <p:cNvGrpSpPr/>
+        <p:nvPr/>
+      </p:nvGrpSpPr>
+      <p:grpSpPr>
+        <a:xfrm>
+          <a:off x="0" y="0"/>
+          <a:ext cx="0" cy="0"/>
+          <a:chOff x="0" y="0"/>
+          <a:chExt cx="0" cy="0"/>
+        </a:xfrm>
+      </p:grpSpPr>
+      <p:sp>
+        <p:nvSpPr>
+          <p:cNvPr id="2" name="Title 1"/>
+          <p:cNvSpPr>
+            <a:spLocks noGrp="1"/>
+          </p:cNvSpPr>
+          <p:nvPr>
+            <p:ph type="title"/>
+          </p:nvPr>
+        </p:nvSpPr>
+        <p:spPr>
+          <a:xfrm>
+            <a:off x="1278925" y="895635"/>
+            <a:ext cx="9601196" cy="1303867"/>
+          </a:xfrm>
+        </p:spPr>
+        <p:txBody>
+          <a:bodyPr>
+            <a:normAutofit/>
+          </a:bodyPr>
+          <a:lstStyle/>
+          <a:p>
+            <a:r>
+              <a:rPr lang="en-US" dirty="0" smtClean="0"/>
+              <a:t>Mean Time Per Generation</a:t>
+            </a:r>
+            <a:endParaRPr lang="en-US" dirty="0"/>
+          </a:p>
+        </p:txBody>
+      </p:sp>
+      <p:graphicFrame>
+        <p:nvGraphicFramePr>
+          <p:cNvPr id="3" name="Table 2"/>
+          <p:cNvGraphicFramePr>
+            <a:graphicFrameLocks noGrp="1"/>
+          </p:cNvGraphicFramePr>
+          <p:nvPr>
+            <p:extLst>
+              <p:ext uri="{D42A27DB-BD31-4B8C-83A1-F6EECF244321}">
+                <p14:modId xmlns:p14="http://schemas.microsoft.com/office/powerpoint/2010/main" val="315235417"/>
+              </p:ext>
+            </p:extLst>
+          </p:nvPr>
+        </p:nvGraphicFramePr>
+        <p:xfrm>
+          <a:off x="632438" y="2483708"/>
+          <a:ext cx="10921132" cy="3756453"/>
+        </p:xfrm>
+        <a:graphic>
+          <a:graphicData uri="http://schemas.openxmlformats.org/drawingml/2006/table">
+            <a:tbl>
+              <a:tblPr/>
+              <a:tblGrid>
+                <a:gridCol w="2730283"/>
+                <a:gridCol w="2730283"/>
+                <a:gridCol w="2730283"/>
+                <a:gridCol w="2730283"/>
+              </a:tblGrid>
+              <a:tr h="611370">
+                <a:tc>
+                  <a:txBody>
+                    <a:bodyPr/>
+                    <a:lstStyle/>
+                    <a:p>
+                      <a:pPr fontAlgn="t"/>
+                      <a:r>
+                        <a:rPr lang="en-US" sz="1300" dirty="0">
+                          <a:effectLst/>
+                        </a:rPr>
+                        <a:t> </a:t>
+                      </a:r>
+                    </a:p>
+                  </a:txBody>
+                  <a:tcPr marL="69586" marR="69586" marT="69586" marB="69586">
+                    <a:lnL w="9525" cap="flat" cmpd="sng" algn="ctr">
+                      <a:solidFill>
+                        <a:srgbClr val="9E9E9E"/>
+                      </a:solidFill>
+                      <a:prstDash val="solid"/>
+                      <a:round/>
+                      <a:headEnd type="none" w="med" len="med"/>
+                      <a:tailEnd type="none" w="med" len="med"/>
+                    </a:lnL>
+                    <a:lnR w="9525" cap="flat" cmpd="sng" algn="ctr">
+                      <a:solidFill>
+                        <a:srgbClr val="9E9E9E"/>
+                      </a:solidFill>
+                      <a:prstDash val="solid"/>
+                      <a:round/>
+                      <a:headEnd type="none" w="med" len="med"/>
+                      <a:tailEnd type="none" w="med" len="med"/>
+                    </a:lnR>
+                    <a:lnT w="9525" cap="flat" cmpd="sng" algn="ctr">
+                      <a:solidFill>
+                        <a:srgbClr val="9E9E9E"/>
+                      </a:solidFill>
+                      <a:prstDash val="solid"/>
+                      <a:round/>
+                      <a:headEnd type="none" w="med" len="med"/>
+                      <a:tailEnd type="none" w="med" len="med"/>
+                    </a:lnT>
+                    <a:lnB w="9525" cap="flat" cmpd="sng" algn="ctr">
+                      <a:solidFill>
+                        <a:srgbClr val="9E9E9E"/>
+                      </a:solidFill>
+                      <a:prstDash val="solid"/>
+                      <a:round/>
+                      <a:headEnd type="none" w="med" len="med"/>
+                      <a:tailEnd type="none" w="med" len="med"/>
+                    </a:lnB>
+                  </a:tcPr>
+                </a:tc>
+                <a:tc>
+                  <a:txBody>
+                    <a:bodyPr/>
+                    <a:lstStyle/>
+                    <a:p>
+                      <a:pPr rtl="0" fontAlgn="t">
+                        <a:spcBef>
+                          <a:spcPts val="0"/>
+                        </a:spcBef>
+                        <a:spcAft>
+                          <a:spcPts val="0"/>
+                        </a:spcAft>
+                      </a:pPr>
+                      <a:r>
+                        <a:rPr lang="en-US" sz="1300" b="0" i="0" u="none" strike="noStrike">
+                          <a:solidFill>
+                            <a:srgbClr val="000000"/>
+                          </a:solidFill>
+                          <a:effectLst/>
+                          <a:latin typeface="Arial" panose="020B0604020202020204" pitchFamily="34" charset="0"/>
+                        </a:rPr>
+                        <a:t>Mean Time</a:t>
+                      </a:r>
+                      <a:endParaRPr lang="en-US" sz="1300">
+                        <a:effectLst/>
+                      </a:endParaRPr>
+                    </a:p>
+                  </a:txBody>
+                  <a:tcPr marL="69586" marR="69586" marT="69586" marB="69586">
+                    <a:lnL w="9525" cap="flat" cmpd="sng" algn="ctr">
+                      <a:solidFill>
+                        <a:srgbClr val="9E9E9E"/>
+                      </a:solidFill>
+                      <a:prstDash val="solid"/>
+                      <a:round/>
+                      <a:headEnd type="none" w="med" len="med"/>
+                      <a:tailEnd type="none" w="med" len="med"/>
+                    </a:lnL>
+                    <a:lnR w="9525" cap="flat" cmpd="sng" algn="ctr">
+                      <a:solidFill>
+                        <a:srgbClr val="9E9E9E"/>
+                      </a:solidFill>
+                      <a:prstDash val="solid"/>
+                      <a:round/>
+                      <a:headEnd type="none" w="med" len="med"/>
+                      <a:tailEnd type="none" w="med" len="med"/>
+                    </a:lnR>
+                    <a:lnT w="9525" cap="flat" cmpd="sng" algn="ctr">
+                      <a:solidFill>
+                        <a:srgbClr val="9E9E9E"/>
+                      </a:solidFill>
+                      <a:prstDash val="solid"/>
+                      <a:round/>
+                      <a:headEnd type="none" w="med" len="med"/>
+                      <a:tailEnd type="none" w="med" len="med"/>
+                    </a:lnT>
+                    <a:lnB w="9525" cap="flat" cmpd="sng" algn="ctr">
+                      <a:solidFill>
+                        <a:srgbClr val="9E9E9E"/>
+                      </a:solidFill>
+                      <a:prstDash val="solid"/>
+                      <a:round/>
+                      <a:headEnd type="none" w="med" len="med"/>
+                      <a:tailEnd type="none" w="med" len="med"/>
+                    </a:lnB>
+                  </a:tcPr>
+                </a:tc>
+                <a:tc>
+                  <a:txBody>
+                    <a:bodyPr/>
+                    <a:lstStyle/>
+                    <a:p>
+                      <a:pPr rtl="0" fontAlgn="t">
+                        <a:spcBef>
+                          <a:spcPts val="0"/>
+                        </a:spcBef>
+                        <a:spcAft>
+                          <a:spcPts val="0"/>
+                        </a:spcAft>
+                      </a:pPr>
+                      <a:r>
+                        <a:rPr lang="en-US" sz="1300" b="0" i="0" u="none" strike="noStrike">
+                          <a:solidFill>
+                            <a:srgbClr val="000000"/>
+                          </a:solidFill>
+                          <a:effectLst/>
+                          <a:latin typeface="Arial" panose="020B0604020202020204" pitchFamily="34" charset="0"/>
+                        </a:rPr>
+                        <a:t>Mean Generations</a:t>
+                      </a:r>
+                      <a:endParaRPr lang="en-US" sz="1300">
+                        <a:effectLst/>
+                      </a:endParaRPr>
+                    </a:p>
+                  </a:txBody>
+                  <a:tcPr marL="69586" marR="69586" marT="69586" marB="69586">
+                    <a:lnL w="9525" cap="flat" cmpd="sng" algn="ctr">
+                      <a:solidFill>
+                        <a:srgbClr val="9E9E9E"/>
+                      </a:solidFill>
+                      <a:prstDash val="solid"/>
+                      <a:round/>
+                      <a:headEnd type="none" w="med" len="med"/>
+                      <a:tailEnd type="none" w="med" len="med"/>
+                    </a:lnL>
+                    <a:lnR w="9525" cap="flat" cmpd="sng" algn="ctr">
+                      <a:solidFill>
+                        <a:srgbClr val="9E9E9E"/>
+                      </a:solidFill>
+                      <a:prstDash val="solid"/>
+                      <a:round/>
+                      <a:headEnd type="none" w="med" len="med"/>
+                      <a:tailEnd type="none" w="med" len="med"/>
+                    </a:lnR>
+                    <a:lnT w="9525" cap="flat" cmpd="sng" algn="ctr">
+                      <a:solidFill>
+                        <a:srgbClr val="9E9E9E"/>
+                      </a:solidFill>
+                      <a:prstDash val="solid"/>
+                      <a:round/>
+                      <a:headEnd type="none" w="med" len="med"/>
+                      <a:tailEnd type="none" w="med" len="med"/>
+                    </a:lnT>
+                    <a:lnB w="9525" cap="flat" cmpd="sng" algn="ctr">
+                      <a:solidFill>
+                        <a:srgbClr val="9E9E9E"/>
+                      </a:solidFill>
+                      <a:prstDash val="solid"/>
+                      <a:round/>
+                      <a:headEnd type="none" w="med" len="med"/>
+                      <a:tailEnd type="none" w="med" len="med"/>
+                    </a:lnB>
+                  </a:tcPr>
+                </a:tc>
+                <a:tc>
+                  <a:txBody>
+                    <a:bodyPr/>
+                    <a:lstStyle/>
+                    <a:p>
+                      <a:pPr rtl="0" fontAlgn="t">
+                        <a:spcBef>
+                          <a:spcPts val="0"/>
+                        </a:spcBef>
+                        <a:spcAft>
+                          <a:spcPts val="0"/>
+                        </a:spcAft>
+                      </a:pPr>
+                      <a:r>
+                        <a:rPr lang="en-US" sz="1300" b="0" i="0" u="none" strike="noStrike" dirty="0">
+                          <a:solidFill>
+                            <a:srgbClr val="000000"/>
+                          </a:solidFill>
+                          <a:effectLst/>
+                          <a:latin typeface="Arial" panose="020B0604020202020204" pitchFamily="34" charset="0"/>
+                        </a:rPr>
+                        <a:t>Mean Time/Generation</a:t>
+                      </a:r>
+                      <a:endParaRPr lang="en-US" sz="1300" dirty="0">
+                        <a:effectLst/>
+                      </a:endParaRPr>
+                    </a:p>
+                  </a:txBody>
+                  <a:tcPr marL="69586" marR="69586" marT="69586" marB="69586">
+                    <a:lnL w="9525" cap="flat" cmpd="sng" algn="ctr">
+                      <a:solidFill>
+                        <a:srgbClr val="9E9E9E"/>
+                      </a:solidFill>
+                      <a:prstDash val="solid"/>
+                      <a:round/>
+                      <a:headEnd type="none" w="med" len="med"/>
+                      <a:tailEnd type="none" w="med" len="med"/>
+                    </a:lnL>
+                    <a:lnR w="9525" cap="flat" cmpd="sng" algn="ctr">
+                      <a:solidFill>
+                        <a:srgbClr val="9E9E9E"/>
+                      </a:solidFill>
+                      <a:prstDash val="solid"/>
+                      <a:round/>
+                      <a:headEnd type="none" w="med" len="med"/>
+                      <a:tailEnd type="none" w="med" len="med"/>
+                    </a:lnR>
+                    <a:lnT w="9525" cap="flat" cmpd="sng" algn="ctr">
+                      <a:solidFill>
+                        <a:srgbClr val="9E9E9E"/>
+                      </a:solidFill>
+                      <a:prstDash val="solid"/>
+                      <a:round/>
+                      <a:headEnd type="none" w="med" len="med"/>
+                      <a:tailEnd type="none" w="med" len="med"/>
+                    </a:lnT>
+                    <a:lnB w="9525" cap="flat" cmpd="sng" algn="ctr">
+                      <a:solidFill>
+                        <a:srgbClr val="9E9E9E"/>
+                      </a:solidFill>
+                      <a:prstDash val="solid"/>
+                      <a:round/>
+                      <a:headEnd type="none" w="med" len="med"/>
+                      <a:tailEnd type="none" w="med" len="med"/>
+                    </a:lnB>
+                    <a:solidFill>
+                      <a:srgbClr val="FFC000"/>
+                    </a:solidFill>
+                  </a:tcPr>
+                </a:tc>
+              </a:tr>
+              <a:tr h="384469">
+                <a:tc>
+                  <a:txBody>
+                    <a:bodyPr/>
+                    <a:lstStyle/>
+                    <a:p>
+                      <a:pPr rtl="0" fontAlgn="t">
+                        <a:spcBef>
+                          <a:spcPts val="0"/>
+                        </a:spcBef>
+                        <a:spcAft>
+                          <a:spcPts val="0"/>
+                        </a:spcAft>
+                      </a:pPr>
+                      <a:r>
+                        <a:rPr lang="en-US" sz="1300" b="0" i="0" u="none" strike="noStrike">
+                          <a:solidFill>
+                            <a:srgbClr val="000000"/>
+                          </a:solidFill>
+                          <a:effectLst/>
+                          <a:latin typeface="Arial" panose="020B0604020202020204" pitchFamily="34" charset="0"/>
+                        </a:rPr>
+                        <a:t>GA</a:t>
+                      </a:r>
+                      <a:endParaRPr lang="en-US" sz="1300">
+                        <a:effectLst/>
+                      </a:endParaRPr>
+                    </a:p>
+                  </a:txBody>
+                  <a:tcPr marL="69586" marR="69586" marT="69586" marB="69586">
+                    <a:lnL w="9525" cap="flat" cmpd="sng" algn="ctr">
+                      <a:solidFill>
+                        <a:srgbClr val="9E9E9E"/>
+                      </a:solidFill>
+                      <a:prstDash val="solid"/>
+                      <a:round/>
+                      <a:headEnd type="none" w="med" len="med"/>
+                      <a:tailEnd type="none" w="med" len="med"/>
+                    </a:lnL>
+                    <a:lnR w="9525" cap="flat" cmpd="sng" algn="ctr">
+                      <a:solidFill>
+                        <a:srgbClr val="9E9E9E"/>
+                      </a:solidFill>
+                      <a:prstDash val="solid"/>
+                      <a:round/>
+                      <a:headEnd type="none" w="med" len="med"/>
+                      <a:tailEnd type="none" w="med" len="med"/>
+                    </a:lnR>
+                    <a:lnT w="9525" cap="flat" cmpd="sng" algn="ctr">
+                      <a:solidFill>
+                        <a:srgbClr val="9E9E9E"/>
+                      </a:solidFill>
+                      <a:prstDash val="solid"/>
+                      <a:round/>
+                      <a:headEnd type="none" w="med" len="med"/>
+                      <a:tailEnd type="none" w="med" len="med"/>
+                    </a:lnT>
+                    <a:lnB w="9525" cap="flat" cmpd="sng" algn="ctr">
+                      <a:solidFill>
+                        <a:srgbClr val="9E9E9E"/>
+                      </a:solidFill>
+                      <a:prstDash val="solid"/>
+                      <a:round/>
+                      <a:headEnd type="none" w="med" len="med"/>
+                      <a:tailEnd type="none" w="med" len="med"/>
+                    </a:lnB>
+                  </a:tcPr>
+                </a:tc>
+                <a:tc>
+                  <a:txBody>
+                    <a:bodyPr/>
+                    <a:lstStyle/>
+                    <a:p>
+                      <a:pPr rtl="0" fontAlgn="t">
+                        <a:spcBef>
+                          <a:spcPts val="0"/>
+                        </a:spcBef>
+                        <a:spcAft>
+                          <a:spcPts val="0"/>
+                        </a:spcAft>
+                      </a:pPr>
+                      <a:r>
+                        <a:rPr lang="en-US" sz="1300" b="0" i="0" u="none" strike="noStrike" dirty="0">
+                          <a:solidFill>
+                            <a:srgbClr val="000000"/>
+                          </a:solidFill>
+                          <a:effectLst/>
+                          <a:latin typeface="Arial" panose="020B0604020202020204" pitchFamily="34" charset="0"/>
+                        </a:rPr>
+                        <a:t>37960.5</a:t>
+                      </a:r>
+                      <a:endParaRPr lang="en-US" sz="1300" dirty="0">
+                        <a:effectLst/>
+                      </a:endParaRPr>
+                    </a:p>
+                  </a:txBody>
+                  <a:tcPr marL="69586" marR="69586" marT="69586" marB="69586">
+                    <a:lnL w="9525" cap="flat" cmpd="sng" algn="ctr">
+                      <a:solidFill>
+                        <a:srgbClr val="9E9E9E"/>
+                      </a:solidFill>
+                      <a:prstDash val="solid"/>
+                      <a:round/>
+                      <a:headEnd type="none" w="med" len="med"/>
+                      <a:tailEnd type="none" w="med" len="med"/>
+                    </a:lnL>
+                    <a:lnR w="9525" cap="flat" cmpd="sng" algn="ctr">
+                      <a:solidFill>
+                        <a:srgbClr val="9E9E9E"/>
+                      </a:solidFill>
+                      <a:prstDash val="solid"/>
+                      <a:round/>
+                      <a:headEnd type="none" w="med" len="med"/>
+                      <a:tailEnd type="none" w="med" len="med"/>
+                    </a:lnR>
+                    <a:lnT w="9525" cap="flat" cmpd="sng" algn="ctr">
+                      <a:solidFill>
+                        <a:srgbClr val="9E9E9E"/>
+                      </a:solidFill>
+                      <a:prstDash val="solid"/>
+                      <a:round/>
+                      <a:headEnd type="none" w="med" len="med"/>
+                      <a:tailEnd type="none" w="med" len="med"/>
+                    </a:lnT>
+                    <a:lnB w="9525" cap="flat" cmpd="sng" algn="ctr">
+                      <a:solidFill>
+                        <a:srgbClr val="9E9E9E"/>
+                      </a:solidFill>
+                      <a:prstDash val="solid"/>
+                      <a:round/>
+                      <a:headEnd type="none" w="med" len="med"/>
+                      <a:tailEnd type="none" w="med" len="med"/>
+                    </a:lnB>
+                  </a:tcPr>
+                </a:tc>
+                <a:tc>
+                  <a:txBody>
+                    <a:bodyPr/>
+                    <a:lstStyle/>
+                    <a:p>
+                      <a:pPr rtl="0" fontAlgn="t">
+                        <a:spcBef>
+                          <a:spcPts val="0"/>
+                        </a:spcBef>
+                        <a:spcAft>
+                          <a:spcPts val="0"/>
+                        </a:spcAft>
+                      </a:pPr>
+                      <a:r>
+                        <a:rPr lang="en-US" sz="1300" b="0" i="0" u="none" strike="noStrike">
+                          <a:solidFill>
+                            <a:srgbClr val="000000"/>
+                          </a:solidFill>
+                          <a:effectLst/>
+                          <a:latin typeface="Arial" panose="020B0604020202020204" pitchFamily="34" charset="0"/>
+                        </a:rPr>
+                        <a:t>291.5</a:t>
+                      </a:r>
+                      <a:endParaRPr lang="en-US" sz="1300">
+                        <a:effectLst/>
+                      </a:endParaRPr>
+                    </a:p>
+                  </a:txBody>
+                  <a:tcPr marL="69586" marR="69586" marT="69586" marB="69586">
+                    <a:lnL w="9525" cap="flat" cmpd="sng" algn="ctr">
+                      <a:solidFill>
+                        <a:srgbClr val="9E9E9E"/>
+                      </a:solidFill>
+                      <a:prstDash val="solid"/>
+                      <a:round/>
+                      <a:headEnd type="none" w="med" len="med"/>
+                      <a:tailEnd type="none" w="med" len="med"/>
+                    </a:lnL>
+                    <a:lnR w="9525" cap="flat" cmpd="sng" algn="ctr">
+                      <a:solidFill>
+                        <a:srgbClr val="9E9E9E"/>
+                      </a:solidFill>
+                      <a:prstDash val="solid"/>
+                      <a:round/>
+                      <a:headEnd type="none" w="med" len="med"/>
+                      <a:tailEnd type="none" w="med" len="med"/>
+                    </a:lnR>
+                    <a:lnT w="9525" cap="flat" cmpd="sng" algn="ctr">
+                      <a:solidFill>
+                        <a:srgbClr val="9E9E9E"/>
+                      </a:solidFill>
+                      <a:prstDash val="solid"/>
+                      <a:round/>
+                      <a:headEnd type="none" w="med" len="med"/>
+                      <a:tailEnd type="none" w="med" len="med"/>
+                    </a:lnT>
+                    <a:lnB w="9525" cap="flat" cmpd="sng" algn="ctr">
+                      <a:solidFill>
+                        <a:srgbClr val="9E9E9E"/>
+                      </a:solidFill>
+                      <a:prstDash val="solid"/>
+                      <a:round/>
+                      <a:headEnd type="none" w="med" len="med"/>
+                      <a:tailEnd type="none" w="med" len="med"/>
+                    </a:lnB>
+                  </a:tcPr>
+                </a:tc>
+                <a:tc>
+                  <a:txBody>
+                    <a:bodyPr/>
+                    <a:lstStyle/>
+                    <a:p>
+                      <a:pPr rtl="0" fontAlgn="t">
+                        <a:spcBef>
+                          <a:spcPts val="0"/>
+                        </a:spcBef>
+                        <a:spcAft>
+                          <a:spcPts val="0"/>
+                        </a:spcAft>
+                      </a:pPr>
+                      <a:r>
+                        <a:rPr lang="en-US" sz="1300" b="0" i="0" u="none" strike="noStrike" dirty="0">
+                          <a:solidFill>
+                            <a:srgbClr val="000000"/>
+                          </a:solidFill>
+                          <a:effectLst/>
+                          <a:latin typeface="Arial" panose="020B0604020202020204" pitchFamily="34" charset="0"/>
+                        </a:rPr>
+                        <a:t>130.2</a:t>
+                      </a:r>
+                      <a:endParaRPr lang="en-US" sz="1300" dirty="0">
+                        <a:effectLst/>
+                      </a:endParaRPr>
+                    </a:p>
+                  </a:txBody>
+                  <a:tcPr marL="69586" marR="69586" marT="69586" marB="69586">
+                    <a:lnL w="9525" cap="flat" cmpd="sng" algn="ctr">
+                      <a:solidFill>
+                        <a:srgbClr val="9E9E9E"/>
+                      </a:solidFill>
+                      <a:prstDash val="solid"/>
+                      <a:round/>
+                      <a:headEnd type="none" w="med" len="med"/>
+                      <a:tailEnd type="none" w="med" len="med"/>
+                    </a:lnL>
+                    <a:lnR w="9525" cap="flat" cmpd="sng" algn="ctr">
+                      <a:solidFill>
+                        <a:srgbClr val="9E9E9E"/>
+                      </a:solidFill>
+                      <a:prstDash val="solid"/>
+                      <a:round/>
+                      <a:headEnd type="none" w="med" len="med"/>
+                      <a:tailEnd type="none" w="med" len="med"/>
+                    </a:lnR>
+                    <a:lnT w="9525" cap="flat" cmpd="sng" algn="ctr">
+                      <a:solidFill>
+                        <a:srgbClr val="9E9E9E"/>
+                      </a:solidFill>
+                      <a:prstDash val="solid"/>
+                      <a:round/>
+                      <a:headEnd type="none" w="med" len="med"/>
+                      <a:tailEnd type="none" w="med" len="med"/>
+                    </a:lnT>
+                    <a:lnB w="9525" cap="flat" cmpd="sng" algn="ctr">
+                      <a:solidFill>
+                        <a:srgbClr val="9E9E9E"/>
+                      </a:solidFill>
+                      <a:prstDash val="solid"/>
+                      <a:round/>
+                      <a:headEnd type="none" w="med" len="med"/>
+                      <a:tailEnd type="none" w="med" len="med"/>
+                    </a:lnB>
+                    <a:solidFill>
+                      <a:srgbClr val="FFC000"/>
+                    </a:solidFill>
+                  </a:tcPr>
+                </a:tc>
+              </a:tr>
+              <a:tr h="384469">
+                <a:tc>
+                  <a:txBody>
+                    <a:bodyPr/>
+                    <a:lstStyle/>
+                    <a:p>
+                      <a:pPr rtl="0" fontAlgn="t">
+                        <a:spcBef>
+                          <a:spcPts val="0"/>
+                        </a:spcBef>
+                        <a:spcAft>
+                          <a:spcPts val="0"/>
+                        </a:spcAft>
+                      </a:pPr>
+                      <a:r>
+                        <a:rPr lang="en-US" sz="1300" b="0" i="0" u="none" strike="noStrike">
+                          <a:solidFill>
+                            <a:srgbClr val="000000"/>
+                          </a:solidFill>
+                          <a:effectLst/>
+                          <a:latin typeface="Arial" panose="020B0604020202020204" pitchFamily="34" charset="0"/>
+                        </a:rPr>
+                        <a:t>Binary GA</a:t>
+                      </a:r>
+                      <a:endParaRPr lang="en-US" sz="1300">
+                        <a:effectLst/>
+                      </a:endParaRPr>
+                    </a:p>
+                  </a:txBody>
+                  <a:tcPr marL="69586" marR="69586" marT="69586" marB="69586">
+                    <a:lnL w="9525" cap="flat" cmpd="sng" algn="ctr">
+                      <a:solidFill>
+                        <a:srgbClr val="9E9E9E"/>
+                      </a:solidFill>
+                      <a:prstDash val="solid"/>
+                      <a:round/>
+                      <a:headEnd type="none" w="med" len="med"/>
+                      <a:tailEnd type="none" w="med" len="med"/>
+                    </a:lnL>
+                    <a:lnR w="9525" cap="flat" cmpd="sng" algn="ctr">
+                      <a:solidFill>
+                        <a:srgbClr val="9E9E9E"/>
+                      </a:solidFill>
+                      <a:prstDash val="solid"/>
+                      <a:round/>
+                      <a:headEnd type="none" w="med" len="med"/>
+                      <a:tailEnd type="none" w="med" len="med"/>
+                    </a:lnR>
+                    <a:lnT w="9525" cap="flat" cmpd="sng" algn="ctr">
+                      <a:solidFill>
+                        <a:srgbClr val="9E9E9E"/>
+                      </a:solidFill>
+                      <a:prstDash val="solid"/>
+                      <a:round/>
+                      <a:headEnd type="none" w="med" len="med"/>
+                      <a:tailEnd type="none" w="med" len="med"/>
+                    </a:lnT>
+                    <a:lnB w="9525" cap="flat" cmpd="sng" algn="ctr">
+                      <a:solidFill>
+                        <a:srgbClr val="9E9E9E"/>
+                      </a:solidFill>
+                      <a:prstDash val="solid"/>
+                      <a:round/>
+                      <a:headEnd type="none" w="med" len="med"/>
+                      <a:tailEnd type="none" w="med" len="med"/>
+                    </a:lnB>
+                  </a:tcPr>
+                </a:tc>
+                <a:tc>
+                  <a:txBody>
+                    <a:bodyPr/>
+                    <a:lstStyle/>
+                    <a:p>
+                      <a:pPr rtl="0" fontAlgn="t">
+                        <a:spcBef>
+                          <a:spcPts val="0"/>
+                        </a:spcBef>
+                        <a:spcAft>
+                          <a:spcPts val="0"/>
+                        </a:spcAft>
+                      </a:pPr>
+                      <a:r>
+                        <a:rPr lang="en-US" sz="1300" b="0" i="0" u="none" strike="noStrike">
+                          <a:solidFill>
+                            <a:srgbClr val="000000"/>
+                          </a:solidFill>
+                          <a:effectLst/>
+                          <a:latin typeface="Arial" panose="020B0604020202020204" pitchFamily="34" charset="0"/>
+                        </a:rPr>
+                        <a:t>101558.1</a:t>
+                      </a:r>
+                      <a:endParaRPr lang="en-US" sz="1300">
+                        <a:effectLst/>
+                      </a:endParaRPr>
+                    </a:p>
+                  </a:txBody>
+                  <a:tcPr marL="69586" marR="69586" marT="69586" marB="69586">
+                    <a:lnL w="9525" cap="flat" cmpd="sng" algn="ctr">
+                      <a:solidFill>
+                        <a:srgbClr val="9E9E9E"/>
+                      </a:solidFill>
+                      <a:prstDash val="solid"/>
+                      <a:round/>
+                      <a:headEnd type="none" w="med" len="med"/>
+                      <a:tailEnd type="none" w="med" len="med"/>
+                    </a:lnL>
+                    <a:lnR w="9525" cap="flat" cmpd="sng" algn="ctr">
+                      <a:solidFill>
+                        <a:srgbClr val="9E9E9E"/>
+                      </a:solidFill>
+                      <a:prstDash val="solid"/>
+                      <a:round/>
+                      <a:headEnd type="none" w="med" len="med"/>
+                      <a:tailEnd type="none" w="med" len="med"/>
+                    </a:lnR>
+                    <a:lnT w="9525" cap="flat" cmpd="sng" algn="ctr">
+                      <a:solidFill>
+                        <a:srgbClr val="9E9E9E"/>
+                      </a:solidFill>
+                      <a:prstDash val="solid"/>
+                      <a:round/>
+                      <a:headEnd type="none" w="med" len="med"/>
+                      <a:tailEnd type="none" w="med" len="med"/>
+                    </a:lnT>
+                    <a:lnB w="9525" cap="flat" cmpd="sng" algn="ctr">
+                      <a:solidFill>
+                        <a:srgbClr val="9E9E9E"/>
+                      </a:solidFill>
+                      <a:prstDash val="solid"/>
+                      <a:round/>
+                      <a:headEnd type="none" w="med" len="med"/>
+                      <a:tailEnd type="none" w="med" len="med"/>
+                    </a:lnB>
+                  </a:tcPr>
+                </a:tc>
+                <a:tc>
+                  <a:txBody>
+                    <a:bodyPr/>
+                    <a:lstStyle/>
+                    <a:p>
+                      <a:pPr rtl="0" fontAlgn="t">
+                        <a:spcBef>
+                          <a:spcPts val="0"/>
+                        </a:spcBef>
+                        <a:spcAft>
+                          <a:spcPts val="0"/>
+                        </a:spcAft>
+                      </a:pPr>
+                      <a:r>
+                        <a:rPr lang="en-US" sz="1300" b="0" i="0" u="none" strike="noStrike">
+                          <a:solidFill>
+                            <a:srgbClr val="000000"/>
+                          </a:solidFill>
+                          <a:effectLst/>
+                          <a:latin typeface="Arial" panose="020B0604020202020204" pitchFamily="34" charset="0"/>
+                        </a:rPr>
+                        <a:t>305.8</a:t>
+                      </a:r>
+                      <a:endParaRPr lang="en-US" sz="1300">
+                        <a:effectLst/>
+                      </a:endParaRPr>
+                    </a:p>
+                  </a:txBody>
+                  <a:tcPr marL="69586" marR="69586" marT="69586" marB="69586">
+                    <a:lnL w="9525" cap="flat" cmpd="sng" algn="ctr">
+                      <a:solidFill>
+                        <a:srgbClr val="9E9E9E"/>
+                      </a:solidFill>
+                      <a:prstDash val="solid"/>
+                      <a:round/>
+                      <a:headEnd type="none" w="med" len="med"/>
+                      <a:tailEnd type="none" w="med" len="med"/>
+                    </a:lnL>
+                    <a:lnR w="9525" cap="flat" cmpd="sng" algn="ctr">
+                      <a:solidFill>
+                        <a:srgbClr val="9E9E9E"/>
+                      </a:solidFill>
+                      <a:prstDash val="solid"/>
+                      <a:round/>
+                      <a:headEnd type="none" w="med" len="med"/>
+                      <a:tailEnd type="none" w="med" len="med"/>
+                    </a:lnR>
+                    <a:lnT w="9525" cap="flat" cmpd="sng" algn="ctr">
+                      <a:solidFill>
+                        <a:srgbClr val="9E9E9E"/>
+                      </a:solidFill>
+                      <a:prstDash val="solid"/>
+                      <a:round/>
+                      <a:headEnd type="none" w="med" len="med"/>
+                      <a:tailEnd type="none" w="med" len="med"/>
+                    </a:lnT>
+                    <a:lnB w="9525" cap="flat" cmpd="sng" algn="ctr">
+                      <a:solidFill>
+                        <a:srgbClr val="9E9E9E"/>
+                      </a:solidFill>
+                      <a:prstDash val="solid"/>
+                      <a:round/>
+                      <a:headEnd type="none" w="med" len="med"/>
+                      <a:tailEnd type="none" w="med" len="med"/>
+                    </a:lnB>
+                  </a:tcPr>
+                </a:tc>
+                <a:tc>
+                  <a:txBody>
+                    <a:bodyPr/>
+                    <a:lstStyle/>
+                    <a:p>
+                      <a:pPr rtl="0" fontAlgn="t">
+                        <a:spcBef>
+                          <a:spcPts val="0"/>
+                        </a:spcBef>
+                        <a:spcAft>
+                          <a:spcPts val="0"/>
+                        </a:spcAft>
+                      </a:pPr>
+                      <a:r>
+                        <a:rPr lang="en-US" sz="1300" b="0" i="0" u="none" strike="noStrike" dirty="0">
+                          <a:solidFill>
+                            <a:srgbClr val="000000"/>
+                          </a:solidFill>
+                          <a:effectLst/>
+                          <a:latin typeface="Arial" panose="020B0604020202020204" pitchFamily="34" charset="0"/>
+                        </a:rPr>
+                        <a:t>332.1</a:t>
+                      </a:r>
+                      <a:endParaRPr lang="en-US" sz="1300" dirty="0">
+                        <a:effectLst/>
+                      </a:endParaRPr>
+                    </a:p>
+                  </a:txBody>
+                  <a:tcPr marL="69586" marR="69586" marT="69586" marB="69586">
+                    <a:lnL w="9525" cap="flat" cmpd="sng" algn="ctr">
+                      <a:solidFill>
+                        <a:srgbClr val="9E9E9E"/>
+                      </a:solidFill>
+                      <a:prstDash val="solid"/>
+                      <a:round/>
+                      <a:headEnd type="none" w="med" len="med"/>
+                      <a:tailEnd type="none" w="med" len="med"/>
+                    </a:lnL>
+                    <a:lnR w="9525" cap="flat" cmpd="sng" algn="ctr">
+                      <a:solidFill>
+                        <a:srgbClr val="9E9E9E"/>
+                      </a:solidFill>
+                      <a:prstDash val="solid"/>
+                      <a:round/>
+                      <a:headEnd type="none" w="med" len="med"/>
+                      <a:tailEnd type="none" w="med" len="med"/>
+                    </a:lnR>
+                    <a:lnT w="9525" cap="flat" cmpd="sng" algn="ctr">
+                      <a:solidFill>
+                        <a:srgbClr val="9E9E9E"/>
+                      </a:solidFill>
+                      <a:prstDash val="solid"/>
+                      <a:round/>
+                      <a:headEnd type="none" w="med" len="med"/>
+                      <a:tailEnd type="none" w="med" len="med"/>
+                    </a:lnT>
+                    <a:lnB w="9525" cap="flat" cmpd="sng" algn="ctr">
+                      <a:solidFill>
+                        <a:srgbClr val="9E9E9E"/>
+                      </a:solidFill>
+                      <a:prstDash val="solid"/>
+                      <a:round/>
+                      <a:headEnd type="none" w="med" len="med"/>
+                      <a:tailEnd type="none" w="med" len="med"/>
+                    </a:lnB>
+                    <a:solidFill>
+                      <a:srgbClr val="FFC000"/>
+                    </a:solidFill>
+                  </a:tcPr>
+                </a:tc>
+              </a:tr>
+              <a:tr h="384469">
+                <a:tc>
+                  <a:txBody>
+                    <a:bodyPr/>
+                    <a:lstStyle/>
+                    <a:p>
+                      <a:pPr rtl="0" fontAlgn="t">
+                        <a:spcBef>
+                          <a:spcPts val="0"/>
+                        </a:spcBef>
+                        <a:spcAft>
+                          <a:spcPts val="0"/>
+                        </a:spcAft>
+                      </a:pPr>
+                      <a:r>
+                        <a:rPr lang="en-US" sz="1300" b="0" i="0" u="none" strike="noStrike">
+                          <a:solidFill>
+                            <a:srgbClr val="000000"/>
+                          </a:solidFill>
+                          <a:effectLst/>
+                          <a:latin typeface="Arial" panose="020B0604020202020204" pitchFamily="34" charset="0"/>
+                        </a:rPr>
+                        <a:t>DE</a:t>
+                      </a:r>
+                      <a:endParaRPr lang="en-US" sz="1300">
+                        <a:effectLst/>
+                      </a:endParaRPr>
+                    </a:p>
+                  </a:txBody>
+                  <a:tcPr marL="69586" marR="69586" marT="69586" marB="69586">
+                    <a:lnL w="9525" cap="flat" cmpd="sng" algn="ctr">
+                      <a:solidFill>
+                        <a:srgbClr val="9E9E9E"/>
+                      </a:solidFill>
+                      <a:prstDash val="solid"/>
+                      <a:round/>
+                      <a:headEnd type="none" w="med" len="med"/>
+                      <a:tailEnd type="none" w="med" len="med"/>
+                    </a:lnL>
+                    <a:lnR w="9525" cap="flat" cmpd="sng" algn="ctr">
+                      <a:solidFill>
+                        <a:srgbClr val="9E9E9E"/>
+                      </a:solidFill>
+                      <a:prstDash val="solid"/>
+                      <a:round/>
+                      <a:headEnd type="none" w="med" len="med"/>
+                      <a:tailEnd type="none" w="med" len="med"/>
+                    </a:lnR>
+                    <a:lnT w="9525" cap="flat" cmpd="sng" algn="ctr">
+                      <a:solidFill>
+                        <a:srgbClr val="9E9E9E"/>
+                      </a:solidFill>
+                      <a:prstDash val="solid"/>
+                      <a:round/>
+                      <a:headEnd type="none" w="med" len="med"/>
+                      <a:tailEnd type="none" w="med" len="med"/>
+                    </a:lnT>
+                    <a:lnB w="9525" cap="flat" cmpd="sng" algn="ctr">
+                      <a:solidFill>
+                        <a:srgbClr val="9E9E9E"/>
+                      </a:solidFill>
+                      <a:prstDash val="solid"/>
+                      <a:round/>
+                      <a:headEnd type="none" w="med" len="med"/>
+                      <a:tailEnd type="none" w="med" len="med"/>
+                    </a:lnB>
+                  </a:tcPr>
+                </a:tc>
+                <a:tc>
+                  <a:txBody>
+                    <a:bodyPr/>
+                    <a:lstStyle/>
+                    <a:p>
+                      <a:pPr rtl="0" fontAlgn="t">
+                        <a:spcBef>
+                          <a:spcPts val="0"/>
+                        </a:spcBef>
+                        <a:spcAft>
+                          <a:spcPts val="0"/>
+                        </a:spcAft>
+                      </a:pPr>
+                      <a:r>
+                        <a:rPr lang="en-US" sz="1300" b="0" i="0" u="none" strike="noStrike">
+                          <a:solidFill>
+                            <a:srgbClr val="000000"/>
+                          </a:solidFill>
+                          <a:effectLst/>
+                          <a:latin typeface="Arial" panose="020B0604020202020204" pitchFamily="34" charset="0"/>
+                        </a:rPr>
+                        <a:t>27964.2</a:t>
+                      </a:r>
+                      <a:endParaRPr lang="en-US" sz="1300">
+                        <a:effectLst/>
+                      </a:endParaRPr>
+                    </a:p>
+                  </a:txBody>
+                  <a:tcPr marL="69586" marR="69586" marT="69586" marB="69586">
+                    <a:lnL w="9525" cap="flat" cmpd="sng" algn="ctr">
+                      <a:solidFill>
+                        <a:srgbClr val="9E9E9E"/>
+                      </a:solidFill>
+                      <a:prstDash val="solid"/>
+                      <a:round/>
+                      <a:headEnd type="none" w="med" len="med"/>
+                      <a:tailEnd type="none" w="med" len="med"/>
+                    </a:lnL>
+                    <a:lnR w="9525" cap="flat" cmpd="sng" algn="ctr">
+                      <a:solidFill>
+                        <a:srgbClr val="9E9E9E"/>
+                      </a:solidFill>
+                      <a:prstDash val="solid"/>
+                      <a:round/>
+                      <a:headEnd type="none" w="med" len="med"/>
+                      <a:tailEnd type="none" w="med" len="med"/>
+                    </a:lnR>
+                    <a:lnT w="9525" cap="flat" cmpd="sng" algn="ctr">
+                      <a:solidFill>
+                        <a:srgbClr val="9E9E9E"/>
+                      </a:solidFill>
+                      <a:prstDash val="solid"/>
+                      <a:round/>
+                      <a:headEnd type="none" w="med" len="med"/>
+                      <a:tailEnd type="none" w="med" len="med"/>
+                    </a:lnT>
+                    <a:lnB w="9525" cap="flat" cmpd="sng" algn="ctr">
+                      <a:solidFill>
+                        <a:srgbClr val="9E9E9E"/>
+                      </a:solidFill>
+                      <a:prstDash val="solid"/>
+                      <a:round/>
+                      <a:headEnd type="none" w="med" len="med"/>
+                      <a:tailEnd type="none" w="med" len="med"/>
+                    </a:lnB>
+                  </a:tcPr>
+                </a:tc>
+                <a:tc>
+                  <a:txBody>
+                    <a:bodyPr/>
+                    <a:lstStyle/>
+                    <a:p>
+                      <a:pPr rtl="0" fontAlgn="t">
+                        <a:spcBef>
+                          <a:spcPts val="0"/>
+                        </a:spcBef>
+                        <a:spcAft>
+                          <a:spcPts val="0"/>
+                        </a:spcAft>
+                      </a:pPr>
+                      <a:r>
+                        <a:rPr lang="en-US" sz="1300" b="0" i="0" u="none" strike="noStrike" dirty="0">
+                          <a:solidFill>
+                            <a:srgbClr val="000000"/>
+                          </a:solidFill>
+                          <a:effectLst/>
+                          <a:latin typeface="Arial" panose="020B0604020202020204" pitchFamily="34" charset="0"/>
+                        </a:rPr>
+                        <a:t>314.1</a:t>
+                      </a:r>
+                      <a:endParaRPr lang="en-US" sz="1300" dirty="0">
+                        <a:effectLst/>
+                      </a:endParaRPr>
+                    </a:p>
+                  </a:txBody>
+                  <a:tcPr marL="69586" marR="69586" marT="69586" marB="69586">
+                    <a:lnL w="9525" cap="flat" cmpd="sng" algn="ctr">
+                      <a:solidFill>
+                        <a:srgbClr val="9E9E9E"/>
+                      </a:solidFill>
+                      <a:prstDash val="solid"/>
+                      <a:round/>
+                      <a:headEnd type="none" w="med" len="med"/>
+                      <a:tailEnd type="none" w="med" len="med"/>
+                    </a:lnL>
+                    <a:lnR w="9525" cap="flat" cmpd="sng" algn="ctr">
+                      <a:solidFill>
+                        <a:srgbClr val="9E9E9E"/>
+                      </a:solidFill>
+                      <a:prstDash val="solid"/>
+                      <a:round/>
+                      <a:headEnd type="none" w="med" len="med"/>
+                      <a:tailEnd type="none" w="med" len="med"/>
+                    </a:lnR>
+                    <a:lnT w="9525" cap="flat" cmpd="sng" algn="ctr">
+                      <a:solidFill>
+                        <a:srgbClr val="9E9E9E"/>
+                      </a:solidFill>
+                      <a:prstDash val="solid"/>
+                      <a:round/>
+                      <a:headEnd type="none" w="med" len="med"/>
+                      <a:tailEnd type="none" w="med" len="med"/>
+                    </a:lnT>
+                    <a:lnB w="9525" cap="flat" cmpd="sng" algn="ctr">
+                      <a:solidFill>
+                        <a:srgbClr val="9E9E9E"/>
+                      </a:solidFill>
+                      <a:prstDash val="solid"/>
+                      <a:round/>
+                      <a:headEnd type="none" w="med" len="med"/>
+                      <a:tailEnd type="none" w="med" len="med"/>
+                    </a:lnB>
+                  </a:tcPr>
+                </a:tc>
+                <a:tc>
+                  <a:txBody>
+                    <a:bodyPr/>
+                    <a:lstStyle/>
+                    <a:p>
+                      <a:pPr rtl="0" fontAlgn="t">
+                        <a:spcBef>
+                          <a:spcPts val="0"/>
+                        </a:spcBef>
+                        <a:spcAft>
+                          <a:spcPts val="0"/>
+                        </a:spcAft>
+                      </a:pPr>
+                      <a:r>
+                        <a:rPr lang="en-US" sz="1300" b="0" i="0" u="none" strike="noStrike" dirty="0">
+                          <a:solidFill>
+                            <a:srgbClr val="000000"/>
+                          </a:solidFill>
+                          <a:effectLst/>
+                          <a:latin typeface="Arial" panose="020B0604020202020204" pitchFamily="34" charset="0"/>
+                        </a:rPr>
+                        <a:t>89.0</a:t>
+                      </a:r>
+                      <a:endParaRPr lang="en-US" sz="1300" dirty="0">
+                        <a:effectLst/>
+                      </a:endParaRPr>
+                    </a:p>
+                  </a:txBody>
+                  <a:tcPr marL="69586" marR="69586" marT="69586" marB="69586">
+                    <a:lnL w="9525" cap="flat" cmpd="sng" algn="ctr">
+                      <a:solidFill>
+                        <a:srgbClr val="9E9E9E"/>
+                      </a:solidFill>
+                      <a:prstDash val="solid"/>
+                      <a:round/>
+                      <a:headEnd type="none" w="med" len="med"/>
+                      <a:tailEnd type="none" w="med" len="med"/>
+                    </a:lnL>
+                    <a:lnR w="9525" cap="flat" cmpd="sng" algn="ctr">
+                      <a:solidFill>
+                        <a:srgbClr val="9E9E9E"/>
+                      </a:solidFill>
+                      <a:prstDash val="solid"/>
+                      <a:round/>
+                      <a:headEnd type="none" w="med" len="med"/>
+                      <a:tailEnd type="none" w="med" len="med"/>
+                    </a:lnR>
+                    <a:lnT w="9525" cap="flat" cmpd="sng" algn="ctr">
+                      <a:solidFill>
+                        <a:srgbClr val="9E9E9E"/>
+                      </a:solidFill>
+                      <a:prstDash val="solid"/>
+                      <a:round/>
+                      <a:headEnd type="none" w="med" len="med"/>
+                      <a:tailEnd type="none" w="med" len="med"/>
+                    </a:lnT>
+                    <a:lnB w="9525" cap="flat" cmpd="sng" algn="ctr">
+                      <a:solidFill>
+                        <a:srgbClr val="9E9E9E"/>
+                      </a:solidFill>
+                      <a:prstDash val="solid"/>
+                      <a:round/>
+                      <a:headEnd type="none" w="med" len="med"/>
+                      <a:tailEnd type="none" w="med" len="med"/>
+                    </a:lnB>
+                    <a:solidFill>
+                      <a:srgbClr val="FFC000"/>
+                    </a:solidFill>
+                  </a:tcPr>
+                </a:tc>
+              </a:tr>
+              <a:tr h="384469">
+                <a:tc>
+                  <a:txBody>
+                    <a:bodyPr/>
+                    <a:lstStyle/>
+                    <a:p>
+                      <a:pPr rtl="0" fontAlgn="t">
+                        <a:spcBef>
+                          <a:spcPts val="0"/>
+                        </a:spcBef>
+                        <a:spcAft>
+                          <a:spcPts val="0"/>
+                        </a:spcAft>
+                      </a:pPr>
+                      <a:r>
+                        <a:rPr lang="en-US" sz="1300" b="0" i="0" u="none" strike="noStrike">
+                          <a:solidFill>
+                            <a:srgbClr val="000000"/>
+                          </a:solidFill>
+                          <a:effectLst/>
+                          <a:latin typeface="Arial" panose="020B0604020202020204" pitchFamily="34" charset="0"/>
+                        </a:rPr>
+                        <a:t>PSO</a:t>
+                      </a:r>
+                      <a:endParaRPr lang="en-US" sz="1300">
+                        <a:effectLst/>
+                      </a:endParaRPr>
+                    </a:p>
+                  </a:txBody>
+                  <a:tcPr marL="69586" marR="69586" marT="69586" marB="69586">
+                    <a:lnL w="9525" cap="flat" cmpd="sng" algn="ctr">
+                      <a:solidFill>
+                        <a:srgbClr val="9E9E9E"/>
+                      </a:solidFill>
+                      <a:prstDash val="solid"/>
+                      <a:round/>
+                      <a:headEnd type="none" w="med" len="med"/>
+                      <a:tailEnd type="none" w="med" len="med"/>
+                    </a:lnL>
+                    <a:lnR w="9525" cap="flat" cmpd="sng" algn="ctr">
+                      <a:solidFill>
+                        <a:srgbClr val="9E9E9E"/>
+                      </a:solidFill>
+                      <a:prstDash val="solid"/>
+                      <a:round/>
+                      <a:headEnd type="none" w="med" len="med"/>
+                      <a:tailEnd type="none" w="med" len="med"/>
+                    </a:lnR>
+                    <a:lnT w="9525" cap="flat" cmpd="sng" algn="ctr">
+                      <a:solidFill>
+                        <a:srgbClr val="9E9E9E"/>
+                      </a:solidFill>
+                      <a:prstDash val="solid"/>
+                      <a:round/>
+                      <a:headEnd type="none" w="med" len="med"/>
+                      <a:tailEnd type="none" w="med" len="med"/>
+                    </a:lnT>
+                    <a:lnB w="9525" cap="flat" cmpd="sng" algn="ctr">
+                      <a:solidFill>
+                        <a:srgbClr val="9E9E9E"/>
+                      </a:solidFill>
+                      <a:prstDash val="solid"/>
+                      <a:round/>
+                      <a:headEnd type="none" w="med" len="med"/>
+                      <a:tailEnd type="none" w="med" len="med"/>
+                    </a:lnB>
+                  </a:tcPr>
+                </a:tc>
+                <a:tc>
+                  <a:txBody>
+                    <a:bodyPr/>
+                    <a:lstStyle/>
+                    <a:p>
+                      <a:pPr rtl="0" fontAlgn="t">
+                        <a:spcBef>
+                          <a:spcPts val="0"/>
+                        </a:spcBef>
+                        <a:spcAft>
+                          <a:spcPts val="0"/>
+                        </a:spcAft>
+                      </a:pPr>
+                      <a:r>
+                        <a:rPr lang="en-US" sz="1300" b="0" i="0" u="none" strike="noStrike">
+                          <a:solidFill>
+                            <a:srgbClr val="000000"/>
+                          </a:solidFill>
+                          <a:effectLst/>
+                          <a:latin typeface="Arial" panose="020B0604020202020204" pitchFamily="34" charset="0"/>
+                        </a:rPr>
+                        <a:t>17935.1</a:t>
+                      </a:r>
+                      <a:endParaRPr lang="en-US" sz="1300">
+                        <a:effectLst/>
+                      </a:endParaRPr>
+                    </a:p>
+                  </a:txBody>
+                  <a:tcPr marL="69586" marR="69586" marT="69586" marB="69586">
+                    <a:lnL w="9525" cap="flat" cmpd="sng" algn="ctr">
+                      <a:solidFill>
+                        <a:srgbClr val="9E9E9E"/>
+                      </a:solidFill>
+                      <a:prstDash val="solid"/>
+                      <a:round/>
+                      <a:headEnd type="none" w="med" len="med"/>
+                      <a:tailEnd type="none" w="med" len="med"/>
+                    </a:lnL>
+                    <a:lnR w="9525" cap="flat" cmpd="sng" algn="ctr">
+                      <a:solidFill>
+                        <a:srgbClr val="9E9E9E"/>
+                      </a:solidFill>
+                      <a:prstDash val="solid"/>
+                      <a:round/>
+                      <a:headEnd type="none" w="med" len="med"/>
+                      <a:tailEnd type="none" w="med" len="med"/>
+                    </a:lnR>
+                    <a:lnT w="9525" cap="flat" cmpd="sng" algn="ctr">
+                      <a:solidFill>
+                        <a:srgbClr val="9E9E9E"/>
+                      </a:solidFill>
+                      <a:prstDash val="solid"/>
+                      <a:round/>
+                      <a:headEnd type="none" w="med" len="med"/>
+                      <a:tailEnd type="none" w="med" len="med"/>
+                    </a:lnT>
+                    <a:lnB w="9525" cap="flat" cmpd="sng" algn="ctr">
+                      <a:solidFill>
+                        <a:srgbClr val="9E9E9E"/>
+                      </a:solidFill>
+                      <a:prstDash val="solid"/>
+                      <a:round/>
+                      <a:headEnd type="none" w="med" len="med"/>
+                      <a:tailEnd type="none" w="med" len="med"/>
+                    </a:lnB>
+                  </a:tcPr>
+                </a:tc>
+                <a:tc>
+                  <a:txBody>
+                    <a:bodyPr/>
+                    <a:lstStyle/>
+                    <a:p>
+                      <a:pPr rtl="0" fontAlgn="t">
+                        <a:spcBef>
+                          <a:spcPts val="0"/>
+                        </a:spcBef>
+                        <a:spcAft>
+                          <a:spcPts val="0"/>
+                        </a:spcAft>
+                      </a:pPr>
+                      <a:r>
+                        <a:rPr lang="en-US" sz="1300" b="0" i="0" u="none" strike="noStrike">
+                          <a:solidFill>
+                            <a:srgbClr val="000000"/>
+                          </a:solidFill>
+                          <a:effectLst/>
+                          <a:latin typeface="Arial" panose="020B0604020202020204" pitchFamily="34" charset="0"/>
+                        </a:rPr>
+                        <a:t>273.4</a:t>
+                      </a:r>
+                      <a:endParaRPr lang="en-US" sz="1300">
+                        <a:effectLst/>
+                      </a:endParaRPr>
+                    </a:p>
+                  </a:txBody>
+                  <a:tcPr marL="69586" marR="69586" marT="69586" marB="69586">
+                    <a:lnL w="9525" cap="flat" cmpd="sng" algn="ctr">
+                      <a:solidFill>
+                        <a:srgbClr val="9E9E9E"/>
+                      </a:solidFill>
+                      <a:prstDash val="solid"/>
+                      <a:round/>
+                      <a:headEnd type="none" w="med" len="med"/>
+                      <a:tailEnd type="none" w="med" len="med"/>
+                    </a:lnL>
+                    <a:lnR w="9525" cap="flat" cmpd="sng" algn="ctr">
+                      <a:solidFill>
+                        <a:srgbClr val="9E9E9E"/>
+                      </a:solidFill>
+                      <a:prstDash val="solid"/>
+                      <a:round/>
+                      <a:headEnd type="none" w="med" len="med"/>
+                      <a:tailEnd type="none" w="med" len="med"/>
+                    </a:lnR>
+                    <a:lnT w="9525" cap="flat" cmpd="sng" algn="ctr">
+                      <a:solidFill>
+                        <a:srgbClr val="9E9E9E"/>
+                      </a:solidFill>
+                      <a:prstDash val="solid"/>
+                      <a:round/>
+                      <a:headEnd type="none" w="med" len="med"/>
+                      <a:tailEnd type="none" w="med" len="med"/>
+                    </a:lnT>
+                    <a:lnB w="9525" cap="flat" cmpd="sng" algn="ctr">
+                      <a:solidFill>
+                        <a:srgbClr val="9E9E9E"/>
+                      </a:solidFill>
+                      <a:prstDash val="solid"/>
+                      <a:round/>
+                      <a:headEnd type="none" w="med" len="med"/>
+                      <a:tailEnd type="none" w="med" len="med"/>
+                    </a:lnB>
+                  </a:tcPr>
+                </a:tc>
+                <a:tc>
+                  <a:txBody>
+                    <a:bodyPr/>
+                    <a:lstStyle/>
+                    <a:p>
+                      <a:pPr rtl="0" fontAlgn="t">
+                        <a:spcBef>
+                          <a:spcPts val="0"/>
+                        </a:spcBef>
+                        <a:spcAft>
+                          <a:spcPts val="0"/>
+                        </a:spcAft>
+                      </a:pPr>
+                      <a:r>
+                        <a:rPr lang="en-US" sz="1300" b="0" i="0" u="none" strike="noStrike" dirty="0">
+                          <a:solidFill>
+                            <a:srgbClr val="000000"/>
+                          </a:solidFill>
+                          <a:effectLst/>
+                          <a:latin typeface="Arial" panose="020B0604020202020204" pitchFamily="34" charset="0"/>
+                        </a:rPr>
+                        <a:t>65.6</a:t>
+                      </a:r>
+                      <a:endParaRPr lang="en-US" sz="1300" dirty="0">
+                        <a:effectLst/>
+                      </a:endParaRPr>
+                    </a:p>
+                  </a:txBody>
+                  <a:tcPr marL="69586" marR="69586" marT="69586" marB="69586">
+                    <a:lnL w="9525" cap="flat" cmpd="sng" algn="ctr">
+                      <a:solidFill>
+                        <a:srgbClr val="9E9E9E"/>
+                      </a:solidFill>
+                      <a:prstDash val="solid"/>
+                      <a:round/>
+                      <a:headEnd type="none" w="med" len="med"/>
+                      <a:tailEnd type="none" w="med" len="med"/>
+                    </a:lnL>
+                    <a:lnR w="9525" cap="flat" cmpd="sng" algn="ctr">
+                      <a:solidFill>
+                        <a:srgbClr val="9E9E9E"/>
+                      </a:solidFill>
+                      <a:prstDash val="solid"/>
+                      <a:round/>
+                      <a:headEnd type="none" w="med" len="med"/>
+                      <a:tailEnd type="none" w="med" len="med"/>
+                    </a:lnR>
+                    <a:lnT w="9525" cap="flat" cmpd="sng" algn="ctr">
+                      <a:solidFill>
+                        <a:srgbClr val="9E9E9E"/>
+                      </a:solidFill>
+                      <a:prstDash val="solid"/>
+                      <a:round/>
+                      <a:headEnd type="none" w="med" len="med"/>
+                      <a:tailEnd type="none" w="med" len="med"/>
+                    </a:lnT>
+                    <a:lnB w="9525" cap="flat" cmpd="sng" algn="ctr">
+                      <a:solidFill>
+                        <a:srgbClr val="9E9E9E"/>
+                      </a:solidFill>
+                      <a:prstDash val="solid"/>
+                      <a:round/>
+                      <a:headEnd type="none" w="med" len="med"/>
+                      <a:tailEnd type="none" w="med" len="med"/>
+                    </a:lnB>
+                    <a:solidFill>
+                      <a:srgbClr val="FFC000"/>
+                    </a:solidFill>
+                  </a:tcPr>
+                </a:tc>
+              </a:tr>
+              <a:tr h="384469">
+                <a:tc>
+                  <a:txBody>
+                    <a:bodyPr/>
+                    <a:lstStyle/>
+                    <a:p>
+                      <a:pPr rtl="0" fontAlgn="t">
+                        <a:spcBef>
+                          <a:spcPts val="0"/>
+                        </a:spcBef>
+                        <a:spcAft>
+                          <a:spcPts val="0"/>
+                        </a:spcAft>
+                      </a:pPr>
+                      <a:r>
+                        <a:rPr lang="en-US" sz="1300" b="0" i="0" u="none" strike="noStrike">
+                          <a:solidFill>
+                            <a:srgbClr val="000000"/>
+                          </a:solidFill>
+                          <a:effectLst/>
+                          <a:latin typeface="Arial" panose="020B0604020202020204" pitchFamily="34" charset="0"/>
+                        </a:rPr>
+                        <a:t>SaNSDE</a:t>
+                      </a:r>
+                      <a:endParaRPr lang="en-US" sz="1300">
+                        <a:effectLst/>
+                      </a:endParaRPr>
+                    </a:p>
+                  </a:txBody>
+                  <a:tcPr marL="69586" marR="69586" marT="69586" marB="69586">
+                    <a:lnL w="9525" cap="flat" cmpd="sng" algn="ctr">
+                      <a:solidFill>
+                        <a:srgbClr val="9E9E9E"/>
+                      </a:solidFill>
+                      <a:prstDash val="solid"/>
+                      <a:round/>
+                      <a:headEnd type="none" w="med" len="med"/>
+                      <a:tailEnd type="none" w="med" len="med"/>
+                    </a:lnL>
+                    <a:lnR w="9525" cap="flat" cmpd="sng" algn="ctr">
+                      <a:solidFill>
+                        <a:srgbClr val="9E9E9E"/>
+                      </a:solidFill>
+                      <a:prstDash val="solid"/>
+                      <a:round/>
+                      <a:headEnd type="none" w="med" len="med"/>
+                      <a:tailEnd type="none" w="med" len="med"/>
+                    </a:lnR>
+                    <a:lnT w="9525" cap="flat" cmpd="sng" algn="ctr">
+                      <a:solidFill>
+                        <a:srgbClr val="9E9E9E"/>
+                      </a:solidFill>
+                      <a:prstDash val="solid"/>
+                      <a:round/>
+                      <a:headEnd type="none" w="med" len="med"/>
+                      <a:tailEnd type="none" w="med" len="med"/>
+                    </a:lnT>
+                    <a:lnB w="9525" cap="flat" cmpd="sng" algn="ctr">
+                      <a:solidFill>
+                        <a:srgbClr val="9E9E9E"/>
+                      </a:solidFill>
+                      <a:prstDash val="solid"/>
+                      <a:round/>
+                      <a:headEnd type="none" w="med" len="med"/>
+                      <a:tailEnd type="none" w="med" len="med"/>
+                    </a:lnB>
+                  </a:tcPr>
+                </a:tc>
+                <a:tc>
+                  <a:txBody>
+                    <a:bodyPr/>
+                    <a:lstStyle/>
+                    <a:p>
+                      <a:pPr rtl="0" fontAlgn="t">
+                        <a:spcBef>
+                          <a:spcPts val="0"/>
+                        </a:spcBef>
+                        <a:spcAft>
+                          <a:spcPts val="0"/>
+                        </a:spcAft>
+                      </a:pPr>
+                      <a:r>
+                        <a:rPr lang="en-US" sz="1300" b="0" i="0" u="none" strike="noStrike">
+                          <a:solidFill>
+                            <a:srgbClr val="000000"/>
+                          </a:solidFill>
+                          <a:effectLst/>
+                          <a:latin typeface="Arial" panose="020B0604020202020204" pitchFamily="34" charset="0"/>
+                        </a:rPr>
+                        <a:t>42886.2</a:t>
+                      </a:r>
+                      <a:endParaRPr lang="en-US" sz="1300">
+                        <a:effectLst/>
+                      </a:endParaRPr>
+                    </a:p>
+                  </a:txBody>
+                  <a:tcPr marL="69586" marR="69586" marT="69586" marB="69586">
+                    <a:lnL w="9525" cap="flat" cmpd="sng" algn="ctr">
+                      <a:solidFill>
+                        <a:srgbClr val="9E9E9E"/>
+                      </a:solidFill>
+                      <a:prstDash val="solid"/>
+                      <a:round/>
+                      <a:headEnd type="none" w="med" len="med"/>
+                      <a:tailEnd type="none" w="med" len="med"/>
+                    </a:lnL>
+                    <a:lnR w="9525" cap="flat" cmpd="sng" algn="ctr">
+                      <a:solidFill>
+                        <a:srgbClr val="9E9E9E"/>
+                      </a:solidFill>
+                      <a:prstDash val="solid"/>
+                      <a:round/>
+                      <a:headEnd type="none" w="med" len="med"/>
+                      <a:tailEnd type="none" w="med" len="med"/>
+                    </a:lnR>
+                    <a:lnT w="9525" cap="flat" cmpd="sng" algn="ctr">
+                      <a:solidFill>
+                        <a:srgbClr val="9E9E9E"/>
+                      </a:solidFill>
+                      <a:prstDash val="solid"/>
+                      <a:round/>
+                      <a:headEnd type="none" w="med" len="med"/>
+                      <a:tailEnd type="none" w="med" len="med"/>
+                    </a:lnT>
+                    <a:lnB w="9525" cap="flat" cmpd="sng" algn="ctr">
+                      <a:solidFill>
+                        <a:srgbClr val="9E9E9E"/>
+                      </a:solidFill>
+                      <a:prstDash val="solid"/>
+                      <a:round/>
+                      <a:headEnd type="none" w="med" len="med"/>
+                      <a:tailEnd type="none" w="med" len="med"/>
+                    </a:lnB>
+                  </a:tcPr>
+                </a:tc>
+                <a:tc>
+                  <a:txBody>
+                    <a:bodyPr/>
+                    <a:lstStyle/>
+                    <a:p>
+                      <a:pPr rtl="0" fontAlgn="t">
+                        <a:spcBef>
+                          <a:spcPts val="0"/>
+                        </a:spcBef>
+                        <a:spcAft>
+                          <a:spcPts val="0"/>
+                        </a:spcAft>
+                      </a:pPr>
+                      <a:r>
+                        <a:rPr lang="en-US" sz="1300" b="0" i="0" u="none" strike="noStrike">
+                          <a:solidFill>
+                            <a:srgbClr val="000000"/>
+                          </a:solidFill>
+                          <a:effectLst/>
+                          <a:latin typeface="Arial" panose="020B0604020202020204" pitchFamily="34" charset="0"/>
+                        </a:rPr>
+                        <a:t>310.7</a:t>
+                      </a:r>
+                      <a:endParaRPr lang="en-US" sz="1300">
+                        <a:effectLst/>
+                      </a:endParaRPr>
+                    </a:p>
+                  </a:txBody>
+                  <a:tcPr marL="69586" marR="69586" marT="69586" marB="69586">
+                    <a:lnL w="9525" cap="flat" cmpd="sng" algn="ctr">
+                      <a:solidFill>
+                        <a:srgbClr val="9E9E9E"/>
+                      </a:solidFill>
+                      <a:prstDash val="solid"/>
+                      <a:round/>
+                      <a:headEnd type="none" w="med" len="med"/>
+                      <a:tailEnd type="none" w="med" len="med"/>
+                    </a:lnL>
+                    <a:lnR w="9525" cap="flat" cmpd="sng" algn="ctr">
+                      <a:solidFill>
+                        <a:srgbClr val="9E9E9E"/>
+                      </a:solidFill>
+                      <a:prstDash val="solid"/>
+                      <a:round/>
+                      <a:headEnd type="none" w="med" len="med"/>
+                      <a:tailEnd type="none" w="med" len="med"/>
+                    </a:lnR>
+                    <a:lnT w="9525" cap="flat" cmpd="sng" algn="ctr">
+                      <a:solidFill>
+                        <a:srgbClr val="9E9E9E"/>
+                      </a:solidFill>
+                      <a:prstDash val="solid"/>
+                      <a:round/>
+                      <a:headEnd type="none" w="med" len="med"/>
+                      <a:tailEnd type="none" w="med" len="med"/>
+                    </a:lnT>
+                    <a:lnB w="9525" cap="flat" cmpd="sng" algn="ctr">
+                      <a:solidFill>
+                        <a:srgbClr val="9E9E9E"/>
+                      </a:solidFill>
+                      <a:prstDash val="solid"/>
+                      <a:round/>
+                      <a:headEnd type="none" w="med" len="med"/>
+                      <a:tailEnd type="none" w="med" len="med"/>
+                    </a:lnB>
+                  </a:tcPr>
+                </a:tc>
+                <a:tc>
+                  <a:txBody>
+                    <a:bodyPr/>
+                    <a:lstStyle/>
+                    <a:p>
+                      <a:pPr rtl="0" fontAlgn="t">
+                        <a:spcBef>
+                          <a:spcPts val="0"/>
+                        </a:spcBef>
+                        <a:spcAft>
+                          <a:spcPts val="0"/>
+                        </a:spcAft>
+                      </a:pPr>
+                      <a:r>
+                        <a:rPr lang="en-US" sz="1300" b="0" i="0" u="none" strike="noStrike">
+                          <a:solidFill>
+                            <a:srgbClr val="000000"/>
+                          </a:solidFill>
+                          <a:effectLst/>
+                          <a:latin typeface="Arial" panose="020B0604020202020204" pitchFamily="34" charset="0"/>
+                        </a:rPr>
+                        <a:t>138.0</a:t>
+                      </a:r>
+                      <a:endParaRPr lang="en-US" sz="1300">
+                        <a:effectLst/>
+                      </a:endParaRPr>
+                    </a:p>
+                  </a:txBody>
+                  <a:tcPr marL="69586" marR="69586" marT="69586" marB="69586">
+                    <a:lnL w="9525" cap="flat" cmpd="sng" algn="ctr">
+                      <a:solidFill>
+                        <a:srgbClr val="9E9E9E"/>
+                      </a:solidFill>
+                      <a:prstDash val="solid"/>
+                      <a:round/>
+                      <a:headEnd type="none" w="med" len="med"/>
+                      <a:tailEnd type="none" w="med" len="med"/>
+                    </a:lnL>
+                    <a:lnR w="9525" cap="flat" cmpd="sng" algn="ctr">
+                      <a:solidFill>
+                        <a:srgbClr val="9E9E9E"/>
+                      </a:solidFill>
+                      <a:prstDash val="solid"/>
+                      <a:round/>
+                      <a:headEnd type="none" w="med" len="med"/>
+                      <a:tailEnd type="none" w="med" len="med"/>
+                    </a:lnR>
+                    <a:lnT w="9525" cap="flat" cmpd="sng" algn="ctr">
+                      <a:solidFill>
+                        <a:srgbClr val="9E9E9E"/>
+                      </a:solidFill>
+                      <a:prstDash val="solid"/>
+                      <a:round/>
+                      <a:headEnd type="none" w="med" len="med"/>
+                      <a:tailEnd type="none" w="med" len="med"/>
+                    </a:lnT>
+                    <a:lnB w="9525" cap="flat" cmpd="sng" algn="ctr">
+                      <a:solidFill>
+                        <a:srgbClr val="9E9E9E"/>
+                      </a:solidFill>
+                      <a:prstDash val="solid"/>
+                      <a:round/>
+                      <a:headEnd type="none" w="med" len="med"/>
+                      <a:tailEnd type="none" w="med" len="med"/>
+                    </a:lnB>
+                    <a:solidFill>
+                      <a:srgbClr val="FFC000"/>
+                    </a:solidFill>
+                  </a:tcPr>
+                </a:tc>
+              </a:tr>
+              <a:tr h="384469">
+                <a:tc>
+                  <a:txBody>
+                    <a:bodyPr/>
+                    <a:lstStyle/>
+                    <a:p>
+                      <a:pPr rtl="0" fontAlgn="t">
+                        <a:spcBef>
+                          <a:spcPts val="0"/>
+                        </a:spcBef>
+                        <a:spcAft>
+                          <a:spcPts val="0"/>
+                        </a:spcAft>
+                      </a:pPr>
+                      <a:r>
+                        <a:rPr lang="en-US" sz="1300" b="0" i="0" u="none" strike="noStrike">
+                          <a:solidFill>
+                            <a:srgbClr val="000000"/>
+                          </a:solidFill>
+                          <a:effectLst/>
+                          <a:latin typeface="Arial" panose="020B0604020202020204" pitchFamily="34" charset="0"/>
+                        </a:rPr>
+                        <a:t>CCPSO</a:t>
+                      </a:r>
+                      <a:endParaRPr lang="en-US" sz="1300">
+                        <a:effectLst/>
+                      </a:endParaRPr>
+                    </a:p>
+                  </a:txBody>
+                  <a:tcPr marL="69586" marR="69586" marT="69586" marB="69586">
+                    <a:lnL w="9525" cap="flat" cmpd="sng" algn="ctr">
+                      <a:solidFill>
+                        <a:srgbClr val="9E9E9E"/>
+                      </a:solidFill>
+                      <a:prstDash val="solid"/>
+                      <a:round/>
+                      <a:headEnd type="none" w="med" len="med"/>
+                      <a:tailEnd type="none" w="med" len="med"/>
+                    </a:lnL>
+                    <a:lnR w="9525" cap="flat" cmpd="sng" algn="ctr">
+                      <a:solidFill>
+                        <a:srgbClr val="9E9E9E"/>
+                      </a:solidFill>
+                      <a:prstDash val="solid"/>
+                      <a:round/>
+                      <a:headEnd type="none" w="med" len="med"/>
+                      <a:tailEnd type="none" w="med" len="med"/>
+                    </a:lnR>
+                    <a:lnT w="9525" cap="flat" cmpd="sng" algn="ctr">
+                      <a:solidFill>
+                        <a:srgbClr val="9E9E9E"/>
+                      </a:solidFill>
+                      <a:prstDash val="solid"/>
+                      <a:round/>
+                      <a:headEnd type="none" w="med" len="med"/>
+                      <a:tailEnd type="none" w="med" len="med"/>
+                    </a:lnT>
+                    <a:lnB w="9525" cap="flat" cmpd="sng" algn="ctr">
+                      <a:solidFill>
+                        <a:srgbClr val="9E9E9E"/>
+                      </a:solidFill>
+                      <a:prstDash val="solid"/>
+                      <a:round/>
+                      <a:headEnd type="none" w="med" len="med"/>
+                      <a:tailEnd type="none" w="med" len="med"/>
+                    </a:lnB>
+                  </a:tcPr>
+                </a:tc>
+                <a:tc>
+                  <a:txBody>
+                    <a:bodyPr/>
+                    <a:lstStyle/>
+                    <a:p>
+                      <a:pPr rtl="0" fontAlgn="t">
+                        <a:spcBef>
+                          <a:spcPts val="0"/>
+                        </a:spcBef>
+                        <a:spcAft>
+                          <a:spcPts val="0"/>
+                        </a:spcAft>
+                      </a:pPr>
+                      <a:r>
+                        <a:rPr lang="en-US" sz="1300" b="0" i="0" u="none" strike="noStrike">
+                          <a:solidFill>
+                            <a:srgbClr val="000000"/>
+                          </a:solidFill>
+                          <a:effectLst/>
+                          <a:latin typeface="Arial" panose="020B0604020202020204" pitchFamily="34" charset="0"/>
+                        </a:rPr>
+                        <a:t>39735.4</a:t>
+                      </a:r>
+                      <a:endParaRPr lang="en-US" sz="1300">
+                        <a:effectLst/>
+                      </a:endParaRPr>
+                    </a:p>
+                  </a:txBody>
+                  <a:tcPr marL="69586" marR="69586" marT="69586" marB="69586">
+                    <a:lnL w="9525" cap="flat" cmpd="sng" algn="ctr">
+                      <a:solidFill>
+                        <a:srgbClr val="9E9E9E"/>
+                      </a:solidFill>
+                      <a:prstDash val="solid"/>
+                      <a:round/>
+                      <a:headEnd type="none" w="med" len="med"/>
+                      <a:tailEnd type="none" w="med" len="med"/>
+                    </a:lnL>
+                    <a:lnR w="9525" cap="flat" cmpd="sng" algn="ctr">
+                      <a:solidFill>
+                        <a:srgbClr val="9E9E9E"/>
+                      </a:solidFill>
+                      <a:prstDash val="solid"/>
+                      <a:round/>
+                      <a:headEnd type="none" w="med" len="med"/>
+                      <a:tailEnd type="none" w="med" len="med"/>
+                    </a:lnR>
+                    <a:lnT w="9525" cap="flat" cmpd="sng" algn="ctr">
+                      <a:solidFill>
+                        <a:srgbClr val="9E9E9E"/>
+                      </a:solidFill>
+                      <a:prstDash val="solid"/>
+                      <a:round/>
+                      <a:headEnd type="none" w="med" len="med"/>
+                      <a:tailEnd type="none" w="med" len="med"/>
+                    </a:lnT>
+                    <a:lnB w="9525" cap="flat" cmpd="sng" algn="ctr">
+                      <a:solidFill>
+                        <a:srgbClr val="9E9E9E"/>
+                      </a:solidFill>
+                      <a:prstDash val="solid"/>
+                      <a:round/>
+                      <a:headEnd type="none" w="med" len="med"/>
+                      <a:tailEnd type="none" w="med" len="med"/>
+                    </a:lnB>
+                  </a:tcPr>
+                </a:tc>
+                <a:tc>
+                  <a:txBody>
+                    <a:bodyPr/>
+                    <a:lstStyle/>
+                    <a:p>
+                      <a:pPr rtl="0" fontAlgn="t">
+                        <a:spcBef>
+                          <a:spcPts val="0"/>
+                        </a:spcBef>
+                        <a:spcAft>
+                          <a:spcPts val="0"/>
+                        </a:spcAft>
+                      </a:pPr>
+                      <a:r>
+                        <a:rPr lang="en-US" sz="1300" b="0" i="0" u="none" strike="noStrike">
+                          <a:solidFill>
+                            <a:srgbClr val="000000"/>
+                          </a:solidFill>
+                          <a:effectLst/>
+                          <a:latin typeface="Arial" panose="020B0604020202020204" pitchFamily="34" charset="0"/>
+                        </a:rPr>
+                        <a:t>279.9</a:t>
+                      </a:r>
+                      <a:endParaRPr lang="en-US" sz="1300">
+                        <a:effectLst/>
+                      </a:endParaRPr>
+                    </a:p>
+                  </a:txBody>
+                  <a:tcPr marL="69586" marR="69586" marT="69586" marB="69586">
+                    <a:lnL w="9525" cap="flat" cmpd="sng" algn="ctr">
+                      <a:solidFill>
+                        <a:srgbClr val="9E9E9E"/>
+                      </a:solidFill>
+                      <a:prstDash val="solid"/>
+                      <a:round/>
+                      <a:headEnd type="none" w="med" len="med"/>
+                      <a:tailEnd type="none" w="med" len="med"/>
+                    </a:lnL>
+                    <a:lnR w="9525" cap="flat" cmpd="sng" algn="ctr">
+                      <a:solidFill>
+                        <a:srgbClr val="9E9E9E"/>
+                      </a:solidFill>
+                      <a:prstDash val="solid"/>
+                      <a:round/>
+                      <a:headEnd type="none" w="med" len="med"/>
+                      <a:tailEnd type="none" w="med" len="med"/>
+                    </a:lnR>
+                    <a:lnT w="9525" cap="flat" cmpd="sng" algn="ctr">
+                      <a:solidFill>
+                        <a:srgbClr val="9E9E9E"/>
+                      </a:solidFill>
+                      <a:prstDash val="solid"/>
+                      <a:round/>
+                      <a:headEnd type="none" w="med" len="med"/>
+                      <a:tailEnd type="none" w="med" len="med"/>
+                    </a:lnT>
+                    <a:lnB w="9525" cap="flat" cmpd="sng" algn="ctr">
+                      <a:solidFill>
+                        <a:srgbClr val="9E9E9E"/>
+                      </a:solidFill>
+                      <a:prstDash val="solid"/>
+                      <a:round/>
+                      <a:headEnd type="none" w="med" len="med"/>
+                      <a:tailEnd type="none" w="med" len="med"/>
+                    </a:lnB>
+                  </a:tcPr>
+                </a:tc>
+                <a:tc>
+                  <a:txBody>
+                    <a:bodyPr/>
+                    <a:lstStyle/>
+                    <a:p>
+                      <a:pPr rtl="0" fontAlgn="t">
+                        <a:spcBef>
+                          <a:spcPts val="0"/>
+                        </a:spcBef>
+                        <a:spcAft>
+                          <a:spcPts val="0"/>
+                        </a:spcAft>
+                      </a:pPr>
+                      <a:r>
+                        <a:rPr lang="en-US" sz="1300" b="0" i="0" u="none" strike="noStrike">
+                          <a:solidFill>
+                            <a:srgbClr val="000000"/>
+                          </a:solidFill>
+                          <a:effectLst/>
+                          <a:latin typeface="Arial" panose="020B0604020202020204" pitchFamily="34" charset="0"/>
+                        </a:rPr>
+                        <a:t>142.2</a:t>
+                      </a:r>
+                      <a:endParaRPr lang="en-US" sz="1300">
+                        <a:effectLst/>
+                      </a:endParaRPr>
+                    </a:p>
+                  </a:txBody>
+                  <a:tcPr marL="69586" marR="69586" marT="69586" marB="69586">
+                    <a:lnL w="9525" cap="flat" cmpd="sng" algn="ctr">
+                      <a:solidFill>
+                        <a:srgbClr val="9E9E9E"/>
+                      </a:solidFill>
+                      <a:prstDash val="solid"/>
+                      <a:round/>
+                      <a:headEnd type="none" w="med" len="med"/>
+                      <a:tailEnd type="none" w="med" len="med"/>
+                    </a:lnL>
+                    <a:lnR w="9525" cap="flat" cmpd="sng" algn="ctr">
+                      <a:solidFill>
+                        <a:srgbClr val="9E9E9E"/>
+                      </a:solidFill>
+                      <a:prstDash val="solid"/>
+                      <a:round/>
+                      <a:headEnd type="none" w="med" len="med"/>
+                      <a:tailEnd type="none" w="med" len="med"/>
+                    </a:lnR>
+                    <a:lnT w="9525" cap="flat" cmpd="sng" algn="ctr">
+                      <a:solidFill>
+                        <a:srgbClr val="9E9E9E"/>
+                      </a:solidFill>
+                      <a:prstDash val="solid"/>
+                      <a:round/>
+                      <a:headEnd type="none" w="med" len="med"/>
+                      <a:tailEnd type="none" w="med" len="med"/>
+                    </a:lnT>
+                    <a:lnB w="9525" cap="flat" cmpd="sng" algn="ctr">
+                      <a:solidFill>
+                        <a:srgbClr val="9E9E9E"/>
+                      </a:solidFill>
+                      <a:prstDash val="solid"/>
+                      <a:round/>
+                      <a:headEnd type="none" w="med" len="med"/>
+                      <a:tailEnd type="none" w="med" len="med"/>
+                    </a:lnB>
+                    <a:solidFill>
+                      <a:srgbClr val="FFC000"/>
+                    </a:solidFill>
+                  </a:tcPr>
+                </a:tc>
+              </a:tr>
+              <a:tr h="838269">
+                <a:tc>
+                  <a:txBody>
+                    <a:bodyPr/>
+                    <a:lstStyle/>
+                    <a:p>
+                      <a:pPr rtl="0" fontAlgn="t">
+                        <a:spcBef>
+                          <a:spcPts val="0"/>
+                        </a:spcBef>
+                        <a:spcAft>
+                          <a:spcPts val="0"/>
+                        </a:spcAft>
+                      </a:pPr>
+                      <a:r>
+                        <a:rPr lang="en-US" sz="1300" b="0" i="0" u="none" strike="noStrike">
+                          <a:solidFill>
+                            <a:srgbClr val="000000"/>
+                          </a:solidFill>
+                          <a:effectLst/>
+                          <a:latin typeface="Arial" panose="020B0604020202020204" pitchFamily="34" charset="0"/>
+                        </a:rPr>
+                        <a:t>Hybrid Evolutionary Algorithm</a:t>
+                      </a:r>
+                      <a:endParaRPr lang="en-US" sz="1300">
+                        <a:effectLst/>
+                      </a:endParaRPr>
+                    </a:p>
+                  </a:txBody>
+                  <a:tcPr marL="69586" marR="69586" marT="69586" marB="69586">
+                    <a:lnL w="9525" cap="flat" cmpd="sng" algn="ctr">
+                      <a:solidFill>
+                        <a:srgbClr val="9E9E9E"/>
+                      </a:solidFill>
+                      <a:prstDash val="solid"/>
+                      <a:round/>
+                      <a:headEnd type="none" w="med" len="med"/>
+                      <a:tailEnd type="none" w="med" len="med"/>
+                    </a:lnL>
+                    <a:lnR w="9525" cap="flat" cmpd="sng" algn="ctr">
+                      <a:solidFill>
+                        <a:srgbClr val="9E9E9E"/>
+                      </a:solidFill>
+                      <a:prstDash val="solid"/>
+                      <a:round/>
+                      <a:headEnd type="none" w="med" len="med"/>
+                      <a:tailEnd type="none" w="med" len="med"/>
+                    </a:lnR>
+                    <a:lnT w="9525" cap="flat" cmpd="sng" algn="ctr">
+                      <a:solidFill>
+                        <a:srgbClr val="9E9E9E"/>
+                      </a:solidFill>
+                      <a:prstDash val="solid"/>
+                      <a:round/>
+                      <a:headEnd type="none" w="med" len="med"/>
+                      <a:tailEnd type="none" w="med" len="med"/>
+                    </a:lnT>
+                    <a:lnB w="9525" cap="flat" cmpd="sng" algn="ctr">
+                      <a:solidFill>
+                        <a:srgbClr val="9E9E9E"/>
+                      </a:solidFill>
+                      <a:prstDash val="solid"/>
+                      <a:round/>
+                      <a:headEnd type="none" w="med" len="med"/>
+                      <a:tailEnd type="none" w="med" len="med"/>
+                    </a:lnB>
+                  </a:tcPr>
+                </a:tc>
+                <a:tc>
+                  <a:txBody>
+                    <a:bodyPr/>
+                    <a:lstStyle/>
+                    <a:p>
+                      <a:pPr rtl="0" fontAlgn="t">
+                        <a:spcBef>
+                          <a:spcPts val="0"/>
+                        </a:spcBef>
+                        <a:spcAft>
+                          <a:spcPts val="0"/>
+                        </a:spcAft>
+                      </a:pPr>
+                      <a:r>
+                        <a:rPr lang="en-US" sz="1300" b="0" i="0" u="none" strike="noStrike">
+                          <a:solidFill>
+                            <a:srgbClr val="000000"/>
+                          </a:solidFill>
+                          <a:effectLst/>
+                          <a:latin typeface="Arial" panose="020B0604020202020204" pitchFamily="34" charset="0"/>
+                        </a:rPr>
+                        <a:t>483662.3</a:t>
+                      </a:r>
+                      <a:endParaRPr lang="en-US" sz="1300">
+                        <a:effectLst/>
+                      </a:endParaRPr>
+                    </a:p>
+                  </a:txBody>
+                  <a:tcPr marL="69586" marR="69586" marT="69586" marB="69586">
+                    <a:lnL w="9525" cap="flat" cmpd="sng" algn="ctr">
+                      <a:solidFill>
+                        <a:srgbClr val="9E9E9E"/>
+                      </a:solidFill>
+                      <a:prstDash val="solid"/>
+                      <a:round/>
+                      <a:headEnd type="none" w="med" len="med"/>
+                      <a:tailEnd type="none" w="med" len="med"/>
+                    </a:lnL>
+                    <a:lnR w="9525" cap="flat" cmpd="sng" algn="ctr">
+                      <a:solidFill>
+                        <a:srgbClr val="9E9E9E"/>
+                      </a:solidFill>
+                      <a:prstDash val="solid"/>
+                      <a:round/>
+                      <a:headEnd type="none" w="med" len="med"/>
+                      <a:tailEnd type="none" w="med" len="med"/>
+                    </a:lnR>
+                    <a:lnT w="9525" cap="flat" cmpd="sng" algn="ctr">
+                      <a:solidFill>
+                        <a:srgbClr val="9E9E9E"/>
+                      </a:solidFill>
+                      <a:prstDash val="solid"/>
+                      <a:round/>
+                      <a:headEnd type="none" w="med" len="med"/>
+                      <a:tailEnd type="none" w="med" len="med"/>
+                    </a:lnT>
+                    <a:lnB w="9525" cap="flat" cmpd="sng" algn="ctr">
+                      <a:solidFill>
+                        <a:srgbClr val="9E9E9E"/>
+                      </a:solidFill>
+                      <a:prstDash val="solid"/>
+                      <a:round/>
+                      <a:headEnd type="none" w="med" len="med"/>
+                      <a:tailEnd type="none" w="med" len="med"/>
+                    </a:lnB>
+                  </a:tcPr>
+                </a:tc>
+                <a:tc>
+                  <a:txBody>
+                    <a:bodyPr/>
+                    <a:lstStyle/>
+                    <a:p>
+                      <a:pPr rtl="0" fontAlgn="t">
+                        <a:spcBef>
+                          <a:spcPts val="0"/>
+                        </a:spcBef>
+                        <a:spcAft>
+                          <a:spcPts val="0"/>
+                        </a:spcAft>
+                      </a:pPr>
+                      <a:r>
+                        <a:rPr lang="en-US" sz="1300" b="0" i="0" u="none" strike="noStrike">
+                          <a:solidFill>
+                            <a:srgbClr val="000000"/>
+                          </a:solidFill>
+                          <a:effectLst/>
+                          <a:latin typeface="Arial" panose="020B0604020202020204" pitchFamily="34" charset="0"/>
+                        </a:rPr>
+                        <a:t>217.2</a:t>
+                      </a:r>
+                      <a:endParaRPr lang="en-US" sz="1300">
+                        <a:effectLst/>
+                      </a:endParaRPr>
+                    </a:p>
+                  </a:txBody>
+                  <a:tcPr marL="69586" marR="69586" marT="69586" marB="69586">
+                    <a:lnL w="9525" cap="flat" cmpd="sng" algn="ctr">
+                      <a:solidFill>
+                        <a:srgbClr val="9E9E9E"/>
+                      </a:solidFill>
+                      <a:prstDash val="solid"/>
+                      <a:round/>
+                      <a:headEnd type="none" w="med" len="med"/>
+                      <a:tailEnd type="none" w="med" len="med"/>
+                    </a:lnL>
+                    <a:lnR w="9525" cap="flat" cmpd="sng" algn="ctr">
+                      <a:solidFill>
+                        <a:srgbClr val="9E9E9E"/>
+                      </a:solidFill>
+                      <a:prstDash val="solid"/>
+                      <a:round/>
+                      <a:headEnd type="none" w="med" len="med"/>
+                      <a:tailEnd type="none" w="med" len="med"/>
+                    </a:lnR>
+                    <a:lnT w="9525" cap="flat" cmpd="sng" algn="ctr">
+                      <a:solidFill>
+                        <a:srgbClr val="9E9E9E"/>
+                      </a:solidFill>
+                      <a:prstDash val="solid"/>
+                      <a:round/>
+                      <a:headEnd type="none" w="med" len="med"/>
+                      <a:tailEnd type="none" w="med" len="med"/>
+                    </a:lnT>
+                    <a:lnB w="9525" cap="flat" cmpd="sng" algn="ctr">
+                      <a:solidFill>
+                        <a:srgbClr val="9E9E9E"/>
+                      </a:solidFill>
+                      <a:prstDash val="solid"/>
+                      <a:round/>
+                      <a:headEnd type="none" w="med" len="med"/>
+                      <a:tailEnd type="none" w="med" len="med"/>
+                    </a:lnB>
+                  </a:tcPr>
+                </a:tc>
+                <a:tc>
+                  <a:txBody>
+                    <a:bodyPr/>
+                    <a:lstStyle/>
+                    <a:p>
+                      <a:pPr rtl="0" fontAlgn="t">
+                        <a:spcBef>
+                          <a:spcPts val="0"/>
+                        </a:spcBef>
+                        <a:spcAft>
+                          <a:spcPts val="0"/>
+                        </a:spcAft>
+                      </a:pPr>
+                      <a:r>
+                        <a:rPr lang="en-US" sz="1300" b="0" i="0" u="none" strike="noStrike" dirty="0">
+                          <a:solidFill>
+                            <a:srgbClr val="000000"/>
+                          </a:solidFill>
+                          <a:effectLst/>
+                          <a:latin typeface="Arial" panose="020B0604020202020204" pitchFamily="34" charset="0"/>
+                        </a:rPr>
+                        <a:t>2226.8</a:t>
+                      </a:r>
+                      <a:endParaRPr lang="en-US" sz="1300" dirty="0">
+                        <a:effectLst/>
+                      </a:endParaRPr>
+                    </a:p>
+                  </a:txBody>
+                  <a:tcPr marL="69586" marR="69586" marT="69586" marB="69586">
+                    <a:lnL w="9525" cap="flat" cmpd="sng" algn="ctr">
+                      <a:solidFill>
+                        <a:srgbClr val="9E9E9E"/>
+                      </a:solidFill>
+                      <a:prstDash val="solid"/>
+                      <a:round/>
+                      <a:headEnd type="none" w="med" len="med"/>
+                      <a:tailEnd type="none" w="med" len="med"/>
+                    </a:lnL>
+                    <a:lnR w="9525" cap="flat" cmpd="sng" algn="ctr">
+                      <a:solidFill>
+                        <a:srgbClr val="9E9E9E"/>
+                      </a:solidFill>
+                      <a:prstDash val="solid"/>
+                      <a:round/>
+                      <a:headEnd type="none" w="med" len="med"/>
+                      <a:tailEnd type="none" w="med" len="med"/>
+                    </a:lnR>
+                    <a:lnT w="9525" cap="flat" cmpd="sng" algn="ctr">
+                      <a:solidFill>
+                        <a:srgbClr val="9E9E9E"/>
+                      </a:solidFill>
+                      <a:prstDash val="solid"/>
+                      <a:round/>
+                      <a:headEnd type="none" w="med" len="med"/>
+                      <a:tailEnd type="none" w="med" len="med"/>
+                    </a:lnT>
+                    <a:lnB w="9525" cap="flat" cmpd="sng" algn="ctr">
+                      <a:solidFill>
+                        <a:srgbClr val="9E9E9E"/>
+                      </a:solidFill>
+                      <a:prstDash val="solid"/>
+                      <a:round/>
+                      <a:headEnd type="none" w="med" len="med"/>
+                      <a:tailEnd type="none" w="med" len="med"/>
+                    </a:lnB>
+                    <a:solidFill>
+                      <a:srgbClr val="FFC000"/>
+                    </a:solidFill>
+                  </a:tcPr>
+                </a:tc>
+              </a:tr>
+            </a:tbl>
+          </a:graphicData>
+        </a:graphic>
+      </p:graphicFrame>
+    </p:spTree>
+    <p:extLst>
+      <p:ext uri="{BB962C8B-B14F-4D97-AF65-F5344CB8AC3E}">
+        <p14:creationId xmlns:p14="http://schemas.microsoft.com/office/powerpoint/2010/main" val="1247755602"/>
       </p:ext>
     </p:extLst>
   </p:cSld>
@@ -22979,6 +25980,205 @@
       </p:par>
     </p:tnLst>
   </p:timing>
+</p:sld>
+</file>
+
+<file path=ppt/slides/slide20.xml><?xml version="1.0" encoding="utf-8"?>
+<p:sld xmlns:a="http://schemas.openxmlformats.org/drawingml/2006/main" xmlns:r="http://schemas.openxmlformats.org/officeDocument/2006/relationships" xmlns:p="http://schemas.openxmlformats.org/presentationml/2006/main">
+  <p:cSld>
+    <p:spTree>
+      <p:nvGrpSpPr>
+        <p:cNvPr id="1" name=""/>
+        <p:cNvGrpSpPr/>
+        <p:nvPr/>
+      </p:nvGrpSpPr>
+      <p:grpSpPr>
+        <a:xfrm>
+          <a:off x="0" y="0"/>
+          <a:ext cx="0" cy="0"/>
+          <a:chOff x="0" y="0"/>
+          <a:chExt cx="0" cy="0"/>
+        </a:xfrm>
+      </p:grpSpPr>
+      <p:sp>
+        <p:nvSpPr>
+          <p:cNvPr id="2" name="Title 1"/>
+          <p:cNvSpPr>
+            <a:spLocks noGrp="1"/>
+          </p:cNvSpPr>
+          <p:nvPr>
+            <p:ph type="title"/>
+          </p:nvPr>
+        </p:nvSpPr>
+        <p:spPr/>
+        <p:txBody>
+          <a:bodyPr/>
+          <a:lstStyle/>
+          <a:p>
+            <a:r>
+              <a:rPr lang="en-US" dirty="0" smtClean="0"/>
+              <a:t>Analysis And Critique</a:t>
+            </a:r>
+            <a:endParaRPr lang="en-US" dirty="0"/>
+          </a:p>
+        </p:txBody>
+      </p:sp>
+      <p:sp>
+        <p:nvSpPr>
+          <p:cNvPr id="3" name="Content Placeholder 2"/>
+          <p:cNvSpPr>
+            <a:spLocks noGrp="1"/>
+          </p:cNvSpPr>
+          <p:nvPr>
+            <p:ph idx="1"/>
+          </p:nvPr>
+        </p:nvSpPr>
+        <p:spPr>
+          <a:xfrm>
+            <a:off x="1295401" y="3768810"/>
+            <a:ext cx="9601196" cy="2107057"/>
+          </a:xfrm>
+        </p:spPr>
+        <p:txBody>
+          <a:bodyPr>
+            <a:normAutofit/>
+          </a:bodyPr>
+          <a:lstStyle/>
+          <a:p>
+            <a:pPr marL="0" indent="0">
+              <a:buNone/>
+            </a:pPr>
+            <a:r>
+              <a:rPr lang="en-US" sz="3300" dirty="0" smtClean="0"/>
+              <a:t>Learning Bayesian Networks is an NP-Complete problem</a:t>
+            </a:r>
+            <a:endParaRPr lang="en-US" sz="3300" dirty="0"/>
+          </a:p>
+        </p:txBody>
+      </p:sp>
+    </p:spTree>
+    <p:extLst>
+      <p:ext uri="{BB962C8B-B14F-4D97-AF65-F5344CB8AC3E}">
+        <p14:creationId xmlns:p14="http://schemas.microsoft.com/office/powerpoint/2010/main" val="1018565470"/>
+      </p:ext>
+    </p:extLst>
+  </p:cSld>
+  <p:clrMapOvr>
+    <a:masterClrMapping/>
+  </p:clrMapOvr>
+</p:sld>
+</file>
+
+<file path=ppt/slides/slide21.xml><?xml version="1.0" encoding="utf-8"?>
+<p:sld xmlns:a="http://schemas.openxmlformats.org/drawingml/2006/main" xmlns:r="http://schemas.openxmlformats.org/officeDocument/2006/relationships" xmlns:p="http://schemas.openxmlformats.org/presentationml/2006/main">
+  <p:cSld>
+    <p:spTree>
+      <p:nvGrpSpPr>
+        <p:cNvPr id="1" name=""/>
+        <p:cNvGrpSpPr/>
+        <p:nvPr/>
+      </p:nvGrpSpPr>
+      <p:grpSpPr>
+        <a:xfrm>
+          <a:off x="0" y="0"/>
+          <a:ext cx="0" cy="0"/>
+          <a:chOff x="0" y="0"/>
+          <a:chExt cx="0" cy="0"/>
+        </a:xfrm>
+      </p:grpSpPr>
+      <p:sp>
+        <p:nvSpPr>
+          <p:cNvPr id="2" name="Title 1"/>
+          <p:cNvSpPr>
+            <a:spLocks noGrp="1"/>
+          </p:cNvSpPr>
+          <p:nvPr>
+            <p:ph type="title"/>
+          </p:nvPr>
+        </p:nvSpPr>
+        <p:spPr/>
+        <p:txBody>
+          <a:bodyPr/>
+          <a:lstStyle/>
+          <a:p>
+            <a:r>
+              <a:rPr lang="en-US" dirty="0" smtClean="0"/>
+              <a:t>Necessary Fixes To Their Approach</a:t>
+            </a:r>
+            <a:endParaRPr lang="en-US" dirty="0"/>
+          </a:p>
+        </p:txBody>
+      </p:sp>
+      <p:sp>
+        <p:nvSpPr>
+          <p:cNvPr id="3" name="Content Placeholder 2"/>
+          <p:cNvSpPr>
+            <a:spLocks noGrp="1"/>
+          </p:cNvSpPr>
+          <p:nvPr>
+            <p:ph idx="1"/>
+          </p:nvPr>
+        </p:nvSpPr>
+        <p:spPr>
+          <a:xfrm>
+            <a:off x="1295401" y="2496066"/>
+            <a:ext cx="9601196" cy="3379802"/>
+          </a:xfrm>
+        </p:spPr>
+        <p:txBody>
+          <a:bodyPr>
+            <a:normAutofit fontScale="92500" lnSpcReduction="20000"/>
+          </a:bodyPr>
+          <a:lstStyle/>
+          <a:p>
+            <a:pPr marL="0" indent="0">
+              <a:buNone/>
+            </a:pPr>
+            <a:r>
+              <a:rPr lang="en-US" sz="3300" dirty="0" smtClean="0"/>
+              <a:t>Prove their algorithm was faster than a specific solution</a:t>
+            </a:r>
+          </a:p>
+          <a:p>
+            <a:pPr marL="0" indent="0">
+              <a:buNone/>
+            </a:pPr>
+            <a:r>
+              <a:rPr lang="en-US" sz="3300" dirty="0" smtClean="0"/>
+              <a:t>Prove their algorithm produced a better approximation than other evolutionary approaches</a:t>
+            </a:r>
+          </a:p>
+          <a:p>
+            <a:pPr marL="0" indent="0">
+              <a:buNone/>
+            </a:pPr>
+            <a:r>
+              <a:rPr lang="en-US" sz="3300" dirty="0" smtClean="0"/>
+              <a:t>Prove their design had better concurrency and potential for parallelization</a:t>
+            </a:r>
+          </a:p>
+          <a:p>
+            <a:pPr marL="0" indent="0">
+              <a:buNone/>
+            </a:pPr>
+            <a:r>
+              <a:rPr lang="en-US" sz="3300" dirty="0" smtClean="0"/>
+              <a:t>Prove an approximation lower-bound through Bayesian Network Selection reduction</a:t>
+            </a:r>
+            <a:endParaRPr lang="en-US" sz="3300" dirty="0"/>
+          </a:p>
+        </p:txBody>
+      </p:sp>
+    </p:spTree>
+    <p:extLst>
+      <p:ext uri="{BB962C8B-B14F-4D97-AF65-F5344CB8AC3E}">
+        <p14:creationId xmlns:p14="http://schemas.microsoft.com/office/powerpoint/2010/main" val="891828653"/>
+      </p:ext>
+    </p:extLst>
+  </p:cSld>
+  <p:clrMapOvr>
+    <a:masterClrMapping/>
+  </p:clrMapOvr>
 </p:sld>
 </file>
 
@@ -24833,6 +28033,65 @@
           <a:chExt cx="0" cy="0"/>
         </a:xfrm>
       </p:grpSpPr>
+      <p:pic>
+        <p:nvPicPr>
+          <p:cNvPr id="4" name="Content Placeholder 3"/>
+          <p:cNvPicPr>
+            <a:picLocks noGrp="1" noChangeAspect="1"/>
+          </p:cNvPicPr>
+          <p:nvPr>
+            <p:ph idx="1"/>
+          </p:nvPr>
+        </p:nvPicPr>
+        <p:blipFill>
+          <a:blip r:embed="rId3">
+            <a:extLst>
+              <a:ext uri="{28A0092B-C50C-407E-A947-70E740481C1C}">
+                <a14:useLocalDpi xmlns:a14="http://schemas.microsoft.com/office/drawing/2010/main" val="0"/>
+              </a:ext>
+            </a:extLst>
+          </a:blip>
+          <a:stretch>
+            <a:fillRect/>
+          </a:stretch>
+        </p:blipFill>
+        <p:spPr>
+          <a:xfrm>
+            <a:off x="1295402" y="839873"/>
+            <a:ext cx="9553830" cy="5232017"/>
+          </a:xfrm>
+        </p:spPr>
+      </p:pic>
+    </p:spTree>
+    <p:extLst>
+      <p:ext uri="{BB962C8B-B14F-4D97-AF65-F5344CB8AC3E}">
+        <p14:creationId xmlns:p14="http://schemas.microsoft.com/office/powerpoint/2010/main" val="1407822003"/>
+      </p:ext>
+    </p:extLst>
+  </p:cSld>
+  <p:clrMapOvr>
+    <a:masterClrMapping/>
+  </p:clrMapOvr>
+</p:sld>
+</file>
+
+<file path=ppt/slides/slide6.xml><?xml version="1.0" encoding="utf-8"?>
+<p:sld xmlns:a="http://schemas.openxmlformats.org/drawingml/2006/main" xmlns:r="http://schemas.openxmlformats.org/officeDocument/2006/relationships" xmlns:p="http://schemas.openxmlformats.org/presentationml/2006/main">
+  <p:cSld>
+    <p:spTree>
+      <p:nvGrpSpPr>
+        <p:cNvPr id="1" name=""/>
+        <p:cNvGrpSpPr/>
+        <p:nvPr/>
+      </p:nvGrpSpPr>
+      <p:grpSpPr>
+        <a:xfrm>
+          <a:off x="0" y="0"/>
+          <a:ext cx="0" cy="0"/>
+          <a:chOff x="0" y="0"/>
+          <a:chExt cx="0" cy="0"/>
+        </a:xfrm>
+      </p:grpSpPr>
       <p:sp>
         <p:nvSpPr>
           <p:cNvPr id="2" name="Title 1"/>
@@ -25430,7 +28689,7 @@
                   </a:outerShdw>
                 </a:effectLst>
               </a:rPr>
-              <a:t>Turkey</a:t>
+              <a:t>Turkey (tasks: cook, wash)</a:t>
             </a:r>
           </a:p>
           <a:p>
@@ -25438,7 +28697,7 @@
               <a:buFont typeface="Arial"/>
               <a:buNone/>
             </a:pPr>
-            <a:endParaRPr lang="en-US" sz="2000" dirty="0">
+            <a:endParaRPr lang="en-US" sz="2000" dirty="0" smtClean="0">
               <a:ln w="0"/>
               <a:solidFill>
                 <a:schemeClr val="tx1"/>
@@ -25458,22 +28717,6 @@
               <a:buNone/>
             </a:pPr>
             <a:r>
-              <a:rPr lang="en-US" sz="2000" dirty="0">
-                <a:ln w="0"/>
-                <a:solidFill>
-                  <a:schemeClr val="tx1"/>
-                </a:solidFill>
-                <a:effectLst>
-                  <a:outerShdw blurRad="38100" dist="19050" dir="2700000" algn="tl" rotWithShape="0">
-                    <a:schemeClr val="dk1">
-                      <a:alpha val="40000"/>
-                    </a:schemeClr>
-                  </a:outerShdw>
-                </a:effectLst>
-              </a:rPr>
-              <a:t>Mashed </a:t>
-            </a:r>
-            <a:r>
               <a:rPr lang="en-US" sz="2000" dirty="0" smtClean="0">
                 <a:ln w="0"/>
                 <a:solidFill>
@@ -25487,7 +28730,7 @@
                   </a:outerShdw>
                 </a:effectLst>
               </a:rPr>
-              <a:t>Potatoes</a:t>
+              <a:t>Mashed Potatoes (tasks: mash)</a:t>
             </a:r>
           </a:p>
           <a:p>
@@ -25495,7 +28738,7 @@
               <a:buFont typeface="Arial"/>
               <a:buNone/>
             </a:pPr>
-            <a:endParaRPr lang="en-US" sz="2000" dirty="0">
+            <a:endParaRPr lang="en-US" sz="2000" dirty="0" smtClean="0">
               <a:ln w="0"/>
               <a:solidFill>
                 <a:schemeClr val="tx1"/>
@@ -25515,7 +28758,7 @@
               <a:buNone/>
             </a:pPr>
             <a:r>
-              <a:rPr lang="en-US" sz="2000" dirty="0">
+              <a:rPr lang="en-US" sz="2000" dirty="0" smtClean="0">
                 <a:ln w="0"/>
                 <a:solidFill>
                   <a:schemeClr val="tx1"/>
@@ -25528,8 +28771,53 @@
                   </a:outerShdw>
                 </a:effectLst>
               </a:rPr>
-              <a:t>Pie</a:t>
+              <a:t>Pie (tasks: stir, mix, cook, </a:t>
             </a:r>
+            <a:r>
+              <a:rPr lang="en-US" sz="2000" dirty="0" err="1" smtClean="0">
+                <a:ln w="0"/>
+                <a:solidFill>
+                  <a:schemeClr val="tx1"/>
+                </a:solidFill>
+                <a:effectLst>
+                  <a:outerShdw blurRad="38100" dist="19050" dir="2700000" algn="tl" rotWithShape="0">
+                    <a:schemeClr val="dk1">
+                      <a:alpha val="40000"/>
+                    </a:schemeClr>
+                  </a:outerShdw>
+                </a:effectLst>
+              </a:rPr>
+              <a:t>etc</a:t>
+            </a:r>
+            <a:r>
+              <a:rPr lang="en-US" sz="2000" dirty="0" smtClean="0">
+                <a:ln w="0"/>
+                <a:solidFill>
+                  <a:schemeClr val="tx1"/>
+                </a:solidFill>
+                <a:effectLst>
+                  <a:outerShdw blurRad="38100" dist="19050" dir="2700000" algn="tl" rotWithShape="0">
+                    <a:schemeClr val="dk1">
+                      <a:alpha val="40000"/>
+                    </a:schemeClr>
+                  </a:outerShdw>
+                </a:effectLst>
+              </a:rPr>
+              <a:t>)</a:t>
+            </a:r>
+            <a:endParaRPr lang="en-US" sz="2000" dirty="0">
+              <a:ln w="0"/>
+              <a:solidFill>
+                <a:schemeClr val="tx1"/>
+              </a:solidFill>
+              <a:effectLst>
+                <a:outerShdw blurRad="38100" dist="19050" dir="2700000" algn="tl" rotWithShape="0">
+                  <a:schemeClr val="dk1">
+                    <a:alpha val="40000"/>
+                  </a:schemeClr>
+                </a:outerShdw>
+              </a:effectLst>
+            </a:endParaRPr>
           </a:p>
         </p:txBody>
       </p:sp>
@@ -25537,82 +28825,6 @@
     <p:extLst>
       <p:ext uri="{BB962C8B-B14F-4D97-AF65-F5344CB8AC3E}">
         <p14:creationId xmlns:p14="http://schemas.microsoft.com/office/powerpoint/2010/main" val="2810622793"/>
-      </p:ext>
-    </p:extLst>
-  </p:cSld>
-  <p:clrMapOvr>
-    <a:masterClrMapping/>
-  </p:clrMapOvr>
-</p:sld>
-</file>
-
-<file path=ppt/slides/slide6.xml><?xml version="1.0" encoding="utf-8"?>
-<p:sld xmlns:a="http://schemas.openxmlformats.org/drawingml/2006/main" xmlns:r="http://schemas.openxmlformats.org/officeDocument/2006/relationships" xmlns:p="http://schemas.openxmlformats.org/presentationml/2006/main">
-  <p:cSld>
-    <p:spTree>
-      <p:nvGrpSpPr>
-        <p:cNvPr id="1" name=""/>
-        <p:cNvGrpSpPr/>
-        <p:nvPr/>
-      </p:nvGrpSpPr>
-      <p:grpSpPr>
-        <a:xfrm>
-          <a:off x="0" y="0"/>
-          <a:ext cx="0" cy="0"/>
-          <a:chOff x="0" y="0"/>
-          <a:chExt cx="0" cy="0"/>
-        </a:xfrm>
-      </p:grpSpPr>
-      <p:sp>
-        <p:nvSpPr>
-          <p:cNvPr id="2" name="Title 1"/>
-          <p:cNvSpPr>
-            <a:spLocks noGrp="1"/>
-          </p:cNvSpPr>
-          <p:nvPr>
-            <p:ph type="title"/>
-          </p:nvPr>
-        </p:nvSpPr>
-        <p:spPr/>
-        <p:txBody>
-          <a:bodyPr/>
-          <a:lstStyle/>
-          <a:p>
-            <a:r>
-              <a:rPr lang="en-US" dirty="0" smtClean="0"/>
-              <a:t>Ideal Turkey Sequence</a:t>
-            </a:r>
-            <a:endParaRPr lang="en-US" dirty="0"/>
-          </a:p>
-        </p:txBody>
-      </p:sp>
-      <p:sp>
-        <p:nvSpPr>
-          <p:cNvPr id="3" name="Content Placeholder 2"/>
-          <p:cNvSpPr>
-            <a:spLocks noGrp="1"/>
-          </p:cNvSpPr>
-          <p:nvPr>
-            <p:ph idx="1"/>
-          </p:nvPr>
-        </p:nvSpPr>
-        <p:spPr/>
-        <p:txBody>
-          <a:bodyPr/>
-          <a:lstStyle/>
-          <a:p>
-            <a:r>
-              <a:rPr lang="en-US" dirty="0" smtClean="0"/>
-              <a:t>Add picture sequence</a:t>
-            </a:r>
-            <a:endParaRPr lang="en-US" dirty="0"/>
-          </a:p>
-        </p:txBody>
-      </p:sp>
-    </p:spTree>
-    <p:extLst>
-      <p:ext uri="{BB962C8B-B14F-4D97-AF65-F5344CB8AC3E}">
-        <p14:creationId xmlns:p14="http://schemas.microsoft.com/office/powerpoint/2010/main" val="686018247"/>
       </p:ext>
     </p:extLst>
   </p:cSld>
@@ -25649,48 +28861,58 @@
             <p:ph type="title"/>
           </p:nvPr>
         </p:nvSpPr>
-        <p:spPr/>
+        <p:spPr>
+          <a:xfrm>
+            <a:off x="1295401" y="421693"/>
+            <a:ext cx="9601196" cy="1303867"/>
+          </a:xfrm>
+        </p:spPr>
         <p:txBody>
           <a:bodyPr/>
           <a:lstStyle/>
           <a:p>
             <a:r>
               <a:rPr lang="en-US" dirty="0" smtClean="0"/>
-              <a:t>Ideal Mashed Potatoes Sequence</a:t>
+              <a:t>Ideal Turkey Sequence</a:t>
             </a:r>
             <a:endParaRPr lang="en-US" dirty="0"/>
           </a:p>
         </p:txBody>
       </p:sp>
-      <p:sp>
-        <p:nvSpPr>
-          <p:cNvPr id="3" name="Content Placeholder 2"/>
-          <p:cNvSpPr>
-            <a:spLocks noGrp="1"/>
-          </p:cNvSpPr>
-          <p:nvPr>
-            <p:ph idx="1"/>
-          </p:nvPr>
-        </p:nvSpPr>
-        <p:spPr/>
-        <p:txBody>
-          <a:bodyPr/>
-          <a:lstStyle/>
-          <a:p>
-            <a:r>
-              <a:rPr lang="en-US" dirty="0"/>
-              <a:t>Add picture sequence</a:t>
-            </a:r>
-          </a:p>
-          <a:p>
-            <a:endParaRPr lang="en-US" dirty="0"/>
-          </a:p>
-        </p:txBody>
-      </p:sp>
+      <p:pic>
+        <p:nvPicPr>
+          <p:cNvPr id="4" name="Picture 3"/>
+          <p:cNvPicPr>
+            <a:picLocks noChangeAspect="1"/>
+          </p:cNvPicPr>
+          <p:nvPr/>
+        </p:nvPicPr>
+        <p:blipFill>
+          <a:blip r:embed="rId2">
+            <a:extLst>
+              <a:ext uri="{28A0092B-C50C-407E-A947-70E740481C1C}">
+                <a14:useLocalDpi xmlns:a14="http://schemas.microsoft.com/office/drawing/2010/main" val="0"/>
+              </a:ext>
+            </a:extLst>
+          </a:blip>
+          <a:stretch>
+            <a:fillRect/>
+          </a:stretch>
+        </p:blipFill>
+        <p:spPr>
+          <a:xfrm>
+            <a:off x="1295401" y="1481642"/>
+            <a:ext cx="9601196" cy="4486671"/>
+          </a:xfrm>
+          <a:prstGeom prst="rect">
+            <a:avLst/>
+          </a:prstGeom>
+        </p:spPr>
+      </p:pic>
     </p:spTree>
     <p:extLst>
       <p:ext uri="{BB962C8B-B14F-4D97-AF65-F5344CB8AC3E}">
-        <p14:creationId xmlns:p14="http://schemas.microsoft.com/office/powerpoint/2010/main" val="1898329433"/>
+        <p14:creationId xmlns:p14="http://schemas.microsoft.com/office/powerpoint/2010/main" val="686018247"/>
       </p:ext>
     </p:extLst>
   </p:cSld>
@@ -25727,50 +28949,58 @@
             <p:ph type="title"/>
           </p:nvPr>
         </p:nvSpPr>
-        <p:spPr/>
+        <p:spPr>
+          <a:xfrm>
+            <a:off x="1295401" y="401364"/>
+            <a:ext cx="9601196" cy="1303867"/>
+          </a:xfrm>
+        </p:spPr>
         <p:txBody>
-          <a:bodyPr>
-            <a:normAutofit/>
-          </a:bodyPr>
+          <a:bodyPr/>
           <a:lstStyle/>
           <a:p>
             <a:r>
               <a:rPr lang="en-US" dirty="0" smtClean="0"/>
-              <a:t>Ideal Pie Sequence</a:t>
+              <a:t>Ideal Mashed Potatoes Sequence</a:t>
             </a:r>
             <a:endParaRPr lang="en-US" dirty="0"/>
           </a:p>
         </p:txBody>
       </p:sp>
-      <p:sp>
-        <p:nvSpPr>
-          <p:cNvPr id="3" name="Content Placeholder 2"/>
-          <p:cNvSpPr>
-            <a:spLocks noGrp="1"/>
-          </p:cNvSpPr>
-          <p:nvPr>
-            <p:ph idx="1"/>
-          </p:nvPr>
-        </p:nvSpPr>
-        <p:spPr/>
-        <p:txBody>
-          <a:bodyPr/>
-          <a:lstStyle/>
-          <a:p>
-            <a:r>
-              <a:rPr lang="en-US" dirty="0"/>
-              <a:t>Add picture sequence</a:t>
-            </a:r>
-          </a:p>
-          <a:p>
-            <a:endParaRPr lang="en-US" dirty="0"/>
-          </a:p>
-        </p:txBody>
-      </p:sp>
+      <p:pic>
+        <p:nvPicPr>
+          <p:cNvPr id="5" name="Picture 4"/>
+          <p:cNvPicPr>
+            <a:picLocks noChangeAspect="1"/>
+          </p:cNvPicPr>
+          <p:nvPr/>
+        </p:nvPicPr>
+        <p:blipFill>
+          <a:blip r:embed="rId2">
+            <a:extLst>
+              <a:ext uri="{28A0092B-C50C-407E-A947-70E740481C1C}">
+                <a14:useLocalDpi xmlns:a14="http://schemas.microsoft.com/office/drawing/2010/main" val="0"/>
+              </a:ext>
+            </a:extLst>
+          </a:blip>
+          <a:stretch>
+            <a:fillRect/>
+          </a:stretch>
+        </p:blipFill>
+        <p:spPr>
+          <a:xfrm>
+            <a:off x="1295401" y="1458098"/>
+            <a:ext cx="9601196" cy="4605967"/>
+          </a:xfrm>
+          <a:prstGeom prst="rect">
+            <a:avLst/>
+          </a:prstGeom>
+        </p:spPr>
+      </p:pic>
     </p:spTree>
     <p:extLst>
       <p:ext uri="{BB962C8B-B14F-4D97-AF65-F5344CB8AC3E}">
-        <p14:creationId xmlns:p14="http://schemas.microsoft.com/office/powerpoint/2010/main" val="1807468133"/>
+        <p14:creationId xmlns:p14="http://schemas.microsoft.com/office/powerpoint/2010/main" val="1898329433"/>
       </p:ext>
     </p:extLst>
   </p:cSld>
@@ -25807,92 +29037,60 @@
             <p:ph type="title"/>
           </p:nvPr>
         </p:nvSpPr>
-        <p:spPr/>
+        <p:spPr>
+          <a:xfrm>
+            <a:off x="1295401" y="389007"/>
+            <a:ext cx="9601196" cy="1303867"/>
+          </a:xfrm>
+        </p:spPr>
         <p:txBody>
-          <a:bodyPr/>
+          <a:bodyPr>
+            <a:normAutofit/>
+          </a:bodyPr>
           <a:lstStyle/>
           <a:p>
             <a:r>
               <a:rPr lang="en-US" dirty="0" smtClean="0"/>
-              <a:t>The Algorithm: Step 0</a:t>
+              <a:t>Ideal Pie Sequence</a:t>
             </a:r>
             <a:endParaRPr lang="en-US" dirty="0"/>
           </a:p>
         </p:txBody>
       </p:sp>
-      <p:graphicFrame>
-        <p:nvGraphicFramePr>
-          <p:cNvPr id="4" name="Content Placeholder 3"/>
-          <p:cNvGraphicFramePr>
-            <a:graphicFrameLocks noGrp="1"/>
-          </p:cNvGraphicFramePr>
-          <p:nvPr>
-            <p:ph idx="1"/>
-            <p:extLst>
-              <p:ext uri="{D42A27DB-BD31-4B8C-83A1-F6EECF244321}">
-                <p14:modId xmlns:p14="http://schemas.microsoft.com/office/powerpoint/2010/main" val="2794503589"/>
-              </p:ext>
-            </p:extLst>
-          </p:nvPr>
-        </p:nvGraphicFramePr>
-        <p:xfrm>
-          <a:off x="1295400" y="2557463"/>
-          <a:ext cx="4787348" cy="3317875"/>
-        </p:xfrm>
-        <a:graphic>
-          <a:graphicData uri="http://schemas.openxmlformats.org/drawingml/2006/diagram">
-            <dgm:relIds xmlns:dgm="http://schemas.openxmlformats.org/drawingml/2006/diagram" xmlns:r="http://schemas.openxmlformats.org/officeDocument/2006/relationships" r:dm="rId3" r:lo="rId4" r:qs="rId5" r:cs="rId6"/>
-          </a:graphicData>
-        </a:graphic>
-      </p:graphicFrame>
-      <p:graphicFrame>
-        <p:nvGraphicFramePr>
-          <p:cNvPr id="8" name="Diagram 7"/>
-          <p:cNvGraphicFramePr/>
-          <p:nvPr>
-            <p:extLst>
-              <p:ext uri="{D42A27DB-BD31-4B8C-83A1-F6EECF244321}">
-                <p14:modId xmlns:p14="http://schemas.microsoft.com/office/powerpoint/2010/main" val="1267885093"/>
-              </p:ext>
-            </p:extLst>
-          </p:nvPr>
-        </p:nvGraphicFramePr>
-        <p:xfrm>
-          <a:off x="1295402" y="2514600"/>
-          <a:ext cx="4787346" cy="3667539"/>
-        </p:xfrm>
-        <a:graphic>
-          <a:graphicData uri="http://schemas.openxmlformats.org/drawingml/2006/diagram">
-            <dgm:relIds xmlns:dgm="http://schemas.openxmlformats.org/drawingml/2006/diagram" xmlns:r="http://schemas.openxmlformats.org/officeDocument/2006/relationships" r:dm="rId8" r:lo="rId9" r:qs="rId10" r:cs="rId11"/>
-          </a:graphicData>
-        </a:graphic>
-      </p:graphicFrame>
-      <p:graphicFrame>
-        <p:nvGraphicFramePr>
-          <p:cNvPr id="9" name="Diagram 8"/>
-          <p:cNvGraphicFramePr/>
-          <p:nvPr>
-            <p:extLst>
-              <p:ext uri="{D42A27DB-BD31-4B8C-83A1-F6EECF244321}">
-                <p14:modId xmlns:p14="http://schemas.microsoft.com/office/powerpoint/2010/main" val="701157009"/>
-              </p:ext>
-            </p:extLst>
-          </p:nvPr>
-        </p:nvGraphicFramePr>
-        <p:xfrm>
-          <a:off x="6348894" y="2484783"/>
-          <a:ext cx="4547704" cy="3633672"/>
-        </p:xfrm>
-        <a:graphic>
-          <a:graphicData uri="http://schemas.openxmlformats.org/drawingml/2006/diagram">
-            <dgm:relIds xmlns:dgm="http://schemas.openxmlformats.org/drawingml/2006/diagram" xmlns:r="http://schemas.openxmlformats.org/officeDocument/2006/relationships" r:dm="rId13" r:lo="rId14" r:qs="rId15" r:cs="rId16"/>
-          </a:graphicData>
-        </a:graphic>
-      </p:graphicFrame>
+      <p:pic>
+        <p:nvPicPr>
+          <p:cNvPr id="5" name="Picture 4"/>
+          <p:cNvPicPr>
+            <a:picLocks noChangeAspect="1"/>
+          </p:cNvPicPr>
+          <p:nvPr/>
+        </p:nvPicPr>
+        <p:blipFill>
+          <a:blip r:embed="rId2">
+            <a:extLst>
+              <a:ext uri="{28A0092B-C50C-407E-A947-70E740481C1C}">
+                <a14:useLocalDpi xmlns:a14="http://schemas.microsoft.com/office/drawing/2010/main" val="0"/>
+              </a:ext>
+            </a:extLst>
+          </a:blip>
+          <a:stretch>
+            <a:fillRect/>
+          </a:stretch>
+        </p:blipFill>
+        <p:spPr>
+          <a:xfrm>
+            <a:off x="1295401" y="1340075"/>
+            <a:ext cx="9601196" cy="4727093"/>
+          </a:xfrm>
+          <a:prstGeom prst="rect">
+            <a:avLst/>
+          </a:prstGeom>
+        </p:spPr>
+      </p:pic>
     </p:spTree>
     <p:extLst>
       <p:ext uri="{BB962C8B-B14F-4D97-AF65-F5344CB8AC3E}">
-        <p14:creationId xmlns:p14="http://schemas.microsoft.com/office/powerpoint/2010/main" val="2522614037"/>
+        <p14:creationId xmlns:p14="http://schemas.microsoft.com/office/powerpoint/2010/main" val="1807468133"/>
       </p:ext>
     </p:extLst>
   </p:cSld>

</xml_diff>

<commit_message>
Added script to most of the remaining slides
</commit_message>
<xml_diff>
--- a/PowerpointSlides/The Flexible Job Shop Scheduling Algorithm.pptx
+++ b/PowerpointSlides/The Flexible Job Shop Scheduling Algorithm.pptx
@@ -158,7 +158,7 @@
       </p14:sectionLst>
     </p:ext>
     <p:ext uri="{EFAFB233-063F-42B5-8137-9DF3F51BA10A}">
-      <p15:sldGuideLst xmlns:p15="http://schemas.microsoft.com/office/powerpoint/2012/main"/>
+      <p15:sldGuideLst xmlns:p15="http://schemas.microsoft.com/office/powerpoint/2012/main" xmlns=""/>
     </p:ext>
   </p:extLst>
 </p:presentation>
@@ -3926,7 +3926,7 @@
                       <m:sSubPr>
                         <m:ctrlPr>
                           <a:rPr lang="en-US" sz="2500" b="0" i="1" smtClean="0">
-                            <a:latin typeface="Cambria Math" panose="02040503050406030204" pitchFamily="18" charset="0"/>
+                            <a:latin typeface="Cambria Math"/>
                           </a:rPr>
                         </m:ctrlPr>
                       </m:sSubPr>
@@ -3953,7 +3953,7 @@
                         <m:vertJc m:val="bot"/>
                         <m:ctrlPr>
                           <a:rPr lang="en-US" sz="2500" b="0" i="1" smtClean="0">
-                            <a:latin typeface="Cambria Math" panose="02040503050406030204" pitchFamily="18" charset="0"/>
+                            <a:latin typeface="Cambria Math"/>
                           </a:rPr>
                         </m:ctrlPr>
                       </m:groupChrPr>
@@ -4039,7 +4039,7 @@
                       <m:sSubPr>
                         <m:ctrlPr>
                           <a:rPr lang="en-US" b="0" i="1" smtClean="0">
-                            <a:latin typeface="Cambria Math" panose="02040503050406030204" pitchFamily="18" charset="0"/>
+                            <a:latin typeface="Cambria Math"/>
                           </a:rPr>
                         </m:ctrlPr>
                       </m:sSubPr>
@@ -4130,7 +4130,7 @@
                       <m:sSubPr>
                         <m:ctrlPr>
                           <a:rPr lang="en-US" b="0" i="1" smtClean="0">
-                            <a:latin typeface="Cambria Math" panose="02040503050406030204" pitchFamily="18" charset="0"/>
+                            <a:latin typeface="Cambria Math"/>
                           </a:rPr>
                         </m:ctrlPr>
                       </m:sSubPr>
@@ -4221,7 +4221,7 @@
                       <m:sSubPr>
                         <m:ctrlPr>
                           <a:rPr lang="en-US" b="0" i="1" smtClean="0">
-                            <a:latin typeface="Cambria Math" panose="02040503050406030204" pitchFamily="18" charset="0"/>
+                            <a:latin typeface="Cambria Math"/>
                           </a:rPr>
                         </m:ctrlPr>
                       </m:sSubPr>
@@ -4739,7 +4739,7 @@
                       <m:sSubPr>
                         <m:ctrlPr>
                           <a:rPr lang="en-US" sz="2500" b="0" i="1" smtClean="0">
-                            <a:latin typeface="Cambria Math" panose="02040503050406030204" pitchFamily="18" charset="0"/>
+                            <a:latin typeface="Cambria Math"/>
                           </a:rPr>
                         </m:ctrlPr>
                       </m:sSubPr>
@@ -4766,7 +4766,7 @@
                         <m:vertJc m:val="bot"/>
                         <m:ctrlPr>
                           <a:rPr lang="en-US" sz="2500" b="0" i="1" smtClean="0">
-                            <a:latin typeface="Cambria Math" panose="02040503050406030204" pitchFamily="18" charset="0"/>
+                            <a:latin typeface="Cambria Math"/>
                           </a:rPr>
                         </m:ctrlPr>
                       </m:groupChrPr>
@@ -4852,7 +4852,7 @@
                       <m:sSubPr>
                         <m:ctrlPr>
                           <a:rPr lang="en-US" b="0" i="1" smtClean="0">
-                            <a:latin typeface="Cambria Math" panose="02040503050406030204" pitchFamily="18" charset="0"/>
+                            <a:latin typeface="Cambria Math"/>
                           </a:rPr>
                         </m:ctrlPr>
                       </m:sSubPr>
@@ -4943,7 +4943,7 @@
                       <m:sSubPr>
                         <m:ctrlPr>
                           <a:rPr lang="en-US" b="0" i="1" smtClean="0">
-                            <a:latin typeface="Cambria Math" panose="02040503050406030204" pitchFamily="18" charset="0"/>
+                            <a:latin typeface="Cambria Math"/>
                           </a:rPr>
                         </m:ctrlPr>
                       </m:sSubPr>
@@ -5034,7 +5034,7 @@
                       <m:sSubPr>
                         <m:ctrlPr>
                           <a:rPr lang="en-US" b="0" i="1" smtClean="0">
-                            <a:latin typeface="Cambria Math" panose="02040503050406030204" pitchFamily="18" charset="0"/>
+                            <a:latin typeface="Cambria Math"/>
                           </a:rPr>
                         </m:ctrlPr>
                       </m:sSubPr>
@@ -6091,26 +6091,26 @@
     </dgm:pt>
   </dgm:ptLst>
   <dgm:cxnLst>
-    <dgm:cxn modelId="{3F5C4484-5176-44CD-BF9F-B7483A83AE5A}" type="presOf" srcId="{6535251D-CE69-486C-AA49-296365C61330}" destId="{3C44D76E-9FB3-49E4-A2C5-45A50C3747E3}" srcOrd="0" destOrd="1" presId="urn:microsoft.com/office/officeart/2005/8/layout/vList5"/>
-    <dgm:cxn modelId="{7FE8304E-2C64-4273-ABD8-432666742D76}" srcId="{F8D430A9-9D4B-4237-B376-3AC88A217C17}" destId="{3A519B6F-579E-402E-92C0-35C02DFE4531}" srcOrd="0" destOrd="0" parTransId="{B469A8B0-8BFA-4790-807C-BECB3D88F4EE}" sibTransId="{D5AB5024-C817-4104-B2A4-32A87750A027}"/>
-    <dgm:cxn modelId="{FCEEFDB7-1954-44ED-AAB5-0102629CFBEA}" srcId="{DB494FB3-4C83-425E-B57D-DE4B419A94CA}" destId="{6535251D-CE69-486C-AA49-296365C61330}" srcOrd="1" destOrd="0" parTransId="{6CBE97C1-E9DB-4026-899A-F176780697ED}" sibTransId="{64FC8F17-8DC0-449B-B17B-7599789AD2EA}"/>
+    <dgm:cxn modelId="{B0182764-C40C-47CF-8079-A12DAECD4BC0}" type="presOf" srcId="{793B8403-C520-42DF-92D8-4983CB60A66E}" destId="{2B5A0373-7151-498E-8BC9-31CB89C69073}" srcOrd="0" destOrd="0" presId="urn:microsoft.com/office/officeart/2005/8/layout/vList5"/>
     <dgm:cxn modelId="{38E86039-8411-4DB4-A2B9-E651DED0B3EF}" srcId="{793B8403-C520-42DF-92D8-4983CB60A66E}" destId="{8AF7819C-4751-45AC-8B2F-BFD5091F36A0}" srcOrd="2" destOrd="0" parTransId="{D0D1C28F-2615-421F-8952-BAE7D52961D5}" sibTransId="{A1F6137A-A425-4A11-9BB5-143E598D9FEA}"/>
-    <dgm:cxn modelId="{B0182764-C40C-47CF-8079-A12DAECD4BC0}" type="presOf" srcId="{793B8403-C520-42DF-92D8-4983CB60A66E}" destId="{2B5A0373-7151-498E-8BC9-31CB89C69073}" srcOrd="0" destOrd="0" presId="urn:microsoft.com/office/officeart/2005/8/layout/vList5"/>
-    <dgm:cxn modelId="{59EC4863-1E9D-433C-84B3-5638A95543F2}" type="presOf" srcId="{15FA0D52-ED90-408B-9458-3EE3CF5F5D04}" destId="{1F21F52F-D26F-479D-8E0A-24493E9863BD}" srcOrd="0" destOrd="0" presId="urn:microsoft.com/office/officeart/2005/8/layout/vList5"/>
-    <dgm:cxn modelId="{2996A214-41A3-466C-A958-AB188432A503}" type="presOf" srcId="{AC236F7B-EA4B-4CDD-AD05-9FD10214A9B4}" destId="{3C44D76E-9FB3-49E4-A2C5-45A50C3747E3}" srcOrd="0" destOrd="0" presId="urn:microsoft.com/office/officeart/2005/8/layout/vList5"/>
-    <dgm:cxn modelId="{50935B81-EFE0-47A1-A692-2E6BCBE6715E}" type="presOf" srcId="{A80A2701-359C-427B-A85D-7BFE0AF524E7}" destId="{1F081EDC-561C-4939-9AAE-B5658EDF3295}" srcOrd="0" destOrd="0" presId="urn:microsoft.com/office/officeart/2005/8/layout/vList5"/>
-    <dgm:cxn modelId="{12EEFF1B-25C1-4C83-8FA3-2AE57F7CB064}" srcId="{15FA0D52-ED90-408B-9458-3EE3CF5F5D04}" destId="{DB494FB3-4C83-425E-B57D-DE4B419A94CA}" srcOrd="2" destOrd="0" parTransId="{227E49AB-F962-4CBC-A85C-F0E66BEF0C20}" sibTransId="{71B0F14E-9D4F-4539-8722-E593D246DC07}"/>
-    <dgm:cxn modelId="{B2478C36-A74D-4E5B-A187-647CB14A24EF}" srcId="{793B8403-C520-42DF-92D8-4983CB60A66E}" destId="{A80A2701-359C-427B-A85D-7BFE0AF524E7}" srcOrd="0" destOrd="0" parTransId="{0D4FAFDE-141C-4A39-A945-262BF07D6F63}" sibTransId="{0D5018A7-2513-4992-996B-38A07240F8DB}"/>
-    <dgm:cxn modelId="{71399A94-E652-4387-95BD-055655FFA0F7}" type="presOf" srcId="{0C750A3F-B89B-4693-9219-2CBAF65FEC35}" destId="{A33C5EBD-7AE5-441F-B876-58FC95DC293A}" srcOrd="0" destOrd="1" presId="urn:microsoft.com/office/officeart/2005/8/layout/vList5"/>
-    <dgm:cxn modelId="{AADA8FCF-ADAF-4B36-846E-CD14DFFA3847}" type="presOf" srcId="{F8D430A9-9D4B-4237-B376-3AC88A217C17}" destId="{3EAB476F-2628-442F-ADE4-56775120E15D}" srcOrd="0" destOrd="0" presId="urn:microsoft.com/office/officeart/2005/8/layout/vList5"/>
-    <dgm:cxn modelId="{BC67575D-B0F2-42CD-ACF9-EF59B437CF04}" srcId="{DB494FB3-4C83-425E-B57D-DE4B419A94CA}" destId="{AC236F7B-EA4B-4CDD-AD05-9FD10214A9B4}" srcOrd="0" destOrd="0" parTransId="{CC6FF8C3-1BAA-4894-8E53-F11AC09478F0}" sibTransId="{09099576-170A-4CFA-88C1-3DC3EA34DA83}"/>
     <dgm:cxn modelId="{379523B0-6AFA-4929-A008-C65C2A66070B}" srcId="{15FA0D52-ED90-408B-9458-3EE3CF5F5D04}" destId="{F8D430A9-9D4B-4237-B376-3AC88A217C17}" srcOrd="1" destOrd="0" parTransId="{DE114CBD-D50D-4AEF-B6D7-2E8175168BF6}" sibTransId="{602D8F26-E76E-4065-B867-75C0D48688A0}"/>
     <dgm:cxn modelId="{4FD106CC-BDC4-4640-8DD7-6027E1C20CB0}" type="presOf" srcId="{FAC6CBB4-F142-4F67-A29E-53EFE3FDB916}" destId="{1F081EDC-561C-4939-9AAE-B5658EDF3295}" srcOrd="0" destOrd="1" presId="urn:microsoft.com/office/officeart/2005/8/layout/vList5"/>
+    <dgm:cxn modelId="{B2478C36-A74D-4E5B-A187-647CB14A24EF}" srcId="{793B8403-C520-42DF-92D8-4983CB60A66E}" destId="{A80A2701-359C-427B-A85D-7BFE0AF524E7}" srcOrd="0" destOrd="0" parTransId="{0D4FAFDE-141C-4A39-A945-262BF07D6F63}" sibTransId="{0D5018A7-2513-4992-996B-38A07240F8DB}"/>
+    <dgm:cxn modelId="{2996A214-41A3-466C-A958-AB188432A503}" type="presOf" srcId="{AC236F7B-EA4B-4CDD-AD05-9FD10214A9B4}" destId="{3C44D76E-9FB3-49E4-A2C5-45A50C3747E3}" srcOrd="0" destOrd="0" presId="urn:microsoft.com/office/officeart/2005/8/layout/vList5"/>
     <dgm:cxn modelId="{C4BC9101-0CC5-4662-A1E1-A2F8F93C4507}" type="presOf" srcId="{DB494FB3-4C83-425E-B57D-DE4B419A94CA}" destId="{4CA2034B-48AA-4090-BDED-8C4EF49A0B4A}" srcOrd="0" destOrd="0" presId="urn:microsoft.com/office/officeart/2005/8/layout/vList5"/>
-    <dgm:cxn modelId="{8369A3D2-9E6D-464A-BDB3-122336DB0474}" srcId="{F8D430A9-9D4B-4237-B376-3AC88A217C17}" destId="{0C750A3F-B89B-4693-9219-2CBAF65FEC35}" srcOrd="1" destOrd="0" parTransId="{C2874EAF-C2C5-4C61-8FF3-6403B790AF5D}" sibTransId="{7DF2B160-7E77-4ABF-9421-1C46F59A83B8}"/>
+    <dgm:cxn modelId="{59EC4863-1E9D-433C-84B3-5638A95543F2}" type="presOf" srcId="{15FA0D52-ED90-408B-9458-3EE3CF5F5D04}" destId="{1F21F52F-D26F-479D-8E0A-24493E9863BD}" srcOrd="0" destOrd="0" presId="urn:microsoft.com/office/officeart/2005/8/layout/vList5"/>
+    <dgm:cxn modelId="{7FE8304E-2C64-4273-ABD8-432666742D76}" srcId="{F8D430A9-9D4B-4237-B376-3AC88A217C17}" destId="{3A519B6F-579E-402E-92C0-35C02DFE4531}" srcOrd="0" destOrd="0" parTransId="{B469A8B0-8BFA-4790-807C-BECB3D88F4EE}" sibTransId="{D5AB5024-C817-4104-B2A4-32A87750A027}"/>
+    <dgm:cxn modelId="{12EEFF1B-25C1-4C83-8FA3-2AE57F7CB064}" srcId="{15FA0D52-ED90-408B-9458-3EE3CF5F5D04}" destId="{DB494FB3-4C83-425E-B57D-DE4B419A94CA}" srcOrd="2" destOrd="0" parTransId="{227E49AB-F962-4CBC-A85C-F0E66BEF0C20}" sibTransId="{71B0F14E-9D4F-4539-8722-E593D246DC07}"/>
+    <dgm:cxn modelId="{50935B81-EFE0-47A1-A692-2E6BCBE6715E}" type="presOf" srcId="{A80A2701-359C-427B-A85D-7BFE0AF524E7}" destId="{1F081EDC-561C-4939-9AAE-B5658EDF3295}" srcOrd="0" destOrd="0" presId="urn:microsoft.com/office/officeart/2005/8/layout/vList5"/>
+    <dgm:cxn modelId="{71399A94-E652-4387-95BD-055655FFA0F7}" type="presOf" srcId="{0C750A3F-B89B-4693-9219-2CBAF65FEC35}" destId="{A33C5EBD-7AE5-441F-B876-58FC95DC293A}" srcOrd="0" destOrd="1" presId="urn:microsoft.com/office/officeart/2005/8/layout/vList5"/>
+    <dgm:cxn modelId="{6EB58818-6112-4805-86F7-60495D3ECB12}" srcId="{793B8403-C520-42DF-92D8-4983CB60A66E}" destId="{FAC6CBB4-F142-4F67-A29E-53EFE3FDB916}" srcOrd="1" destOrd="0" parTransId="{84C2E18F-B36C-46AE-AC84-CAACD58ED400}" sibTransId="{6F0E4CDB-096A-414C-891C-9A851E6D3347}"/>
     <dgm:cxn modelId="{EBCAAAEB-FB21-4982-AB01-448315A26A30}" srcId="{15FA0D52-ED90-408B-9458-3EE3CF5F5D04}" destId="{793B8403-C520-42DF-92D8-4983CB60A66E}" srcOrd="0" destOrd="0" parTransId="{780C187E-4ABA-4FDD-8B7C-BBA064945456}" sibTransId="{A1BC0807-C9C0-4E49-91A6-F7B59302B132}"/>
     <dgm:cxn modelId="{E13BEFDC-CDD8-4878-947F-121D6F1EF694}" type="presOf" srcId="{8AF7819C-4751-45AC-8B2F-BFD5091F36A0}" destId="{1F081EDC-561C-4939-9AAE-B5658EDF3295}" srcOrd="0" destOrd="2" presId="urn:microsoft.com/office/officeart/2005/8/layout/vList5"/>
-    <dgm:cxn modelId="{6EB58818-6112-4805-86F7-60495D3ECB12}" srcId="{793B8403-C520-42DF-92D8-4983CB60A66E}" destId="{FAC6CBB4-F142-4F67-A29E-53EFE3FDB916}" srcOrd="1" destOrd="0" parTransId="{84C2E18F-B36C-46AE-AC84-CAACD58ED400}" sibTransId="{6F0E4CDB-096A-414C-891C-9A851E6D3347}"/>
+    <dgm:cxn modelId="{8369A3D2-9E6D-464A-BDB3-122336DB0474}" srcId="{F8D430A9-9D4B-4237-B376-3AC88A217C17}" destId="{0C750A3F-B89B-4693-9219-2CBAF65FEC35}" srcOrd="1" destOrd="0" parTransId="{C2874EAF-C2C5-4C61-8FF3-6403B790AF5D}" sibTransId="{7DF2B160-7E77-4ABF-9421-1C46F59A83B8}"/>
+    <dgm:cxn modelId="{BC67575D-B0F2-42CD-ACF9-EF59B437CF04}" srcId="{DB494FB3-4C83-425E-B57D-DE4B419A94CA}" destId="{AC236F7B-EA4B-4CDD-AD05-9FD10214A9B4}" srcOrd="0" destOrd="0" parTransId="{CC6FF8C3-1BAA-4894-8E53-F11AC09478F0}" sibTransId="{09099576-170A-4CFA-88C1-3DC3EA34DA83}"/>
+    <dgm:cxn modelId="{3F5C4484-5176-44CD-BF9F-B7483A83AE5A}" type="presOf" srcId="{6535251D-CE69-486C-AA49-296365C61330}" destId="{3C44D76E-9FB3-49E4-A2C5-45A50C3747E3}" srcOrd="0" destOrd="1" presId="urn:microsoft.com/office/officeart/2005/8/layout/vList5"/>
+    <dgm:cxn modelId="{FCEEFDB7-1954-44ED-AAB5-0102629CFBEA}" srcId="{DB494FB3-4C83-425E-B57D-DE4B419A94CA}" destId="{6535251D-CE69-486C-AA49-296365C61330}" srcOrd="1" destOrd="0" parTransId="{6CBE97C1-E9DB-4026-899A-F176780697ED}" sibTransId="{64FC8F17-8DC0-449B-B17B-7599789AD2EA}"/>
+    <dgm:cxn modelId="{AADA8FCF-ADAF-4B36-846E-CD14DFFA3847}" type="presOf" srcId="{F8D430A9-9D4B-4237-B376-3AC88A217C17}" destId="{3EAB476F-2628-442F-ADE4-56775120E15D}" srcOrd="0" destOrd="0" presId="urn:microsoft.com/office/officeart/2005/8/layout/vList5"/>
     <dgm:cxn modelId="{ECAB00FB-CB5C-4934-B547-4503C8745308}" type="presOf" srcId="{3A519B6F-579E-402E-92C0-35C02DFE4531}" destId="{A33C5EBD-7AE5-441F-B876-58FC95DC293A}" srcOrd="0" destOrd="0" presId="urn:microsoft.com/office/officeart/2005/8/layout/vList5"/>
     <dgm:cxn modelId="{E2D35577-455D-4652-90C4-E3ED247F077C}" type="presParOf" srcId="{1F21F52F-D26F-479D-8E0A-24493E9863BD}" destId="{B39294D4-FB1A-43E5-94EF-F4B307A8BFA6}" srcOrd="0" destOrd="0" presId="urn:microsoft.com/office/officeart/2005/8/layout/vList5"/>
     <dgm:cxn modelId="{DAB4EB05-508B-43A2-87AF-B1E4E9828429}" type="presParOf" srcId="{B39294D4-FB1A-43E5-94EF-F4B307A8BFA6}" destId="{2B5A0373-7151-498E-8BC9-31CB89C69073}" srcOrd="0" destOrd="0" presId="urn:microsoft.com/office/officeart/2005/8/layout/vList5"/>
@@ -6680,8 +6680,8 @@
     <dgm:cxn modelId="{B6D181C4-CF7D-4389-A70B-3D517000AD78}" srcId="{B0651378-C321-4BED-A9B3-F80A1A7C3FAF}" destId="{CA88AF1F-D44B-43A6-9D0E-9F2DAC3D479C}" srcOrd="0" destOrd="0" parTransId="{018130A9-7F13-4FC6-94AC-14859C8F0B6D}" sibTransId="{4881C6E1-C30D-4D44-BDDC-17F8AC30D1A1}"/>
     <dgm:cxn modelId="{B2A130E6-F4C4-4A26-AC00-FC9FEBBF2BAE}" type="presOf" srcId="{B8A8AFA4-F355-4ED4-AACB-2D56902CA35F}" destId="{734A2389-DD6B-48D3-A49E-657F05DDA171}" srcOrd="0" destOrd="0" presId="urn:microsoft.com/office/officeart/2005/8/layout/vList5"/>
     <dgm:cxn modelId="{3CF96DA9-AEEC-4ED7-BE2A-F9D333401FEE}" srcId="{D884D66A-5046-4FF5-A980-4ABA609B96B5}" destId="{B8A8AFA4-F355-4ED4-AACB-2D56902CA35F}" srcOrd="0" destOrd="0" parTransId="{1177CB18-1AE4-4D3D-AB04-2A68B34E88D6}" sibTransId="{7F83C134-2E1F-43EA-8E7A-259D9C3CDB3A}"/>
+    <dgm:cxn modelId="{FA12BEE8-090C-4DC5-B855-CAB553461350}" srcId="{B0651378-C321-4BED-A9B3-F80A1A7C3FAF}" destId="{8DC45F1A-D3EC-4787-8461-3E73221EEE9B}" srcOrd="2" destOrd="0" parTransId="{77E505DD-8562-4FB4-AE84-6D847E9DC2E6}" sibTransId="{3BBF6D67-355E-4779-9330-C191853F185D}"/>
     <dgm:cxn modelId="{064DC789-1A19-44DE-BA06-EF89AD315869}" type="presOf" srcId="{B17FB486-CE82-4552-81EA-79090C2DDCA9}" destId="{96C8FA0B-09C6-4C76-A592-A5A8F2561065}" srcOrd="0" destOrd="1" presId="urn:microsoft.com/office/officeart/2005/8/layout/vList5"/>
-    <dgm:cxn modelId="{FA12BEE8-090C-4DC5-B855-CAB553461350}" srcId="{B0651378-C321-4BED-A9B3-F80A1A7C3FAF}" destId="{8DC45F1A-D3EC-4787-8461-3E73221EEE9B}" srcOrd="2" destOrd="0" parTransId="{77E505DD-8562-4FB4-AE84-6D847E9DC2E6}" sibTransId="{3BBF6D67-355E-4779-9330-C191853F185D}"/>
     <dgm:cxn modelId="{B9F85461-83A6-45F6-9B85-01B896ABB2E1}" srcId="{CA88AF1F-D44B-43A6-9D0E-9F2DAC3D479C}" destId="{00BEEE2B-9188-4BBD-B41E-4C0BE9D196D5}" srcOrd="3" destOrd="0" parTransId="{77F7F25D-99F9-4D66-92A4-32F5DCDF3D08}" sibTransId="{6EF02CD7-8038-419F-93D7-C384C2B4BCD6}"/>
     <dgm:cxn modelId="{51FE5B13-0BF9-485C-939F-603948A80473}" srcId="{B0651378-C321-4BED-A9B3-F80A1A7C3FAF}" destId="{D884D66A-5046-4FF5-A980-4ABA609B96B5}" srcOrd="1" destOrd="0" parTransId="{B6714319-5BCD-4B97-820D-F2078AFD35A9}" sibTransId="{CBD13EA9-C3E2-43F1-ADC6-40DB633E2A2D}"/>
     <dgm:cxn modelId="{3E47839D-77B9-4EF1-A081-7BFCEE7E5E86}" type="presParOf" srcId="{8DEA74A7-EEE3-4623-AC07-C69BA1EFB93D}" destId="{CA7B934C-A28C-45FC-AD42-D16B70DBB5C7}" srcOrd="0" destOrd="0" presId="urn:microsoft.com/office/officeart/2005/8/layout/vList5"/>
@@ -6829,7 +6829,7 @@
                   <m:sSubPr>
                     <m:ctrlPr>
                       <a:rPr lang="en-US" sz="2500" b="0" i="1" kern="1200" smtClean="0">
-                        <a:latin typeface="Cambria Math" panose="02040503050406030204" pitchFamily="18" charset="0"/>
+                        <a:latin typeface="Cambria Math"/>
                       </a:rPr>
                     </m:ctrlPr>
                   </m:sSubPr>
@@ -6856,7 +6856,7 @@
                     <m:vertJc m:val="bot"/>
                     <m:ctrlPr>
                       <a:rPr lang="en-US" sz="2500" b="0" i="1" kern="1200" smtClean="0">
-                        <a:latin typeface="Cambria Math" panose="02040503050406030204" pitchFamily="18" charset="0"/>
+                        <a:latin typeface="Cambria Math"/>
                       </a:rPr>
                     </m:ctrlPr>
                   </m:groupChrPr>
@@ -6958,7 +6958,7 @@
                   <m:sSubPr>
                     <m:ctrlPr>
                       <a:rPr lang="en-US" sz="2500" b="0" i="1" kern="1200" smtClean="0">
-                        <a:latin typeface="Cambria Math" panose="02040503050406030204" pitchFamily="18" charset="0"/>
+                        <a:latin typeface="Cambria Math"/>
                       </a:rPr>
                     </m:ctrlPr>
                   </m:sSubPr>
@@ -7065,7 +7065,7 @@
                   <m:sSubPr>
                     <m:ctrlPr>
                       <a:rPr lang="en-US" sz="2500" b="0" i="1" kern="1200" smtClean="0">
-                        <a:latin typeface="Cambria Math" panose="02040503050406030204" pitchFamily="18" charset="0"/>
+                        <a:latin typeface="Cambria Math"/>
                       </a:rPr>
                     </m:ctrlPr>
                   </m:sSubPr>
@@ -7172,7 +7172,7 @@
                   <m:sSubPr>
                     <m:ctrlPr>
                       <a:rPr lang="en-US" sz="2500" b="0" i="1" kern="1200" smtClean="0">
-                        <a:latin typeface="Cambria Math" panose="02040503050406030204" pitchFamily="18" charset="0"/>
+                        <a:latin typeface="Cambria Math"/>
                       </a:rPr>
                     </m:ctrlPr>
                   </m:sSubPr>
@@ -7331,7 +7331,7 @@
                   <m:sSubPr>
                     <m:ctrlPr>
                       <a:rPr lang="en-US" sz="2500" b="0" i="1" kern="1200" smtClean="0">
-                        <a:latin typeface="Cambria Math" panose="02040503050406030204" pitchFamily="18" charset="0"/>
+                        <a:latin typeface="Cambria Math"/>
                       </a:rPr>
                     </m:ctrlPr>
                   </m:sSubPr>
@@ -7358,7 +7358,7 @@
                     <m:vertJc m:val="bot"/>
                     <m:ctrlPr>
                       <a:rPr lang="en-US" sz="2500" b="0" i="1" kern="1200" smtClean="0">
-                        <a:latin typeface="Cambria Math" panose="02040503050406030204" pitchFamily="18" charset="0"/>
+                        <a:latin typeface="Cambria Math"/>
                       </a:rPr>
                     </m:ctrlPr>
                   </m:groupChrPr>
@@ -7460,7 +7460,7 @@
                   <m:sSubPr>
                     <m:ctrlPr>
                       <a:rPr lang="en-US" sz="2500" b="0" i="1" kern="1200" smtClean="0">
-                        <a:latin typeface="Cambria Math" panose="02040503050406030204" pitchFamily="18" charset="0"/>
+                        <a:latin typeface="Cambria Math"/>
                       </a:rPr>
                     </m:ctrlPr>
                   </m:sSubPr>
@@ -7567,7 +7567,7 @@
                   <m:sSubPr>
                     <m:ctrlPr>
                       <a:rPr lang="en-US" sz="2500" b="0" i="1" kern="1200" smtClean="0">
-                        <a:latin typeface="Cambria Math" panose="02040503050406030204" pitchFamily="18" charset="0"/>
+                        <a:latin typeface="Cambria Math"/>
                       </a:rPr>
                     </m:ctrlPr>
                   </m:sSubPr>
@@ -7674,7 +7674,7 @@
                   <m:sSubPr>
                     <m:ctrlPr>
                       <a:rPr lang="en-US" sz="2500" b="0" i="1" kern="1200" smtClean="0">
-                        <a:latin typeface="Cambria Math" panose="02040503050406030204" pitchFamily="18" charset="0"/>
+                        <a:latin typeface="Cambria Math"/>
                       </a:rPr>
                     </m:ctrlPr>
                   </m:sSubPr>
@@ -14919,7 +14919,7 @@
           <a:p>
             <a:fld id="{A291F42C-F59D-4174-BD22-041D45073DE2}" type="datetimeFigureOut">
               <a:rPr lang="en-US" smtClean="0"/>
-              <a:t>12/2/2015</a:t>
+              <a:t>12/3/2015</a:t>
             </a:fld>
             <a:endParaRPr lang="en-US"/>
           </a:p>
@@ -15279,6 +15279,566 @@
 </p:notes>
 </file>
 
+<file path=ppt/notesSlides/notesSlide10.xml><?xml version="1.0" encoding="utf-8"?>
+<p:notes xmlns:a="http://schemas.openxmlformats.org/drawingml/2006/main" xmlns:r="http://schemas.openxmlformats.org/officeDocument/2006/relationships" xmlns:p="http://schemas.openxmlformats.org/presentationml/2006/main">
+  <p:cSld>
+    <p:spTree>
+      <p:nvGrpSpPr>
+        <p:cNvPr id="1" name=""/>
+        <p:cNvGrpSpPr/>
+        <p:nvPr/>
+      </p:nvGrpSpPr>
+      <p:grpSpPr>
+        <a:xfrm>
+          <a:off x="0" y="0"/>
+          <a:ext cx="0" cy="0"/>
+          <a:chOff x="0" y="0"/>
+          <a:chExt cx="0" cy="0"/>
+        </a:xfrm>
+      </p:grpSpPr>
+      <p:sp>
+        <p:nvSpPr>
+          <p:cNvPr id="2" name="Slide Image Placeholder 1"/>
+          <p:cNvSpPr>
+            <a:spLocks noGrp="1" noRot="1" noChangeAspect="1"/>
+          </p:cNvSpPr>
+          <p:nvPr>
+            <p:ph type="sldImg"/>
+          </p:nvPr>
+        </p:nvSpPr>
+        <p:spPr/>
+      </p:sp>
+      <p:sp>
+        <p:nvSpPr>
+          <p:cNvPr id="3" name="Notes Placeholder 2"/>
+          <p:cNvSpPr>
+            <a:spLocks noGrp="1"/>
+          </p:cNvSpPr>
+          <p:nvPr>
+            <p:ph type="body" idx="1"/>
+          </p:nvPr>
+        </p:nvSpPr>
+        <p:spPr/>
+        <p:txBody>
+          <a:bodyPr/>
+          <a:lstStyle/>
+          <a:p>
+            <a:endParaRPr lang="en-US" dirty="0"/>
+          </a:p>
+        </p:txBody>
+      </p:sp>
+      <p:sp>
+        <p:nvSpPr>
+          <p:cNvPr id="4" name="Slide Number Placeholder 3"/>
+          <p:cNvSpPr>
+            <a:spLocks noGrp="1"/>
+          </p:cNvSpPr>
+          <p:nvPr>
+            <p:ph type="sldNum" sz="quarter" idx="10"/>
+          </p:nvPr>
+        </p:nvSpPr>
+        <p:spPr/>
+        <p:txBody>
+          <a:bodyPr/>
+          <a:lstStyle/>
+          <a:p>
+            <a:fld id="{602530D3-6148-4146-9286-D1F8EFC3221F}" type="slidenum">
+              <a:rPr lang="en-US" smtClean="0"/>
+              <a:t>10</a:t>
+            </a:fld>
+            <a:endParaRPr lang="en-US"/>
+          </a:p>
+        </p:txBody>
+      </p:sp>
+    </p:spTree>
+    <p:extLst>
+      <p:ext uri="{BB962C8B-B14F-4D97-AF65-F5344CB8AC3E}">
+        <p14:creationId xmlns:p14="http://schemas.microsoft.com/office/powerpoint/2010/main" val="2434672408"/>
+      </p:ext>
+    </p:extLst>
+  </p:cSld>
+  <p:clrMapOvr>
+    <a:masterClrMapping/>
+  </p:clrMapOvr>
+</p:notes>
+</file>
+
+<file path=ppt/notesSlides/notesSlide11.xml><?xml version="1.0" encoding="utf-8"?>
+<p:notes xmlns:a="http://schemas.openxmlformats.org/drawingml/2006/main" xmlns:r="http://schemas.openxmlformats.org/officeDocument/2006/relationships" xmlns:p="http://schemas.openxmlformats.org/presentationml/2006/main">
+  <p:cSld>
+    <p:spTree>
+      <p:nvGrpSpPr>
+        <p:cNvPr id="1" name=""/>
+        <p:cNvGrpSpPr/>
+        <p:nvPr/>
+      </p:nvGrpSpPr>
+      <p:grpSpPr>
+        <a:xfrm>
+          <a:off x="0" y="0"/>
+          <a:ext cx="0" cy="0"/>
+          <a:chOff x="0" y="0"/>
+          <a:chExt cx="0" cy="0"/>
+        </a:xfrm>
+      </p:grpSpPr>
+      <p:sp>
+        <p:nvSpPr>
+          <p:cNvPr id="2" name="Slide Image Placeholder 1"/>
+          <p:cNvSpPr>
+            <a:spLocks noGrp="1" noRot="1" noChangeAspect="1"/>
+          </p:cNvSpPr>
+          <p:nvPr>
+            <p:ph type="sldImg"/>
+          </p:nvPr>
+        </p:nvSpPr>
+        <p:spPr/>
+      </p:sp>
+      <p:sp>
+        <p:nvSpPr>
+          <p:cNvPr id="3" name="Notes Placeholder 2"/>
+          <p:cNvSpPr>
+            <a:spLocks noGrp="1"/>
+          </p:cNvSpPr>
+          <p:nvPr>
+            <p:ph type="body" idx="1"/>
+          </p:nvPr>
+        </p:nvSpPr>
+        <p:spPr/>
+        <p:txBody>
+          <a:bodyPr/>
+          <a:lstStyle/>
+          <a:p>
+            <a:r>
+              <a:rPr lang="en-US" dirty="0" smtClean="0"/>
+              <a:t>Finally, a solution</a:t>
+            </a:r>
+            <a:r>
+              <a:rPr lang="en-US" baseline="0" dirty="0" smtClean="0"/>
+              <a:t> is reached that fits the criteria set forth for a good solution. Keep in mind this may not be the true optimal solution, but it is determined to be an acceptable approximation.</a:t>
+            </a:r>
+            <a:endParaRPr lang="en-US" dirty="0"/>
+          </a:p>
+        </p:txBody>
+      </p:sp>
+      <p:sp>
+        <p:nvSpPr>
+          <p:cNvPr id="4" name="Slide Number Placeholder 3"/>
+          <p:cNvSpPr>
+            <a:spLocks noGrp="1"/>
+          </p:cNvSpPr>
+          <p:nvPr>
+            <p:ph type="sldNum" sz="quarter" idx="10"/>
+          </p:nvPr>
+        </p:nvSpPr>
+        <p:spPr/>
+        <p:txBody>
+          <a:bodyPr/>
+          <a:lstStyle/>
+          <a:p>
+            <a:fld id="{602530D3-6148-4146-9286-D1F8EFC3221F}" type="slidenum">
+              <a:rPr lang="en-US" smtClean="0"/>
+              <a:t>17</a:t>
+            </a:fld>
+            <a:endParaRPr lang="en-US"/>
+          </a:p>
+        </p:txBody>
+      </p:sp>
+    </p:spTree>
+    <p:extLst>
+      <p:ext uri="{BB962C8B-B14F-4D97-AF65-F5344CB8AC3E}">
+        <p14:creationId xmlns:p14="http://schemas.microsoft.com/office/powerpoint/2010/main" val="1050470508"/>
+      </p:ext>
+    </p:extLst>
+  </p:cSld>
+  <p:clrMapOvr>
+    <a:masterClrMapping/>
+  </p:clrMapOvr>
+</p:notes>
+</file>
+
+<file path=ppt/notesSlides/notesSlide12.xml><?xml version="1.0" encoding="utf-8"?>
+<p:notes xmlns:a="http://schemas.openxmlformats.org/drawingml/2006/main" xmlns:r="http://schemas.openxmlformats.org/officeDocument/2006/relationships" xmlns:p="http://schemas.openxmlformats.org/presentationml/2006/main">
+  <p:cSld>
+    <p:spTree>
+      <p:nvGrpSpPr>
+        <p:cNvPr id="1" name=""/>
+        <p:cNvGrpSpPr/>
+        <p:nvPr/>
+      </p:nvGrpSpPr>
+      <p:grpSpPr>
+        <a:xfrm>
+          <a:off x="0" y="0"/>
+          <a:ext cx="0" cy="0"/>
+          <a:chOff x="0" y="0"/>
+          <a:chExt cx="0" cy="0"/>
+        </a:xfrm>
+      </p:grpSpPr>
+      <p:sp>
+        <p:nvSpPr>
+          <p:cNvPr id="2" name="Slide Image Placeholder 1"/>
+          <p:cNvSpPr>
+            <a:spLocks noGrp="1" noRot="1" noChangeAspect="1"/>
+          </p:cNvSpPr>
+          <p:nvPr>
+            <p:ph type="sldImg"/>
+          </p:nvPr>
+        </p:nvSpPr>
+        <p:spPr/>
+      </p:sp>
+      <p:sp>
+        <p:nvSpPr>
+          <p:cNvPr id="3" name="Notes Placeholder 2"/>
+          <p:cNvSpPr>
+            <a:spLocks noGrp="1"/>
+          </p:cNvSpPr>
+          <p:nvPr>
+            <p:ph type="body" idx="1"/>
+          </p:nvPr>
+        </p:nvSpPr>
+        <p:spPr/>
+        <p:txBody>
+          <a:bodyPr/>
+          <a:lstStyle/>
+          <a:p>
+            <a:r>
+              <a:rPr lang="en-US" dirty="0" smtClean="0"/>
+              <a:t>These are the experimental results of</a:t>
+            </a:r>
+            <a:r>
+              <a:rPr lang="en-US" baseline="0" dirty="0" smtClean="0"/>
+              <a:t> the hybrid evolutionary algorithm provided in the publication. The column to the far right displays the results achieved with the previously detailed approach, while the other columns describe the results of competing algorithms. The experiment was run on data sets involving varying population and group sizes. The authors claim their approach to be superior due to the decreased number of generations required to approximate an optimal solution across all problem sizes, as marked by the grey boxes. However, the average run time in each case is far larger than competing algorithms. In fact, when run on the largest data set, the proposed hybrid evolutionary algorithm has a larger run time that particle swarm optimization by a factor of over 100.</a:t>
+            </a:r>
+            <a:endParaRPr lang="en-US" dirty="0"/>
+          </a:p>
+        </p:txBody>
+      </p:sp>
+      <p:sp>
+        <p:nvSpPr>
+          <p:cNvPr id="4" name="Slide Number Placeholder 3"/>
+          <p:cNvSpPr>
+            <a:spLocks noGrp="1"/>
+          </p:cNvSpPr>
+          <p:nvPr>
+            <p:ph type="sldNum" sz="quarter" idx="10"/>
+          </p:nvPr>
+        </p:nvSpPr>
+        <p:spPr/>
+        <p:txBody>
+          <a:bodyPr/>
+          <a:lstStyle/>
+          <a:p>
+            <a:fld id="{602530D3-6148-4146-9286-D1F8EFC3221F}" type="slidenum">
+              <a:rPr lang="en-US" smtClean="0"/>
+              <a:t>18</a:t>
+            </a:fld>
+            <a:endParaRPr lang="en-US"/>
+          </a:p>
+        </p:txBody>
+      </p:sp>
+    </p:spTree>
+    <p:extLst>
+      <p:ext uri="{BB962C8B-B14F-4D97-AF65-F5344CB8AC3E}">
+        <p14:creationId xmlns:p14="http://schemas.microsoft.com/office/powerpoint/2010/main" val="751415645"/>
+      </p:ext>
+    </p:extLst>
+  </p:cSld>
+  <p:clrMapOvr>
+    <a:masterClrMapping/>
+  </p:clrMapOvr>
+</p:notes>
+</file>
+
+<file path=ppt/notesSlides/notesSlide13.xml><?xml version="1.0" encoding="utf-8"?>
+<p:notes xmlns:a="http://schemas.openxmlformats.org/drawingml/2006/main" xmlns:r="http://schemas.openxmlformats.org/officeDocument/2006/relationships" xmlns:p="http://schemas.openxmlformats.org/presentationml/2006/main">
+  <p:cSld>
+    <p:spTree>
+      <p:nvGrpSpPr>
+        <p:cNvPr id="1" name=""/>
+        <p:cNvGrpSpPr/>
+        <p:nvPr/>
+      </p:nvGrpSpPr>
+      <p:grpSpPr>
+        <a:xfrm>
+          <a:off x="0" y="0"/>
+          <a:ext cx="0" cy="0"/>
+          <a:chOff x="0" y="0"/>
+          <a:chExt cx="0" cy="0"/>
+        </a:xfrm>
+      </p:grpSpPr>
+      <p:sp>
+        <p:nvSpPr>
+          <p:cNvPr id="2" name="Slide Image Placeholder 1"/>
+          <p:cNvSpPr>
+            <a:spLocks noGrp="1" noRot="1" noChangeAspect="1"/>
+          </p:cNvSpPr>
+          <p:nvPr>
+            <p:ph type="sldImg"/>
+          </p:nvPr>
+        </p:nvSpPr>
+        <p:spPr/>
+      </p:sp>
+      <p:sp>
+        <p:nvSpPr>
+          <p:cNvPr id="3" name="Notes Placeholder 2"/>
+          <p:cNvSpPr>
+            <a:spLocks noGrp="1"/>
+          </p:cNvSpPr>
+          <p:nvPr>
+            <p:ph type="body" idx="1"/>
+          </p:nvPr>
+        </p:nvSpPr>
+        <p:spPr/>
+        <p:txBody>
+          <a:bodyPr/>
+          <a:lstStyle/>
+          <a:p>
+            <a:r>
+              <a:rPr lang="en-US" dirty="0" smtClean="0"/>
+              <a:t>This table demonstrates</a:t>
+            </a:r>
+            <a:r>
+              <a:rPr lang="en-US" baseline="0" dirty="0" smtClean="0"/>
+              <a:t> the mean time per generation of each of the algorithms when run on the smallest data set from the study. While the hybrid evolutionary algorithm requires fewer generations, the mean time per generation is about 30 times greater than the particle swarm approach. As the set of data under test grows, this disparity increases even further.</a:t>
+            </a:r>
+            <a:endParaRPr lang="en-US" dirty="0"/>
+          </a:p>
+        </p:txBody>
+      </p:sp>
+      <p:sp>
+        <p:nvSpPr>
+          <p:cNvPr id="4" name="Slide Number Placeholder 3"/>
+          <p:cNvSpPr>
+            <a:spLocks noGrp="1"/>
+          </p:cNvSpPr>
+          <p:nvPr>
+            <p:ph type="sldNum" sz="quarter" idx="10"/>
+          </p:nvPr>
+        </p:nvSpPr>
+        <p:spPr/>
+        <p:txBody>
+          <a:bodyPr/>
+          <a:lstStyle/>
+          <a:p>
+            <a:fld id="{602530D3-6148-4146-9286-D1F8EFC3221F}" type="slidenum">
+              <a:rPr lang="en-US" smtClean="0"/>
+              <a:t>19</a:t>
+            </a:fld>
+            <a:endParaRPr lang="en-US"/>
+          </a:p>
+        </p:txBody>
+      </p:sp>
+    </p:spTree>
+    <p:extLst>
+      <p:ext uri="{BB962C8B-B14F-4D97-AF65-F5344CB8AC3E}">
+        <p14:creationId xmlns:p14="http://schemas.microsoft.com/office/powerpoint/2010/main" val="4054385580"/>
+      </p:ext>
+    </p:extLst>
+  </p:cSld>
+  <p:clrMapOvr>
+    <a:masterClrMapping/>
+  </p:clrMapOvr>
+</p:notes>
+</file>
+
+<file path=ppt/notesSlides/notesSlide14.xml><?xml version="1.0" encoding="utf-8"?>
+<p:notes xmlns:a="http://schemas.openxmlformats.org/drawingml/2006/main" xmlns:r="http://schemas.openxmlformats.org/officeDocument/2006/relationships" xmlns:p="http://schemas.openxmlformats.org/presentationml/2006/main">
+  <p:cSld>
+    <p:spTree>
+      <p:nvGrpSpPr>
+        <p:cNvPr id="1" name=""/>
+        <p:cNvGrpSpPr/>
+        <p:nvPr/>
+      </p:nvGrpSpPr>
+      <p:grpSpPr>
+        <a:xfrm>
+          <a:off x="0" y="0"/>
+          <a:ext cx="0" cy="0"/>
+          <a:chOff x="0" y="0"/>
+          <a:chExt cx="0" cy="0"/>
+        </a:xfrm>
+      </p:grpSpPr>
+      <p:sp>
+        <p:nvSpPr>
+          <p:cNvPr id="2" name="Slide Image Placeholder 1"/>
+          <p:cNvSpPr>
+            <a:spLocks noGrp="1" noRot="1" noChangeAspect="1"/>
+          </p:cNvSpPr>
+          <p:nvPr>
+            <p:ph type="sldImg"/>
+          </p:nvPr>
+        </p:nvSpPr>
+        <p:spPr/>
+      </p:sp>
+      <p:sp>
+        <p:nvSpPr>
+          <p:cNvPr id="3" name="Notes Placeholder 2"/>
+          <p:cNvSpPr>
+            <a:spLocks noGrp="1"/>
+          </p:cNvSpPr>
+          <p:nvPr>
+            <p:ph type="body" idx="1"/>
+          </p:nvPr>
+        </p:nvSpPr>
+        <p:spPr/>
+        <p:txBody>
+          <a:bodyPr/>
+          <a:lstStyle/>
+          <a:p>
+            <a:r>
+              <a:rPr lang="en-US" dirty="0" smtClean="0"/>
+              <a:t>Learning a</a:t>
+            </a:r>
+            <a:r>
+              <a:rPr lang="en-US" baseline="0" dirty="0" smtClean="0"/>
+              <a:t> </a:t>
+            </a:r>
+            <a:r>
+              <a:rPr lang="en-US" baseline="0" dirty="0" err="1" smtClean="0"/>
+              <a:t>Bayesion</a:t>
+            </a:r>
+            <a:r>
+              <a:rPr lang="en-US" baseline="0" dirty="0" smtClean="0"/>
+              <a:t> Network is an NP-complete problem, and therefore techniques must be applied to determine an approximate solution to achieve a polynomial run time.</a:t>
+            </a:r>
+            <a:endParaRPr lang="en-US" dirty="0"/>
+          </a:p>
+        </p:txBody>
+      </p:sp>
+      <p:sp>
+        <p:nvSpPr>
+          <p:cNvPr id="4" name="Slide Number Placeholder 3"/>
+          <p:cNvSpPr>
+            <a:spLocks noGrp="1"/>
+          </p:cNvSpPr>
+          <p:nvPr>
+            <p:ph type="sldNum" sz="quarter" idx="10"/>
+          </p:nvPr>
+        </p:nvSpPr>
+        <p:spPr/>
+        <p:txBody>
+          <a:bodyPr/>
+          <a:lstStyle/>
+          <a:p>
+            <a:fld id="{602530D3-6148-4146-9286-D1F8EFC3221F}" type="slidenum">
+              <a:rPr lang="en-US" smtClean="0"/>
+              <a:t>20</a:t>
+            </a:fld>
+            <a:endParaRPr lang="en-US"/>
+          </a:p>
+        </p:txBody>
+      </p:sp>
+    </p:spTree>
+    <p:extLst>
+      <p:ext uri="{BB962C8B-B14F-4D97-AF65-F5344CB8AC3E}">
+        <p14:creationId xmlns:p14="http://schemas.microsoft.com/office/powerpoint/2010/main" val="2321703264"/>
+      </p:ext>
+    </p:extLst>
+  </p:cSld>
+  <p:clrMapOvr>
+    <a:masterClrMapping/>
+  </p:clrMapOvr>
+</p:notes>
+</file>
+
+<file path=ppt/notesSlides/notesSlide15.xml><?xml version="1.0" encoding="utf-8"?>
+<p:notes xmlns:a="http://schemas.openxmlformats.org/drawingml/2006/main" xmlns:r="http://schemas.openxmlformats.org/officeDocument/2006/relationships" xmlns:p="http://schemas.openxmlformats.org/presentationml/2006/main">
+  <p:cSld>
+    <p:spTree>
+      <p:nvGrpSpPr>
+        <p:cNvPr id="1" name=""/>
+        <p:cNvGrpSpPr/>
+        <p:nvPr/>
+      </p:nvGrpSpPr>
+      <p:grpSpPr>
+        <a:xfrm>
+          <a:off x="0" y="0"/>
+          <a:ext cx="0" cy="0"/>
+          <a:chOff x="0" y="0"/>
+          <a:chExt cx="0" cy="0"/>
+        </a:xfrm>
+      </p:grpSpPr>
+      <p:sp>
+        <p:nvSpPr>
+          <p:cNvPr id="2" name="Slide Image Placeholder 1"/>
+          <p:cNvSpPr>
+            <a:spLocks noGrp="1" noRot="1" noChangeAspect="1"/>
+          </p:cNvSpPr>
+          <p:nvPr>
+            <p:ph type="sldImg"/>
+          </p:nvPr>
+        </p:nvSpPr>
+        <p:spPr/>
+      </p:sp>
+      <p:sp>
+        <p:nvSpPr>
+          <p:cNvPr id="3" name="Notes Placeholder 2"/>
+          <p:cNvSpPr>
+            <a:spLocks noGrp="1"/>
+          </p:cNvSpPr>
+          <p:nvPr>
+            <p:ph type="body" idx="1"/>
+          </p:nvPr>
+        </p:nvSpPr>
+        <p:spPr/>
+        <p:txBody>
+          <a:bodyPr/>
+          <a:lstStyle/>
+          <a:p>
+            <a:r>
+              <a:rPr lang="en-US" dirty="0" smtClean="0"/>
+              <a:t>In order for the authors of the proposed hybrid evolutionary algorithm to validate their</a:t>
+            </a:r>
+            <a:r>
+              <a:rPr lang="en-US" baseline="0" dirty="0" smtClean="0"/>
+              <a:t> approach, they either need to prove that it completes faster than a competing solution, prove that the approximated solution is more accurate than other approaches, prove that there is a greater potential for concurrency and parallelization, or </a:t>
+            </a:r>
+            <a:r>
+              <a:rPr lang="en-US" baseline="0" smtClean="0"/>
+              <a:t>prove an </a:t>
+            </a:r>
+            <a:r>
+              <a:rPr lang="en-US" baseline="0" dirty="0" smtClean="0"/>
+              <a:t>approximation lower-bound through Bayesian Network Selection reduction.</a:t>
+            </a:r>
+            <a:endParaRPr lang="en-US" dirty="0"/>
+          </a:p>
+        </p:txBody>
+      </p:sp>
+      <p:sp>
+        <p:nvSpPr>
+          <p:cNvPr id="4" name="Slide Number Placeholder 3"/>
+          <p:cNvSpPr>
+            <a:spLocks noGrp="1"/>
+          </p:cNvSpPr>
+          <p:nvPr>
+            <p:ph type="sldNum" sz="quarter" idx="10"/>
+          </p:nvPr>
+        </p:nvSpPr>
+        <p:spPr/>
+        <p:txBody>
+          <a:bodyPr/>
+          <a:lstStyle/>
+          <a:p>
+            <a:fld id="{602530D3-6148-4146-9286-D1F8EFC3221F}" type="slidenum">
+              <a:rPr lang="en-US" smtClean="0"/>
+              <a:t>21</a:t>
+            </a:fld>
+            <a:endParaRPr lang="en-US"/>
+          </a:p>
+        </p:txBody>
+      </p:sp>
+    </p:spTree>
+    <p:extLst>
+      <p:ext uri="{BB962C8B-B14F-4D97-AF65-F5344CB8AC3E}">
+        <p14:creationId xmlns:p14="http://schemas.microsoft.com/office/powerpoint/2010/main" val="1074821852"/>
+      </p:ext>
+    </p:extLst>
+  </p:cSld>
+  <p:clrMapOvr>
+    <a:masterClrMapping/>
+  </p:clrMapOvr>
+</p:notes>
+</file>
+
 <file path=ppt/notesSlides/notesSlide2.xml><?xml version="1.0" encoding="utf-8"?>
 <p:notes xmlns:a="http://schemas.openxmlformats.org/drawingml/2006/main" xmlns:r="http://schemas.openxmlformats.org/officeDocument/2006/relationships" xmlns:p="http://schemas.openxmlformats.org/presentationml/2006/main">
   <p:cSld>
@@ -15616,12 +16176,12 @@
               <a:t>  First, this algorithm uses evolutionary approximation methods to approximate the answer.  Rather than explain how Bayesian and Evolutionary optimization works, there will be a very fast and condensed example of how the algorithm would run the task of optimizing making a </a:t>
             </a:r>
             <a:r>
-              <a:rPr lang="en-US" baseline="0" dirty="0" err="1" smtClean="0"/>
-              <a:t>Thanksigivng</a:t>
+              <a:rPr lang="en-US" baseline="0" dirty="0" smtClean="0"/>
+              <a:t>Thanksgiving </a:t>
             </a:r>
             <a:r>
               <a:rPr lang="en-US" baseline="0" dirty="0" smtClean="0"/>
-              <a:t> meal.  Secondly, a critical flaw was found in the published paper about the flexible job shop scheduling algorithm.  We will show that the goal of optimization through approximation was not achieved.</a:t>
+              <a:t>meal.  Secondly, a critical flaw was found in the published paper about the flexible job shop scheduling algorithm.  We will show that the goal of optimization through approximation was not achieved.</a:t>
             </a:r>
             <a:endParaRPr lang="en-US" dirty="0"/>
           </a:p>
@@ -15707,6 +16267,14 @@
           <a:bodyPr/>
           <a:lstStyle/>
           <a:p>
+            <a:r>
+              <a:rPr lang="en-US" dirty="0" smtClean="0"/>
+              <a:t>In this example,</a:t>
+            </a:r>
+            <a:r>
+              <a:rPr lang="en-US" baseline="0" dirty="0" smtClean="0"/>
+              <a:t> we will be examining how the flexible job-shop scheduling algorithm attempts to optimize the preparation of a Thanksgiving meal. The machines available include three people, an oven, and a stove. Each machine can complete a defined set of tasks. The jobs to be completed include preparing a turkey, mashed potatoes, and a pie, where each job requires a sequence of tasks in which the order is defined. Each task requires a specific amount of time to complete, and in this example, all times will be composed of one hour increments.</a:t>
+            </a:r>
             <a:endParaRPr lang="en-US" dirty="0"/>
           </a:p>
         </p:txBody>
@@ -15728,7 +16296,7 @@
           <a:p>
             <a:fld id="{602530D3-6148-4146-9286-D1F8EFC3221F}" type="slidenum">
               <a:rPr lang="en-US" smtClean="0"/>
-              <a:t>10</a:t>
+              <a:t>6</a:t>
             </a:fld>
             <a:endParaRPr lang="en-US"/>
           </a:p>
@@ -15737,7 +16305,7 @@
     </p:spTree>
     <p:extLst>
       <p:ext uri="{BB962C8B-B14F-4D97-AF65-F5344CB8AC3E}">
-        <p14:creationId xmlns:p14="http://schemas.microsoft.com/office/powerpoint/2010/main" val="2434672408"/>
+        <p14:creationId xmlns:p14="http://schemas.microsoft.com/office/powerpoint/2010/main" val="2175993412"/>
       </p:ext>
     </p:extLst>
   </p:cSld>
@@ -15791,6 +16359,14 @@
           <a:bodyPr/>
           <a:lstStyle/>
           <a:p>
+            <a:r>
+              <a:rPr lang="en-US" dirty="0" smtClean="0"/>
+              <a:t>In order to complete the job of turkey preparation,</a:t>
+            </a:r>
+            <a:r>
+              <a:rPr lang="en-US" baseline="0" dirty="0" smtClean="0"/>
+              <a:t> the turkey must be washed, prepped, and cooked for four hours.</a:t>
+            </a:r>
             <a:endParaRPr lang="en-US" dirty="0"/>
           </a:p>
         </p:txBody>
@@ -15812,7 +16388,7 @@
           <a:p>
             <a:fld id="{602530D3-6148-4146-9286-D1F8EFC3221F}" type="slidenum">
               <a:rPr lang="en-US" smtClean="0"/>
-              <a:t>18</a:t>
+              <a:t>7</a:t>
             </a:fld>
             <a:endParaRPr lang="en-US"/>
           </a:p>
@@ -15821,7 +16397,7 @@
     </p:spTree>
     <p:extLst>
       <p:ext uri="{BB962C8B-B14F-4D97-AF65-F5344CB8AC3E}">
-        <p14:creationId xmlns:p14="http://schemas.microsoft.com/office/powerpoint/2010/main" val="751415645"/>
+        <p14:creationId xmlns:p14="http://schemas.microsoft.com/office/powerpoint/2010/main" val="1398563049"/>
       </p:ext>
     </p:extLst>
   </p:cSld>
@@ -15875,6 +16451,14 @@
           <a:bodyPr/>
           <a:lstStyle/>
           <a:p>
+            <a:r>
+              <a:rPr lang="en-US" dirty="0" smtClean="0"/>
+              <a:t>Mashed</a:t>
+            </a:r>
+            <a:r>
+              <a:rPr lang="en-US" baseline="0" dirty="0" smtClean="0"/>
+              <a:t> potatoes must be washed, chopped, boiled, stirred, mashed, and stirred once more.</a:t>
+            </a:r>
             <a:endParaRPr lang="en-US" dirty="0"/>
           </a:p>
         </p:txBody>
@@ -15896,7 +16480,7 @@
           <a:p>
             <a:fld id="{602530D3-6148-4146-9286-D1F8EFC3221F}" type="slidenum">
               <a:rPr lang="en-US" smtClean="0"/>
-              <a:t>19</a:t>
+              <a:t>8</a:t>
             </a:fld>
             <a:endParaRPr lang="en-US"/>
           </a:p>
@@ -15905,7 +16489,95 @@
     </p:spTree>
     <p:extLst>
       <p:ext uri="{BB962C8B-B14F-4D97-AF65-F5344CB8AC3E}">
-        <p14:creationId xmlns:p14="http://schemas.microsoft.com/office/powerpoint/2010/main" val="4054385580"/>
+        <p14:creationId xmlns:p14="http://schemas.microsoft.com/office/powerpoint/2010/main" val="1001962268"/>
+      </p:ext>
+    </p:extLst>
+  </p:cSld>
+  <p:clrMapOvr>
+    <a:masterClrMapping/>
+  </p:clrMapOvr>
+</p:notes>
+</file>
+
+<file path=ppt/notesSlides/notesSlide9.xml><?xml version="1.0" encoding="utf-8"?>
+<p:notes xmlns:a="http://schemas.openxmlformats.org/drawingml/2006/main" xmlns:r="http://schemas.openxmlformats.org/officeDocument/2006/relationships" xmlns:p="http://schemas.openxmlformats.org/presentationml/2006/main">
+  <p:cSld>
+    <p:spTree>
+      <p:nvGrpSpPr>
+        <p:cNvPr id="1" name=""/>
+        <p:cNvGrpSpPr/>
+        <p:nvPr/>
+      </p:nvGrpSpPr>
+      <p:grpSpPr>
+        <a:xfrm>
+          <a:off x="0" y="0"/>
+          <a:ext cx="0" cy="0"/>
+          <a:chOff x="0" y="0"/>
+          <a:chExt cx="0" cy="0"/>
+        </a:xfrm>
+      </p:grpSpPr>
+      <p:sp>
+        <p:nvSpPr>
+          <p:cNvPr id="2" name="Slide Image Placeholder 1"/>
+          <p:cNvSpPr>
+            <a:spLocks noGrp="1" noRot="1" noChangeAspect="1"/>
+          </p:cNvSpPr>
+          <p:nvPr>
+            <p:ph type="sldImg"/>
+          </p:nvPr>
+        </p:nvSpPr>
+        <p:spPr/>
+      </p:sp>
+      <p:sp>
+        <p:nvSpPr>
+          <p:cNvPr id="3" name="Notes Placeholder 2"/>
+          <p:cNvSpPr>
+            <a:spLocks noGrp="1"/>
+          </p:cNvSpPr>
+          <p:nvPr>
+            <p:ph type="body" idx="1"/>
+          </p:nvPr>
+        </p:nvSpPr>
+        <p:spPr/>
+        <p:txBody>
+          <a:bodyPr/>
+          <a:lstStyle/>
+          <a:p>
+            <a:r>
+              <a:rPr lang="en-US" dirty="0" smtClean="0"/>
+              <a:t>To complete a pie, the filling must be prepped, cooked, and mixed. The crust must be mixed and prepped. Once both the filling and crust are completed, the pie is then cooked for one hour.</a:t>
+            </a:r>
+            <a:endParaRPr lang="en-US" dirty="0"/>
+          </a:p>
+        </p:txBody>
+      </p:sp>
+      <p:sp>
+        <p:nvSpPr>
+          <p:cNvPr id="4" name="Slide Number Placeholder 3"/>
+          <p:cNvSpPr>
+            <a:spLocks noGrp="1"/>
+          </p:cNvSpPr>
+          <p:nvPr>
+            <p:ph type="sldNum" sz="quarter" idx="10"/>
+          </p:nvPr>
+        </p:nvSpPr>
+        <p:spPr/>
+        <p:txBody>
+          <a:bodyPr/>
+          <a:lstStyle/>
+          <a:p>
+            <a:fld id="{602530D3-6148-4146-9286-D1F8EFC3221F}" type="slidenum">
+              <a:rPr lang="en-US" smtClean="0"/>
+              <a:t>9</a:t>
+            </a:fld>
+            <a:endParaRPr lang="en-US"/>
+          </a:p>
+        </p:txBody>
+      </p:sp>
+    </p:spTree>
+    <p:extLst>
+      <p:ext uri="{BB962C8B-B14F-4D97-AF65-F5344CB8AC3E}">
+        <p14:creationId xmlns:p14="http://schemas.microsoft.com/office/powerpoint/2010/main" val="4032041007"/>
       </p:ext>
     </p:extLst>
   </p:cSld>
@@ -16247,7 +16919,7 @@
             <a:fld id="{B61BEF0D-F0BB-DE4B-95CE-6DB70DBA9567}" type="datetimeFigureOut">
               <a:rPr lang="en-US" dirty="0"/>
               <a:pPr/>
-              <a:t>12/2/2015</a:t>
+              <a:t>12/3/2015</a:t>
             </a:fld>
             <a:endParaRPr lang="en-US" dirty="0"/>
           </a:p>
@@ -16341,6 +17013,9 @@
   <p:clrMapOvr>
     <a:masterClrMapping/>
   </p:clrMapOvr>
+  <p:transition>
+    <p:fade/>
+  </p:transition>
 </p:sldLayout>
 </file>
 
@@ -16568,7 +17243,7 @@
             <a:fld id="{B61BEF0D-F0BB-DE4B-95CE-6DB70DBA9567}" type="datetimeFigureOut">
               <a:rPr lang="en-US" dirty="0"/>
               <a:pPr/>
-              <a:t>12/2/2015</a:t>
+              <a:t>12/3/2015</a:t>
             </a:fld>
             <a:endParaRPr lang="en-US" dirty="0"/>
           </a:p>
@@ -16622,6 +17297,9 @@
   <p:clrMapOvr>
     <a:masterClrMapping/>
   </p:clrMapOvr>
+  <p:transition>
+    <p:fade/>
+  </p:transition>
 </p:sldLayout>
 </file>
 
@@ -16813,7 +17491,7 @@
             <a:fld id="{B61BEF0D-F0BB-DE4B-95CE-6DB70DBA9567}" type="datetimeFigureOut">
               <a:rPr lang="en-US" dirty="0"/>
               <a:pPr/>
-              <a:t>12/2/2015</a:t>
+              <a:t>12/3/2015</a:t>
             </a:fld>
             <a:endParaRPr lang="en-US" dirty="0"/>
           </a:p>
@@ -16898,6 +17576,9 @@
   <p:clrMapOvr>
     <a:masterClrMapping/>
   </p:clrMapOvr>
+  <p:transition>
+    <p:fade/>
+  </p:transition>
 </p:sldLayout>
 </file>
 
@@ -17149,7 +17830,7 @@
             <a:fld id="{B61BEF0D-F0BB-DE4B-95CE-6DB70DBA9567}" type="datetimeFigureOut">
               <a:rPr lang="en-US" dirty="0"/>
               <a:pPr/>
-              <a:t>12/2/2015</a:t>
+              <a:t>12/3/2015</a:t>
             </a:fld>
             <a:endParaRPr lang="en-US" dirty="0"/>
           </a:p>
@@ -17302,6 +17983,9 @@
   <p:clrMapOvr>
     <a:masterClrMapping/>
   </p:clrMapOvr>
+  <p:transition>
+    <p:fade/>
+  </p:transition>
 </p:sldLayout>
 </file>
 
@@ -17493,7 +18177,7 @@
             <a:fld id="{B61BEF0D-F0BB-DE4B-95CE-6DB70DBA9567}" type="datetimeFigureOut">
               <a:rPr lang="en-US" dirty="0"/>
               <a:pPr/>
-              <a:t>12/2/2015</a:t>
+              <a:t>12/3/2015</a:t>
             </a:fld>
             <a:endParaRPr lang="en-US" dirty="0"/>
           </a:p>
@@ -17547,6 +18231,9 @@
   <p:clrMapOvr>
     <a:masterClrMapping/>
   </p:clrMapOvr>
+  <p:transition>
+    <p:fade/>
+  </p:transition>
 </p:sldLayout>
 </file>
 
@@ -17864,7 +18551,7 @@
             <a:fld id="{B61BEF0D-F0BB-DE4B-95CE-6DB70DBA9567}" type="datetimeFigureOut">
               <a:rPr lang="en-US" dirty="0"/>
               <a:pPr/>
-              <a:t>12/2/2015</a:t>
+              <a:t>12/3/2015</a:t>
             </a:fld>
             <a:endParaRPr lang="en-US" dirty="0"/>
           </a:p>
@@ -18017,6 +18704,9 @@
   <p:clrMapOvr>
     <a:masterClrMapping/>
   </p:clrMapOvr>
+  <p:transition>
+    <p:fade/>
+  </p:transition>
 </p:sldLayout>
 </file>
 
@@ -18331,7 +19021,7 @@
             <a:fld id="{B61BEF0D-F0BB-DE4B-95CE-6DB70DBA9567}" type="datetimeFigureOut">
               <a:rPr lang="en-US" dirty="0"/>
               <a:pPr/>
-              <a:t>12/2/2015</a:t>
+              <a:t>12/3/2015</a:t>
             </a:fld>
             <a:endParaRPr lang="en-US" dirty="0"/>
           </a:p>
@@ -18416,6 +19106,9 @@
   <p:clrMapOvr>
     <a:masterClrMapping/>
   </p:clrMapOvr>
+  <p:transition>
+    <p:fade/>
+  </p:transition>
 </p:sldLayout>
 </file>
 
@@ -18533,7 +19226,7 @@
             <a:fld id="{B61BEF0D-F0BB-DE4B-95CE-6DB70DBA9567}" type="datetimeFigureOut">
               <a:rPr lang="en-US" dirty="0"/>
               <a:pPr/>
-              <a:t>12/2/2015</a:t>
+              <a:t>12/3/2015</a:t>
             </a:fld>
             <a:endParaRPr lang="en-US" dirty="0"/>
           </a:p>
@@ -18618,6 +19311,9 @@
   <p:clrMapOvr>
     <a:masterClrMapping/>
   </p:clrMapOvr>
+  <p:transition>
+    <p:fade/>
+  </p:transition>
 </p:sldLayout>
 </file>
 
@@ -18741,7 +19437,7 @@
             <a:fld id="{B61BEF0D-F0BB-DE4B-95CE-6DB70DBA9567}" type="datetimeFigureOut">
               <a:rPr lang="en-US" dirty="0"/>
               <a:pPr/>
-              <a:t>12/2/2015</a:t>
+              <a:t>12/3/2015</a:t>
             </a:fld>
             <a:endParaRPr lang="en-US" dirty="0"/>
           </a:p>
@@ -18826,6 +19522,9 @@
   <p:clrMapOvr>
     <a:masterClrMapping/>
   </p:clrMapOvr>
+  <p:transition>
+    <p:fade/>
+  </p:transition>
 </p:sldLayout>
 </file>
 
@@ -18969,7 +19668,7 @@
           <a:p>
             <a:fld id="{05BFA754-D5C3-4E66-96A6-867B257F58DC}" type="datetimeFigureOut">
               <a:rPr lang="en-US" dirty="0"/>
-              <a:t>12/2/2015</a:t>
+              <a:t>12/3/2015</a:t>
             </a:fld>
             <a:endParaRPr lang="en-US" dirty="0"/>
           </a:p>
@@ -19022,6 +19721,9 @@
   <p:clrMapOvr>
     <a:masterClrMapping/>
   </p:clrMapOvr>
+  <p:transition>
+    <p:fade/>
+  </p:transition>
 </p:sldLayout>
 </file>
 
@@ -19213,7 +19915,7 @@
             <a:fld id="{B61BEF0D-F0BB-DE4B-95CE-6DB70DBA9567}" type="datetimeFigureOut">
               <a:rPr lang="en-US" dirty="0"/>
               <a:pPr/>
-              <a:t>12/2/2015</a:t>
+              <a:t>12/3/2015</a:t>
             </a:fld>
             <a:endParaRPr lang="en-US" dirty="0"/>
           </a:p>
@@ -19298,6 +20000,9 @@
   <p:clrMapOvr>
     <a:masterClrMapping/>
   </p:clrMapOvr>
+  <p:transition>
+    <p:fade/>
+  </p:transition>
 </p:sldLayout>
 </file>
 
@@ -19476,7 +20181,7 @@
           <a:p>
             <a:fld id="{05BFA754-D5C3-4E66-96A6-867B257F58DC}" type="datetimeFigureOut">
               <a:rPr lang="en-US" dirty="0"/>
-              <a:t>12/2/2015</a:t>
+              <a:t>12/3/2015</a:t>
             </a:fld>
             <a:endParaRPr lang="en-US" dirty="0"/>
           </a:p>
@@ -19560,6 +20265,9 @@
   <p:clrMapOvr>
     <a:masterClrMapping/>
   </p:clrMapOvr>
+  <p:transition>
+    <p:fade/>
+  </p:transition>
 </p:sldLayout>
 </file>
 
@@ -19885,7 +20593,7 @@
             <a:fld id="{B61BEF0D-F0BB-DE4B-95CE-6DB70DBA9567}" type="datetimeFigureOut">
               <a:rPr lang="en-US" dirty="0"/>
               <a:pPr/>
-              <a:t>12/2/2015</a:t>
+              <a:t>12/3/2015</a:t>
             </a:fld>
             <a:endParaRPr lang="en-US" dirty="0"/>
           </a:p>
@@ -19970,6 +20678,9 @@
   <p:clrMapOvr>
     <a:masterClrMapping/>
   </p:clrMapOvr>
+  <p:transition>
+    <p:fade/>
+  </p:transition>
 </p:sldLayout>
 </file>
 
@@ -20031,7 +20742,7 @@
             <a:fld id="{B61BEF0D-F0BB-DE4B-95CE-6DB70DBA9567}" type="datetimeFigureOut">
               <a:rPr lang="en-US" dirty="0"/>
               <a:pPr/>
-              <a:t>12/2/2015</a:t>
+              <a:t>12/3/2015</a:t>
             </a:fld>
             <a:endParaRPr lang="en-US" dirty="0"/>
           </a:p>
@@ -20116,6 +20827,9 @@
   <p:clrMapOvr>
     <a:masterClrMapping/>
   </p:clrMapOvr>
+  <p:transition>
+    <p:fade/>
+  </p:transition>
 </p:sldLayout>
 </file>
 
@@ -20154,7 +20868,7 @@
             <a:fld id="{B61BEF0D-F0BB-DE4B-95CE-6DB70DBA9567}" type="datetimeFigureOut">
               <a:rPr lang="en-US" dirty="0"/>
               <a:pPr/>
-              <a:t>12/2/2015</a:t>
+              <a:t>12/3/2015</a:t>
             </a:fld>
             <a:endParaRPr lang="en-US" dirty="0"/>
           </a:p>
@@ -20208,6 +20922,9 @@
   <p:clrMapOvr>
     <a:masterClrMapping/>
   </p:clrMapOvr>
+  <p:transition>
+    <p:fade/>
+  </p:transition>
 </p:sldLayout>
 </file>
 
@@ -20406,7 +21123,7 @@
             <a:fld id="{B61BEF0D-F0BB-DE4B-95CE-6DB70DBA9567}" type="datetimeFigureOut">
               <a:rPr lang="en-US" dirty="0"/>
               <a:pPr/>
-              <a:t>12/2/2015</a:t>
+              <a:t>12/3/2015</a:t>
             </a:fld>
             <a:endParaRPr lang="en-US" dirty="0"/>
           </a:p>
@@ -20491,6 +21208,9 @@
   <p:clrMapOvr>
     <a:masterClrMapping/>
   </p:clrMapOvr>
+  <p:transition>
+    <p:fade/>
+  </p:transition>
 </p:sldLayout>
 </file>
 
@@ -20718,7 +21438,7 @@
             <a:fld id="{B61BEF0D-F0BB-DE4B-95CE-6DB70DBA9567}" type="datetimeFigureOut">
               <a:rPr lang="en-US" dirty="0"/>
               <a:pPr/>
-              <a:t>12/2/2015</a:t>
+              <a:t>12/3/2015</a:t>
             </a:fld>
             <a:endParaRPr lang="en-US" dirty="0"/>
           </a:p>
@@ -20772,6 +21492,9 @@
   <p:clrMapOvr>
     <a:masterClrMapping/>
   </p:clrMapOvr>
+  <p:transition>
+    <p:fade/>
+  </p:transition>
 </p:sldLayout>
 </file>
 
@@ -21066,7 +21789,7 @@
             <a:fld id="{B61BEF0D-F0BB-DE4B-95CE-6DB70DBA9567}" type="datetimeFigureOut">
               <a:rPr lang="en-US" dirty="0"/>
               <a:pPr/>
-              <a:t>12/2/2015</a:t>
+              <a:t>12/3/2015</a:t>
             </a:fld>
             <a:endParaRPr lang="en-US" dirty="0"/>
           </a:p>
@@ -21173,6 +21896,9 @@
     <p:sldLayoutId id="2147483658" r:id="rId16"/>
     <p:sldLayoutId id="2147483659" r:id="rId17"/>
   </p:sldLayoutIdLst>
+  <p:transition>
+    <p:fade/>
+  </p:transition>
   <p:txStyles>
     <p:titleStyle>
       <a:lvl1pPr algn="ctr" defTabSz="457200" rtl="0" eaLnBrk="1" latinLnBrk="0" hangingPunct="1">
@@ -21638,6 +22364,9 @@
   <p:clrMapOvr>
     <a:masterClrMapping/>
   </p:clrMapOvr>
+  <p:transition>
+    <p:fade/>
+  </p:transition>
   <p:timing>
     <p:tnLst>
       <p:par>
@@ -21767,6 +22496,16 @@
   <p:clrMapOvr>
     <a:masterClrMapping/>
   </p:clrMapOvr>
+  <p:transition>
+    <p:fade/>
+  </p:transition>
+  <p:timing>
+    <p:tnLst>
+      <p:par>
+        <p:cTn id="1" dur="indefinite" restart="never" nodeType="tmRoot"/>
+      </p:par>
+    </p:tnLst>
+  </p:timing>
 </p:sld>
 </file>
 
@@ -21887,6 +22626,16 @@
   <p:clrMapOvr>
     <a:masterClrMapping/>
   </p:clrMapOvr>
+  <p:transition>
+    <p:fade/>
+  </p:transition>
+  <p:timing>
+    <p:tnLst>
+      <p:par>
+        <p:cTn id="1" dur="indefinite" restart="never" nodeType="tmRoot"/>
+      </p:par>
+    </p:tnLst>
+  </p:timing>
 </p:sld>
 </file>
 
@@ -22002,6 +22751,16 @@
   <p:clrMapOvr>
     <a:masterClrMapping/>
   </p:clrMapOvr>
+  <p:transition>
+    <p:fade/>
+  </p:transition>
+  <p:timing>
+    <p:tnLst>
+      <p:par>
+        <p:cTn id="1" dur="indefinite" restart="never" nodeType="tmRoot"/>
+      </p:par>
+    </p:tnLst>
+  </p:timing>
 </p:sld>
 </file>
 
@@ -22117,6 +22876,16 @@
   <p:clrMapOvr>
     <a:masterClrMapping/>
   </p:clrMapOvr>
+  <p:transition>
+    <p:fade/>
+  </p:transition>
+  <p:timing>
+    <p:tnLst>
+      <p:par>
+        <p:cTn id="1" dur="indefinite" restart="never" nodeType="tmRoot"/>
+      </p:par>
+    </p:tnLst>
+  </p:timing>
 </p:sld>
 </file>
 
@@ -22232,6 +23001,16 @@
   <p:clrMapOvr>
     <a:masterClrMapping/>
   </p:clrMapOvr>
+  <p:transition>
+    <p:fade/>
+  </p:transition>
+  <p:timing>
+    <p:tnLst>
+      <p:par>
+        <p:cTn id="1" dur="indefinite" restart="never" nodeType="tmRoot"/>
+      </p:par>
+    </p:tnLst>
+  </p:timing>
 </p:sld>
 </file>
 
@@ -22347,6 +23126,16 @@
   <p:clrMapOvr>
     <a:masterClrMapping/>
   </p:clrMapOvr>
+  <p:transition>
+    <p:fade/>
+  </p:transition>
+  <p:timing>
+    <p:tnLst>
+      <p:par>
+        <p:cTn id="1" dur="indefinite" restart="never" nodeType="tmRoot"/>
+      </p:par>
+    </p:tnLst>
+  </p:timing>
 </p:sld>
 </file>
 
@@ -22462,6 +23251,16 @@
   <p:clrMapOvr>
     <a:masterClrMapping/>
   </p:clrMapOvr>
+  <p:transition>
+    <p:fade/>
+  </p:transition>
+  <p:timing>
+    <p:tnLst>
+      <p:par>
+        <p:cTn id="1" dur="indefinite" restart="never" nodeType="tmRoot"/>
+      </p:par>
+    </p:tnLst>
+  </p:timing>
 </p:sld>
 </file>
 
@@ -22501,11 +23300,7 @@
           <a:p>
             <a:r>
               <a:rPr lang="en-US" dirty="0" smtClean="0"/>
-              <a:t>Loop until </a:t>
-            </a:r>
-            <a:r>
-              <a:rPr lang="en-US" dirty="0" smtClean="0"/>
-              <a:t>a good solution is reached</a:t>
+              <a:t>Loop until a good solution is reached</a:t>
             </a:r>
             <a:endParaRPr lang="en-US" dirty="0"/>
           </a:p>
@@ -22520,7 +23315,7 @@
           <p:nvPr/>
         </p:nvPicPr>
         <p:blipFill>
-          <a:blip r:embed="rId2">
+          <a:blip r:embed="rId3">
             <a:extLst>
               <a:ext uri="{28A0092B-C50C-407E-A947-70E740481C1C}">
                 <a14:useLocalDpi xmlns:a14="http://schemas.microsoft.com/office/drawing/2010/main" val="0"/>
@@ -22551,6 +23346,16 @@
   <p:clrMapOvr>
     <a:masterClrMapping/>
   </p:clrMapOvr>
+  <p:transition>
+    <p:fade/>
+  </p:transition>
+  <p:timing>
+    <p:tnLst>
+      <p:par>
+        <p:cTn id="1" dur="indefinite" restart="never" nodeType="tmRoot"/>
+      </p:par>
+    </p:tnLst>
+  </p:timing>
 </p:sld>
 </file>
 
@@ -22652,6 +23457,16 @@
   <p:clrMapOvr>
     <a:masterClrMapping/>
   </p:clrMapOvr>
+  <p:transition>
+    <p:fade/>
+  </p:transition>
+  <p:timing>
+    <p:tnLst>
+      <p:par>
+        <p:cTn id="1" dur="indefinite" restart="never" nodeType="tmRoot"/>
+      </p:par>
+    </p:tnLst>
+  </p:timing>
 </p:sld>
 </file>
 
@@ -24914,6 +25729,16 @@
   <p:clrMapOvr>
     <a:masterClrMapping/>
   </p:clrMapOvr>
+  <p:transition>
+    <p:fade/>
+  </p:transition>
+  <p:timing>
+    <p:tnLst>
+      <p:par>
+        <p:cTn id="1" dur="indefinite" restart="never" nodeType="tmRoot"/>
+      </p:par>
+    </p:tnLst>
+  </p:timing>
 </p:sld>
 </file>
 
@@ -25041,7 +25866,7 @@
                             <a:solidFill>
                               <a:schemeClr val="bg1"/>
                             </a:solidFill>
-                            <a:latin typeface="Cambria Math" panose="02040503050406030204" pitchFamily="18" charset="0"/>
+                            <a:latin typeface="Cambria Math"/>
                           </a:rPr>
                         </m:ctrlPr>
                       </m:sSubPr>
@@ -25084,7 +25909,7 @@
                             <a:solidFill>
                               <a:schemeClr val="bg1"/>
                             </a:solidFill>
-                            <a:latin typeface="Cambria Math" panose="02040503050406030204" pitchFamily="18" charset="0"/>
+                            <a:latin typeface="Cambria Math"/>
                           </a:rPr>
                         </m:ctrlPr>
                       </m:sSubPr>
@@ -25127,7 +25952,7 @@
                             <a:solidFill>
                               <a:schemeClr val="bg1"/>
                             </a:solidFill>
-                            <a:latin typeface="Cambria Math" panose="02040503050406030204" pitchFamily="18" charset="0"/>
+                            <a:latin typeface="Cambria Math"/>
                           </a:rPr>
                         </m:ctrlPr>
                       </m:sSubPr>
@@ -25449,7 +26274,7 @@
                             <a:solidFill>
                               <a:schemeClr val="bg1"/>
                             </a:solidFill>
-                            <a:latin typeface="Cambria Math" panose="02040503050406030204" pitchFamily="18" charset="0"/>
+                            <a:latin typeface="Cambria Math"/>
                           </a:rPr>
                         </m:ctrlPr>
                       </m:sSubPr>
@@ -25492,7 +26317,7 @@
                             <a:solidFill>
                               <a:schemeClr val="bg1"/>
                             </a:solidFill>
-                            <a:latin typeface="Cambria Math" panose="02040503050406030204" pitchFamily="18" charset="0"/>
+                            <a:latin typeface="Cambria Math"/>
                           </a:rPr>
                         </m:ctrlPr>
                       </m:sSubPr>
@@ -25535,7 +26360,7 @@
                             <a:solidFill>
                               <a:schemeClr val="bg1"/>
                             </a:solidFill>
-                            <a:latin typeface="Cambria Math" panose="02040503050406030204" pitchFamily="18" charset="0"/>
+                            <a:latin typeface="Cambria Math"/>
                           </a:rPr>
                         </m:ctrlPr>
                       </m:sSubPr>
@@ -25965,14 +26790,9 @@
   <p:clrMapOvr>
     <a:masterClrMapping/>
   </p:clrMapOvr>
-  <mc:AlternateContent xmlns:mc="http://schemas.openxmlformats.org/markup-compatibility/2006" xmlns:p14="http://schemas.microsoft.com/office/powerpoint/2010/main">
-    <mc:Choice Requires="p14">
-      <p:transition p14:dur="0"/>
-    </mc:Choice>
-    <mc:Fallback xmlns="">
-      <p:transition/>
-    </mc:Fallback>
-  </mc:AlternateContent>
+  <p:transition>
+    <p:fade/>
+  </p:transition>
   <p:timing>
     <p:tnLst>
       <p:par>
@@ -26066,6 +26886,16 @@
   <p:clrMapOvr>
     <a:masterClrMapping/>
   </p:clrMapOvr>
+  <p:transition>
+    <p:fade/>
+  </p:transition>
+  <p:timing>
+    <p:tnLst>
+      <p:par>
+        <p:cTn id="1" dur="indefinite" restart="never" nodeType="tmRoot"/>
+      </p:par>
+    </p:tnLst>
+  </p:timing>
 </p:sld>
 </file>
 
@@ -26179,6 +27009,16 @@
   <p:clrMapOvr>
     <a:masterClrMapping/>
   </p:clrMapOvr>
+  <p:transition>
+    <p:fade/>
+  </p:transition>
+  <p:timing>
+    <p:tnLst>
+      <p:par>
+        <p:cTn id="1" dur="indefinite" restart="never" nodeType="tmRoot"/>
+      </p:par>
+    </p:tnLst>
+  </p:timing>
 </p:sld>
 </file>
 
@@ -26306,7 +27146,7 @@
                             <a:solidFill>
                               <a:schemeClr val="bg1"/>
                             </a:solidFill>
-                            <a:latin typeface="Cambria Math" panose="02040503050406030204" pitchFamily="18" charset="0"/>
+                            <a:latin typeface="Cambria Math"/>
                           </a:rPr>
                         </m:ctrlPr>
                       </m:sSubPr>
@@ -26349,7 +27189,7 @@
                             <a:solidFill>
                               <a:schemeClr val="bg1"/>
                             </a:solidFill>
-                            <a:latin typeface="Cambria Math" panose="02040503050406030204" pitchFamily="18" charset="0"/>
+                            <a:latin typeface="Cambria Math"/>
                           </a:rPr>
                         </m:ctrlPr>
                       </m:sSubPr>
@@ -26392,7 +27232,7 @@
                             <a:solidFill>
                               <a:schemeClr val="bg1"/>
                             </a:solidFill>
-                            <a:latin typeface="Cambria Math" panose="02040503050406030204" pitchFamily="18" charset="0"/>
+                            <a:latin typeface="Cambria Math"/>
                           </a:rPr>
                         </m:ctrlPr>
                       </m:sSubPr>
@@ -26714,7 +27554,7 @@
                             <a:solidFill>
                               <a:schemeClr val="bg1"/>
                             </a:solidFill>
-                            <a:latin typeface="Cambria Math" panose="02040503050406030204" pitchFamily="18" charset="0"/>
+                            <a:latin typeface="Cambria Math"/>
                           </a:rPr>
                         </m:ctrlPr>
                       </m:sSubPr>
@@ -26757,7 +27597,7 @@
                             <a:solidFill>
                               <a:schemeClr val="bg1"/>
                             </a:solidFill>
-                            <a:latin typeface="Cambria Math" panose="02040503050406030204" pitchFamily="18" charset="0"/>
+                            <a:latin typeface="Cambria Math"/>
                           </a:rPr>
                         </m:ctrlPr>
                       </m:sSubPr>
@@ -26800,7 +27640,7 @@
                             <a:solidFill>
                               <a:schemeClr val="bg1"/>
                             </a:solidFill>
-                            <a:latin typeface="Cambria Math" panose="02040503050406030204" pitchFamily="18" charset="0"/>
+                            <a:latin typeface="Cambria Math"/>
                           </a:rPr>
                         </m:ctrlPr>
                       </m:sSubPr>
@@ -27230,18 +28070,9 @@
   <p:clrMapOvr>
     <a:masterClrMapping/>
   </p:clrMapOvr>
-  <mc:AlternateContent xmlns:mc="http://schemas.openxmlformats.org/markup-compatibility/2006" xmlns:p15="http://schemas.microsoft.com/office/powerpoint/2012/main">
-    <mc:Choice Requires="p15">
-      <p:transition xmlns:p14="http://schemas.microsoft.com/office/powerpoint/2010/main" spd="slow" p14:dur="2000">
-        <p15:prstTrans prst="drape"/>
-      </p:transition>
-    </mc:Choice>
-    <mc:Fallback xmlns="">
-      <p:transition spd="slow">
-        <p:fade/>
-      </p:transition>
-    </mc:Fallback>
-  </mc:AlternateContent>
+  <p:transition>
+    <p:fade/>
+  </p:transition>
   <p:timing>
     <p:tnLst>
       <p:par>
@@ -28006,6 +28837,9 @@
   <p:clrMapOvr>
     <a:masterClrMapping/>
   </p:clrMapOvr>
+  <p:transition>
+    <p:fade/>
+  </p:transition>
   <p:timing>
     <p:tnLst>
       <p:par>
@@ -28072,6 +28906,16 @@
   <p:clrMapOvr>
     <a:masterClrMapping/>
   </p:clrMapOvr>
+  <p:transition>
+    <p:fade/>
+  </p:transition>
+  <p:timing>
+    <p:tnLst>
+      <p:par>
+        <p:cTn id="1" dur="indefinite" restart="never" nodeType="tmRoot"/>
+      </p:par>
+    </p:tnLst>
+  </p:timing>
 </p:sld>
 </file>
 
@@ -28730,7 +29574,39 @@
                   </a:outerShdw>
                 </a:effectLst>
               </a:rPr>
-              <a:t>Mashed Potatoes (tasks: mash)</a:t>
+              <a:t>Mashed Potatoes (tasks: </a:t>
+            </a:r>
+            <a:r>
+              <a:rPr lang="en-US" sz="2000" dirty="0" smtClean="0">
+                <a:ln w="0"/>
+                <a:solidFill>
+                  <a:schemeClr val="tx1"/>
+                </a:solidFill>
+                <a:effectLst>
+                  <a:outerShdw blurRad="38100" dist="19050" dir="2700000" algn="tl" rotWithShape="0">
+                    <a:schemeClr val="dk1">
+                      <a:alpha val="40000"/>
+                    </a:schemeClr>
+                  </a:outerShdw>
+                </a:effectLst>
+              </a:rPr>
+              <a:t>boil, mash</a:t>
+            </a:r>
+            <a:r>
+              <a:rPr lang="en-US" sz="2000" dirty="0" smtClean="0">
+                <a:ln w="0"/>
+                <a:solidFill>
+                  <a:schemeClr val="tx1"/>
+                </a:solidFill>
+                <a:effectLst>
+                  <a:outerShdw blurRad="38100" dist="19050" dir="2700000" algn="tl" rotWithShape="0">
+                    <a:schemeClr val="dk1">
+                      <a:alpha val="40000"/>
+                    </a:schemeClr>
+                  </a:outerShdw>
+                </a:effectLst>
+              </a:rPr>
+              <a:t>)</a:t>
             </a:r>
           </a:p>
           <a:p>
@@ -28831,6 +29707,16 @@
   <p:clrMapOvr>
     <a:masterClrMapping/>
   </p:clrMapOvr>
+  <p:transition>
+    <p:fade/>
+  </p:transition>
+  <p:timing>
+    <p:tnLst>
+      <p:par>
+        <p:cTn id="1" dur="indefinite" restart="never" nodeType="tmRoot"/>
+      </p:par>
+    </p:tnLst>
+  </p:timing>
 </p:sld>
 </file>
 
@@ -28888,7 +29774,7 @@
           <p:nvPr/>
         </p:nvPicPr>
         <p:blipFill>
-          <a:blip r:embed="rId2">
+          <a:blip r:embed="rId3">
             <a:extLst>
               <a:ext uri="{28A0092B-C50C-407E-A947-70E740481C1C}">
                 <a14:useLocalDpi xmlns:a14="http://schemas.microsoft.com/office/drawing/2010/main" val="0"/>
@@ -28919,6 +29805,16 @@
   <p:clrMapOvr>
     <a:masterClrMapping/>
   </p:clrMapOvr>
+  <p:transition>
+    <p:fade/>
+  </p:transition>
+  <p:timing>
+    <p:tnLst>
+      <p:par>
+        <p:cTn id="1" dur="indefinite" restart="never" nodeType="tmRoot"/>
+      </p:par>
+    </p:tnLst>
+  </p:timing>
 </p:sld>
 </file>
 
@@ -28976,7 +29872,7 @@
           <p:nvPr/>
         </p:nvPicPr>
         <p:blipFill>
-          <a:blip r:embed="rId2">
+          <a:blip r:embed="rId3">
             <a:extLst>
               <a:ext uri="{28A0092B-C50C-407E-A947-70E740481C1C}">
                 <a14:useLocalDpi xmlns:a14="http://schemas.microsoft.com/office/drawing/2010/main" val="0"/>
@@ -29007,6 +29903,16 @@
   <p:clrMapOvr>
     <a:masterClrMapping/>
   </p:clrMapOvr>
+  <p:transition>
+    <p:fade/>
+  </p:transition>
+  <p:timing>
+    <p:tnLst>
+      <p:par>
+        <p:cTn id="1" dur="indefinite" restart="never" nodeType="tmRoot"/>
+      </p:par>
+    </p:tnLst>
+  </p:timing>
 </p:sld>
 </file>
 
@@ -29066,7 +29972,7 @@
           <p:nvPr/>
         </p:nvPicPr>
         <p:blipFill>
-          <a:blip r:embed="rId2">
+          <a:blip r:embed="rId3">
             <a:extLst>
               <a:ext uri="{28A0092B-C50C-407E-A947-70E740481C1C}">
                 <a14:useLocalDpi xmlns:a14="http://schemas.microsoft.com/office/drawing/2010/main" val="0"/>
@@ -29097,6 +30003,16 @@
   <p:clrMapOvr>
     <a:masterClrMapping/>
   </p:clrMapOvr>
+  <p:transition>
+    <p:fade/>
+  </p:transition>
+  <p:timing>
+    <p:tnLst>
+      <p:par>
+        <p:cTn id="1" dur="indefinite" restart="never" nodeType="tmRoot"/>
+      </p:par>
+    </p:tnLst>
+  </p:timing>
 </p:sld>
 </file>
 
@@ -29143,7 +30059,7 @@
     </a:clrScheme>
     <a:fontScheme name="Organic">
       <a:majorFont>
-        <a:latin typeface="Garamond" panose="02020404030301010803"/>
+        <a:latin typeface="Garamond"/>
         <a:ea typeface=""/>
         <a:cs typeface=""/>
         <a:font script="Jpan" typeface="ＭＳ Ｐゴシック"/>
@@ -29178,7 +30094,7 @@
         <a:font script="Geor" typeface="Sylfaen"/>
       </a:majorFont>
       <a:minorFont>
-        <a:latin typeface="Garamond" panose="02020404030301010803"/>
+        <a:latin typeface="Garamond"/>
         <a:ea typeface=""/>
         <a:cs typeface=""/>
         <a:font script="Jpan" typeface="ＭＳ Ｐ明朝"/>
@@ -29327,7 +30243,7 @@
   <a:extraClrSchemeLst/>
   <a:extLst>
     <a:ext uri="{05A4C25C-085E-4340-85A3-A5531E510DB2}">
-      <thm15:themeFamily xmlns:thm15="http://schemas.microsoft.com/office/thememl/2012/main" name="Organic" id="{28CDC826-8792-45C0-861B-85EB3ADEDA33}" vid="{7039A4B3-0617-4CFC-B614-27363ECC28AC}"/>
+      <thm15:themeFamily xmlns:thm15="http://schemas.microsoft.com/office/thememl/2012/main" xmlns="" name="Organic" id="{28CDC826-8792-45C0-861B-85EB3ADEDA33}" vid="{7039A4B3-0617-4CFC-B614-27363ECC28AC}"/>
     </a:ext>
   </a:extLst>
 </a:theme>
@@ -29376,7 +30292,7 @@
     </a:clrScheme>
     <a:fontScheme name="Office">
       <a:majorFont>
-        <a:latin typeface="Calibri Light" panose="020F0302020204030204"/>
+        <a:latin typeface="Calibri Light"/>
         <a:ea typeface=""/>
         <a:cs typeface=""/>
         <a:font script="Jpan" typeface="ＭＳ Ｐゴシック"/>
@@ -29411,7 +30327,7 @@
         <a:font script="Geor" typeface="Sylfaen"/>
       </a:majorFont>
       <a:minorFont>
-        <a:latin typeface="Calibri" panose="020F0502020204030204"/>
+        <a:latin typeface="Calibri"/>
         <a:ea typeface=""/>
         <a:cs typeface=""/>
         <a:font script="Jpan" typeface="ＭＳ Ｐゴシック"/>
@@ -29588,7 +30504,7 @@
   <a:extraClrSchemeLst/>
   <a:extLst>
     <a:ext uri="{05A4C25C-085E-4340-85A3-A5531E510DB2}">
-      <thm15:themeFamily xmlns:thm15="http://schemas.microsoft.com/office/thememl/2012/main" name="Office Theme" id="{62F939B6-93AF-4DB8-9C6B-D6C7DFDC589F}" vid="{4A3C46E8-61CC-4603-A589-7422A47A8E4A}"/>
+      <thm15:themeFamily xmlns:thm15="http://schemas.microsoft.com/office/thememl/2012/main" xmlns="" name="Office Theme" id="{62F939B6-93AF-4DB8-9C6B-D6C7DFDC589F}" vid="{4A3C46E8-61CC-4603-A589-7422A47A8E4A}"/>
     </a:ext>
   </a:extLst>
 </a:theme>

</xml_diff>

<commit_message>
Added some of Janette's script
</commit_message>
<xml_diff>
--- a/PowerpointSlides/The Flexible Job Shop Scheduling Algorithm.pptx
+++ b/PowerpointSlides/The Flexible Job Shop Scheduling Algorithm.pptx
@@ -158,7 +158,7 @@
       </p14:sectionLst>
     </p:ext>
     <p:ext uri="{EFAFB233-063F-42B5-8137-9DF3F51BA10A}">
-      <p15:sldGuideLst xmlns:p15="http://schemas.microsoft.com/office/powerpoint/2012/main" xmlns=""/>
+      <p15:sldGuideLst xmlns="" xmlns:p15="http://schemas.microsoft.com/office/powerpoint/2012/main"/>
     </p:ext>
   </p:extLst>
 </p:presentation>
@@ -6680,8 +6680,8 @@
     <dgm:cxn modelId="{B6D181C4-CF7D-4389-A70B-3D517000AD78}" srcId="{B0651378-C321-4BED-A9B3-F80A1A7C3FAF}" destId="{CA88AF1F-D44B-43A6-9D0E-9F2DAC3D479C}" srcOrd="0" destOrd="0" parTransId="{018130A9-7F13-4FC6-94AC-14859C8F0B6D}" sibTransId="{4881C6E1-C30D-4D44-BDDC-17F8AC30D1A1}"/>
     <dgm:cxn modelId="{B2A130E6-F4C4-4A26-AC00-FC9FEBBF2BAE}" type="presOf" srcId="{B8A8AFA4-F355-4ED4-AACB-2D56902CA35F}" destId="{734A2389-DD6B-48D3-A49E-657F05DDA171}" srcOrd="0" destOrd="0" presId="urn:microsoft.com/office/officeart/2005/8/layout/vList5"/>
     <dgm:cxn modelId="{3CF96DA9-AEEC-4ED7-BE2A-F9D333401FEE}" srcId="{D884D66A-5046-4FF5-A980-4ABA609B96B5}" destId="{B8A8AFA4-F355-4ED4-AACB-2D56902CA35F}" srcOrd="0" destOrd="0" parTransId="{1177CB18-1AE4-4D3D-AB04-2A68B34E88D6}" sibTransId="{7F83C134-2E1F-43EA-8E7A-259D9C3CDB3A}"/>
+    <dgm:cxn modelId="{064DC789-1A19-44DE-BA06-EF89AD315869}" type="presOf" srcId="{B17FB486-CE82-4552-81EA-79090C2DDCA9}" destId="{96C8FA0B-09C6-4C76-A592-A5A8F2561065}" srcOrd="0" destOrd="1" presId="urn:microsoft.com/office/officeart/2005/8/layout/vList5"/>
     <dgm:cxn modelId="{FA12BEE8-090C-4DC5-B855-CAB553461350}" srcId="{B0651378-C321-4BED-A9B3-F80A1A7C3FAF}" destId="{8DC45F1A-D3EC-4787-8461-3E73221EEE9B}" srcOrd="2" destOrd="0" parTransId="{77E505DD-8562-4FB4-AE84-6D847E9DC2E6}" sibTransId="{3BBF6D67-355E-4779-9330-C191853F185D}"/>
-    <dgm:cxn modelId="{064DC789-1A19-44DE-BA06-EF89AD315869}" type="presOf" srcId="{B17FB486-CE82-4552-81EA-79090C2DDCA9}" destId="{96C8FA0B-09C6-4C76-A592-A5A8F2561065}" srcOrd="0" destOrd="1" presId="urn:microsoft.com/office/officeart/2005/8/layout/vList5"/>
     <dgm:cxn modelId="{B9F85461-83A6-45F6-9B85-01B896ABB2E1}" srcId="{CA88AF1F-D44B-43A6-9D0E-9F2DAC3D479C}" destId="{00BEEE2B-9188-4BBD-B41E-4C0BE9D196D5}" srcOrd="3" destOrd="0" parTransId="{77F7F25D-99F9-4D66-92A4-32F5DCDF3D08}" sibTransId="{6EF02CD7-8038-419F-93D7-C384C2B4BCD6}"/>
     <dgm:cxn modelId="{51FE5B13-0BF9-485C-939F-603948A80473}" srcId="{B0651378-C321-4BED-A9B3-F80A1A7C3FAF}" destId="{D884D66A-5046-4FF5-A980-4ABA609B96B5}" srcOrd="1" destOrd="0" parTransId="{B6714319-5BCD-4B97-820D-F2078AFD35A9}" sibTransId="{CBD13EA9-C3E2-43F1-ADC6-40DB633E2A2D}"/>
     <dgm:cxn modelId="{3E47839D-77B9-4EF1-A081-7BFCEE7E5E86}" type="presParOf" srcId="{8DEA74A7-EEE3-4623-AC07-C69BA1EFB93D}" destId="{CA7B934C-A28C-45FC-AD42-D16B70DBB5C7}" srcOrd="0" destOrd="0" presId="urn:microsoft.com/office/officeart/2005/8/layout/vList5"/>
@@ -15684,20 +15684,16 @@
           <a:lstStyle/>
           <a:p>
             <a:r>
-              <a:rPr lang="en-US" dirty="0" smtClean="0"/>
-              <a:t>Learning a</a:t>
-            </a:r>
-            <a:r>
-              <a:rPr lang="en-US" baseline="0" dirty="0" smtClean="0"/>
-              <a:t> </a:t>
-            </a:r>
-            <a:r>
-              <a:rPr lang="en-US" baseline="0" dirty="0" err="1" smtClean="0"/>
-              <a:t>Bayesion</a:t>
-            </a:r>
-            <a:r>
-              <a:rPr lang="en-US" baseline="0" dirty="0" smtClean="0"/>
-              <a:t> Network is an NP-complete problem, and therefore techniques must be applied to determine an approximate solution to achieve a polynomial run time.</a:t>
+              <a:rPr lang="en-US" sz="1200" kern="1200" dirty="0" smtClean="0">
+                <a:solidFill>
+                  <a:schemeClr val="tx1"/>
+                </a:solidFill>
+                <a:effectLst/>
+                <a:latin typeface="+mn-lt"/>
+                <a:ea typeface="+mn-ea"/>
+                <a:cs typeface="+mn-cs"/>
+              </a:rPr>
+              <a:t>This long generation time is probably due to the fact that the algorithm is dependent on learning a Bayesian Network. Learning a Bayesian has been shown to be NP-Complete. </a:t>
             </a:r>
             <a:endParaRPr lang="en-US" dirty="0"/>
           </a:p>
@@ -16173,15 +16169,7 @@
             </a:r>
             <a:r>
               <a:rPr lang="en-US" baseline="0" dirty="0" smtClean="0"/>
-              <a:t>  First, this algorithm uses evolutionary approximation methods to approximate the answer.  Rather than explain how Bayesian and Evolutionary optimization works, there will be a very fast and condensed example of how the algorithm would run the task of optimizing making a </a:t>
-            </a:r>
-            <a:r>
-              <a:rPr lang="en-US" baseline="0" dirty="0" smtClean="0"/>
-              <a:t>Thanksgiving </a:t>
-            </a:r>
-            <a:r>
-              <a:rPr lang="en-US" baseline="0" dirty="0" smtClean="0"/>
-              <a:t>meal.  Secondly, a critical flaw was found in the published paper about the flexible job shop scheduling algorithm.  We will show that the goal of optimization through approximation was not achieved.</a:t>
+              <a:t>  First, this algorithm uses evolutionary approximation methods to approximate the answer.  Rather than explain how Bayesian and Evolutionary optimization works, there will be a very fast and condensed example of how the algorithm would run the task of optimizing making a Thanksgiving meal.  Secondly, a critical flaw was found in the published paper about the flexible job shop scheduling algorithm.  We will show that the goal of optimization through approximation was not achieved.</a:t>
             </a:r>
             <a:endParaRPr lang="en-US" dirty="0"/>
           </a:p>
@@ -29574,39 +29562,7 @@
                   </a:outerShdw>
                 </a:effectLst>
               </a:rPr>
-              <a:t>Mashed Potatoes (tasks: </a:t>
-            </a:r>
-            <a:r>
-              <a:rPr lang="en-US" sz="2000" dirty="0" smtClean="0">
-                <a:ln w="0"/>
-                <a:solidFill>
-                  <a:schemeClr val="tx1"/>
-                </a:solidFill>
-                <a:effectLst>
-                  <a:outerShdw blurRad="38100" dist="19050" dir="2700000" algn="tl" rotWithShape="0">
-                    <a:schemeClr val="dk1">
-                      <a:alpha val="40000"/>
-                    </a:schemeClr>
-                  </a:outerShdw>
-                </a:effectLst>
-              </a:rPr>
-              <a:t>boil, mash</a:t>
-            </a:r>
-            <a:r>
-              <a:rPr lang="en-US" sz="2000" dirty="0" smtClean="0">
-                <a:ln w="0"/>
-                <a:solidFill>
-                  <a:schemeClr val="tx1"/>
-                </a:solidFill>
-                <a:effectLst>
-                  <a:outerShdw blurRad="38100" dist="19050" dir="2700000" algn="tl" rotWithShape="0">
-                    <a:schemeClr val="dk1">
-                      <a:alpha val="40000"/>
-                    </a:schemeClr>
-                  </a:outerShdw>
-                </a:effectLst>
-              </a:rPr>
-              <a:t>)</a:t>
+              <a:t>Mashed Potatoes (tasks: boil, mash)</a:t>
             </a:r>
           </a:p>
           <a:p>
@@ -30243,7 +30199,7 @@
   <a:extraClrSchemeLst/>
   <a:extLst>
     <a:ext uri="{05A4C25C-085E-4340-85A3-A5531E510DB2}">
-      <thm15:themeFamily xmlns:thm15="http://schemas.microsoft.com/office/thememl/2012/main" xmlns="" name="Organic" id="{28CDC826-8792-45C0-861B-85EB3ADEDA33}" vid="{7039A4B3-0617-4CFC-B614-27363ECC28AC}"/>
+      <thm15:themeFamily xmlns="" xmlns:thm15="http://schemas.microsoft.com/office/thememl/2012/main" name="Organic" id="{28CDC826-8792-45C0-861B-85EB3ADEDA33}" vid="{7039A4B3-0617-4CFC-B614-27363ECC28AC}"/>
     </a:ext>
   </a:extLst>
 </a:theme>
@@ -30504,7 +30460,7 @@
   <a:extraClrSchemeLst/>
   <a:extLst>
     <a:ext uri="{05A4C25C-085E-4340-85A3-A5531E510DB2}">
-      <thm15:themeFamily xmlns:thm15="http://schemas.microsoft.com/office/thememl/2012/main" xmlns="" name="Office Theme" id="{62F939B6-93AF-4DB8-9C6B-D6C7DFDC589F}" vid="{4A3C46E8-61CC-4603-A589-7422A47A8E4A}"/>
+      <thm15:themeFamily xmlns="" xmlns:thm15="http://schemas.microsoft.com/office/thememl/2012/main" name="Office Theme" id="{62F939B6-93AF-4DB8-9C6B-D6C7DFDC589F}" vid="{4A3C46E8-61CC-4603-A589-7422A47A8E4A}"/>
     </a:ext>
   </a:extLst>
 </a:theme>

</xml_diff>